<commit_message>
add key word count
</commit_message>
<xml_diff>
--- a/New Microsoft PowerPoint 演示文稿.pptx
+++ b/New Microsoft PowerPoint 演示文稿.pptx
@@ -5,13 +5,16 @@
     <p:sldMasterId id="2147483648" r:id="rId1"/>
   </p:sldMasterIdLst>
   <p:notesMasterIdLst>
-    <p:notesMasterId r:id="rId6"/>
+    <p:notesMasterId r:id="rId9"/>
   </p:notesMasterIdLst>
   <p:sldIdLst>
     <p:sldId id="256" r:id="rId2"/>
     <p:sldId id="257" r:id="rId3"/>
-    <p:sldId id="258" r:id="rId4"/>
-    <p:sldId id="259" r:id="rId5"/>
+    <p:sldId id="259" r:id="rId4"/>
+    <p:sldId id="260" r:id="rId5"/>
+    <p:sldId id="258" r:id="rId6"/>
+    <p:sldId id="261" r:id="rId7"/>
+    <p:sldId id="262" r:id="rId8"/>
   </p:sldIdLst>
   <p:sldSz cx="12192000" cy="6858000"/>
   <p:notesSz cx="6858000" cy="9144000"/>
@@ -110,6 +113,11 @@
       </a:defRPr>
     </a:lvl9pPr>
   </p:defaultTextStyle>
+  <p:extLst>
+    <p:ext uri="{EFAFB233-063F-42B5-8137-9DF3F51BA10A}">
+      <p15:sldGuideLst xmlns:p15="http://schemas.microsoft.com/office/powerpoint/2012/main"/>
+    </p:ext>
+  </p:extLst>
 </p:presentation>
 </file>
 
@@ -195,7 +203,7 @@
           <a:p>
             <a:fld id="{3967205C-D0A7-4EE7-8088-A62A068C25BE}" type="datetimeFigureOut">
               <a:rPr lang="zh-CN" altLang="en-US" smtClean="0"/>
-              <a:t>2021/8/24</a:t>
+              <a:t>2021/8/31</a:t>
             </a:fld>
             <a:endParaRPr lang="zh-CN" altLang="en-US"/>
           </a:p>
@@ -696,23 +704,6 @@
           <a:bodyPr/>
           <a:lstStyle/>
           <a:p>
-            <a:r>
-              <a:rPr lang="en-US" altLang="zh-CN" dirty="0"/>
-              <a:t>Firstly I need to declare a point of view that, </a:t>
-            </a:r>
-          </a:p>
-          <a:p>
-            <a:r>
-              <a:rPr lang="zh-CN" altLang="en-US" dirty="0"/>
-              <a:t>一个知识体系，如果想要发扬光大，源远流长的话，那么就需要有人教，需要有教程 </a:t>
-            </a:r>
-            <a:r>
-              <a:rPr lang="en-US" altLang="zh-CN" dirty="0" err="1"/>
-              <a:t>couse</a:t>
-            </a:r>
-            <a:endParaRPr lang="en-US" altLang="zh-CN" dirty="0"/>
-          </a:p>
-          <a:p>
             <a:endParaRPr lang="zh-CN" altLang="en-US" dirty="0"/>
           </a:p>
         </p:txBody>
@@ -743,7 +734,7 @@
     </p:spTree>
     <p:extLst>
       <p:ext uri="{BB962C8B-B14F-4D97-AF65-F5344CB8AC3E}">
-        <p14:creationId xmlns:p14="http://schemas.microsoft.com/office/powerpoint/2010/main" val="137449562"/>
+        <p14:creationId xmlns:p14="http://schemas.microsoft.com/office/powerpoint/2010/main" val="802465337"/>
       </p:ext>
     </p:extLst>
   </p:cSld>
@@ -827,7 +818,315 @@
     </p:spTree>
     <p:extLst>
       <p:ext uri="{BB962C8B-B14F-4D97-AF65-F5344CB8AC3E}">
-        <p14:creationId xmlns:p14="http://schemas.microsoft.com/office/powerpoint/2010/main" val="802465337"/>
+        <p14:creationId xmlns:p14="http://schemas.microsoft.com/office/powerpoint/2010/main" val="4004407906"/>
+      </p:ext>
+    </p:extLst>
+  </p:cSld>
+  <p:clrMapOvr>
+    <a:masterClrMapping/>
+  </p:clrMapOvr>
+</p:notes>
+</file>
+
+<file path=ppt/notesSlides/notesSlide5.xml><?xml version="1.0" encoding="utf-8"?>
+<p:notes xmlns:a="http://schemas.openxmlformats.org/drawingml/2006/main" xmlns:r="http://schemas.openxmlformats.org/officeDocument/2006/relationships" xmlns:p="http://schemas.openxmlformats.org/presentationml/2006/main">
+  <p:cSld>
+    <p:spTree>
+      <p:nvGrpSpPr>
+        <p:cNvPr id="1" name=""/>
+        <p:cNvGrpSpPr/>
+        <p:nvPr/>
+      </p:nvGrpSpPr>
+      <p:grpSpPr>
+        <a:xfrm>
+          <a:off x="0" y="0"/>
+          <a:ext cx="0" cy="0"/>
+          <a:chOff x="0" y="0"/>
+          <a:chExt cx="0" cy="0"/>
+        </a:xfrm>
+      </p:grpSpPr>
+      <p:sp>
+        <p:nvSpPr>
+          <p:cNvPr id="2" name="幻灯片图像占位符 1"/>
+          <p:cNvSpPr>
+            <a:spLocks noGrp="1" noRot="1" noChangeAspect="1"/>
+          </p:cNvSpPr>
+          <p:nvPr>
+            <p:ph type="sldImg"/>
+          </p:nvPr>
+        </p:nvSpPr>
+        <p:spPr/>
+      </p:sp>
+      <p:sp>
+        <p:nvSpPr>
+          <p:cNvPr id="3" name="备注占位符 2"/>
+          <p:cNvSpPr>
+            <a:spLocks noGrp="1"/>
+          </p:cNvSpPr>
+          <p:nvPr>
+            <p:ph type="body" idx="1"/>
+          </p:nvPr>
+        </p:nvSpPr>
+        <p:spPr/>
+        <p:txBody>
+          <a:bodyPr/>
+          <a:lstStyle/>
+          <a:p>
+            <a:r>
+              <a:rPr lang="en-US" altLang="zh-CN" dirty="0"/>
+              <a:t>Firstly I need to declare a point of view that, </a:t>
+            </a:r>
+          </a:p>
+          <a:p>
+            <a:r>
+              <a:rPr lang="zh-CN" altLang="en-US" dirty="0"/>
+              <a:t>一个知识体系，如果想要发扬光大，源远流长的话，那么就需要有人教，需要有教程 </a:t>
+            </a:r>
+            <a:r>
+              <a:rPr lang="en-US" altLang="zh-CN" dirty="0" err="1"/>
+              <a:t>couse</a:t>
+            </a:r>
+            <a:endParaRPr lang="en-US" altLang="zh-CN" dirty="0"/>
+          </a:p>
+          <a:p>
+            <a:endParaRPr lang="zh-CN" altLang="en-US" dirty="0"/>
+          </a:p>
+        </p:txBody>
+      </p:sp>
+      <p:sp>
+        <p:nvSpPr>
+          <p:cNvPr id="4" name="灯片编号占位符 3"/>
+          <p:cNvSpPr>
+            <a:spLocks noGrp="1"/>
+          </p:cNvSpPr>
+          <p:nvPr>
+            <p:ph type="sldNum" sz="quarter" idx="5"/>
+          </p:nvPr>
+        </p:nvSpPr>
+        <p:spPr/>
+        <p:txBody>
+          <a:bodyPr/>
+          <a:lstStyle/>
+          <a:p>
+            <a:fld id="{B57FF0B7-D083-428F-8372-C433786CBC81}" type="slidenum">
+              <a:rPr lang="zh-CN" altLang="en-US" smtClean="0"/>
+              <a:t>5</a:t>
+            </a:fld>
+            <a:endParaRPr lang="zh-CN" altLang="en-US"/>
+          </a:p>
+        </p:txBody>
+      </p:sp>
+    </p:spTree>
+    <p:extLst>
+      <p:ext uri="{BB962C8B-B14F-4D97-AF65-F5344CB8AC3E}">
+        <p14:creationId xmlns:p14="http://schemas.microsoft.com/office/powerpoint/2010/main" val="137449562"/>
+      </p:ext>
+    </p:extLst>
+  </p:cSld>
+  <p:clrMapOvr>
+    <a:masterClrMapping/>
+  </p:clrMapOvr>
+</p:notes>
+</file>
+
+<file path=ppt/notesSlides/notesSlide6.xml><?xml version="1.0" encoding="utf-8"?>
+<p:notes xmlns:a="http://schemas.openxmlformats.org/drawingml/2006/main" xmlns:r="http://schemas.openxmlformats.org/officeDocument/2006/relationships" xmlns:p="http://schemas.openxmlformats.org/presentationml/2006/main">
+  <p:cSld>
+    <p:spTree>
+      <p:nvGrpSpPr>
+        <p:cNvPr id="1" name=""/>
+        <p:cNvGrpSpPr/>
+        <p:nvPr/>
+      </p:nvGrpSpPr>
+      <p:grpSpPr>
+        <a:xfrm>
+          <a:off x="0" y="0"/>
+          <a:ext cx="0" cy="0"/>
+          <a:chOff x="0" y="0"/>
+          <a:chExt cx="0" cy="0"/>
+        </a:xfrm>
+      </p:grpSpPr>
+      <p:sp>
+        <p:nvSpPr>
+          <p:cNvPr id="2" name="幻灯片图像占位符 1"/>
+          <p:cNvSpPr>
+            <a:spLocks noGrp="1" noRot="1" noChangeAspect="1"/>
+          </p:cNvSpPr>
+          <p:nvPr>
+            <p:ph type="sldImg"/>
+          </p:nvPr>
+        </p:nvSpPr>
+        <p:spPr/>
+      </p:sp>
+      <p:sp>
+        <p:nvSpPr>
+          <p:cNvPr id="3" name="备注占位符 2"/>
+          <p:cNvSpPr>
+            <a:spLocks noGrp="1"/>
+          </p:cNvSpPr>
+          <p:nvPr>
+            <p:ph type="body" idx="1"/>
+          </p:nvPr>
+        </p:nvSpPr>
+        <p:spPr/>
+        <p:txBody>
+          <a:bodyPr/>
+          <a:lstStyle/>
+          <a:p>
+            <a:endParaRPr lang="zh-CN" altLang="en-US" dirty="0"/>
+          </a:p>
+        </p:txBody>
+      </p:sp>
+      <p:sp>
+        <p:nvSpPr>
+          <p:cNvPr id="4" name="灯片编号占位符 3"/>
+          <p:cNvSpPr>
+            <a:spLocks noGrp="1"/>
+          </p:cNvSpPr>
+          <p:nvPr>
+            <p:ph type="sldNum" sz="quarter" idx="5"/>
+          </p:nvPr>
+        </p:nvSpPr>
+        <p:spPr/>
+        <p:txBody>
+          <a:bodyPr/>
+          <a:lstStyle/>
+          <a:p>
+            <a:fld id="{B57FF0B7-D083-428F-8372-C433786CBC81}" type="slidenum">
+              <a:rPr lang="zh-CN" altLang="en-US" smtClean="0"/>
+              <a:t>6</a:t>
+            </a:fld>
+            <a:endParaRPr lang="zh-CN" altLang="en-US"/>
+          </a:p>
+        </p:txBody>
+      </p:sp>
+    </p:spTree>
+    <p:extLst>
+      <p:ext uri="{BB962C8B-B14F-4D97-AF65-F5344CB8AC3E}">
+        <p14:creationId xmlns:p14="http://schemas.microsoft.com/office/powerpoint/2010/main" val="660374730"/>
+      </p:ext>
+    </p:extLst>
+  </p:cSld>
+  <p:clrMapOvr>
+    <a:masterClrMapping/>
+  </p:clrMapOvr>
+</p:notes>
+</file>
+
+<file path=ppt/notesSlides/notesSlide7.xml><?xml version="1.0" encoding="utf-8"?>
+<p:notes xmlns:a="http://schemas.openxmlformats.org/drawingml/2006/main" xmlns:r="http://schemas.openxmlformats.org/officeDocument/2006/relationships" xmlns:p="http://schemas.openxmlformats.org/presentationml/2006/main">
+  <p:cSld>
+    <p:spTree>
+      <p:nvGrpSpPr>
+        <p:cNvPr id="1" name=""/>
+        <p:cNvGrpSpPr/>
+        <p:nvPr/>
+      </p:nvGrpSpPr>
+      <p:grpSpPr>
+        <a:xfrm>
+          <a:off x="0" y="0"/>
+          <a:ext cx="0" cy="0"/>
+          <a:chOff x="0" y="0"/>
+          <a:chExt cx="0" cy="0"/>
+        </a:xfrm>
+      </p:grpSpPr>
+      <p:sp>
+        <p:nvSpPr>
+          <p:cNvPr id="2" name="幻灯片图像占位符 1"/>
+          <p:cNvSpPr>
+            <a:spLocks noGrp="1" noRot="1" noChangeAspect="1"/>
+          </p:cNvSpPr>
+          <p:nvPr>
+            <p:ph type="sldImg"/>
+          </p:nvPr>
+        </p:nvSpPr>
+        <p:spPr/>
+      </p:sp>
+      <p:sp>
+        <p:nvSpPr>
+          <p:cNvPr id="3" name="备注占位符 2"/>
+          <p:cNvSpPr>
+            <a:spLocks noGrp="1"/>
+          </p:cNvSpPr>
+          <p:nvPr>
+            <p:ph type="body" idx="1"/>
+          </p:nvPr>
+        </p:nvSpPr>
+        <p:spPr/>
+        <p:txBody>
+          <a:bodyPr/>
+          <a:lstStyle/>
+          <a:p>
+            <a:r>
+              <a:rPr lang="zh-CN" altLang="en-US" dirty="0"/>
+              <a:t>知识体系不是一蹴而就的，和学习知识一样是需要不断迭代，随着你的知识的完善，你的知识的体系也是也越来完善的</a:t>
+            </a:r>
+            <a:endParaRPr lang="en-US" altLang="zh-CN" dirty="0"/>
+          </a:p>
+          <a:p>
+            <a:endParaRPr lang="en-US" altLang="zh-CN" dirty="0"/>
+          </a:p>
+          <a:p>
+            <a:r>
+              <a:rPr lang="zh-CN" altLang="en-US" dirty="0">
+                <a:solidFill>
+                  <a:srgbClr val="FF0000"/>
+                </a:solidFill>
+              </a:rPr>
+              <a:t>建立自己的知识体系可以完整的知道自己的这个知识是解决的什么问题，现在的这个知识点和其他的内容的相关性是什么</a:t>
+            </a:r>
+            <a:endParaRPr lang="en-US" altLang="zh-CN" dirty="0">
+              <a:solidFill>
+                <a:srgbClr val="FF0000"/>
+              </a:solidFill>
+            </a:endParaRPr>
+          </a:p>
+          <a:p>
+            <a:r>
+              <a:rPr lang="zh-CN" altLang="en-US" dirty="0"/>
+              <a:t>世界上平凡的工作太多了，知识点也太多了，很多的时候都是自己学习了都不会用，浪费了大量的时间，没有办法做到知行合一</a:t>
+            </a:r>
+            <a:endParaRPr lang="en-US" altLang="zh-CN" dirty="0"/>
+          </a:p>
+          <a:p>
+            <a:r>
+              <a:rPr lang="zh-CN" altLang="en-US" dirty="0"/>
+              <a:t>大家加油</a:t>
+            </a:r>
+            <a:endParaRPr lang="en-US" altLang="zh-CN" dirty="0"/>
+          </a:p>
+          <a:p>
+            <a:endParaRPr lang="zh-CN" altLang="en-US" dirty="0"/>
+          </a:p>
+        </p:txBody>
+      </p:sp>
+      <p:sp>
+        <p:nvSpPr>
+          <p:cNvPr id="4" name="灯片编号占位符 3"/>
+          <p:cNvSpPr>
+            <a:spLocks noGrp="1"/>
+          </p:cNvSpPr>
+          <p:nvPr>
+            <p:ph type="sldNum" sz="quarter" idx="5"/>
+          </p:nvPr>
+        </p:nvSpPr>
+        <p:spPr/>
+        <p:txBody>
+          <a:bodyPr/>
+          <a:lstStyle/>
+          <a:p>
+            <a:fld id="{B57FF0B7-D083-428F-8372-C433786CBC81}" type="slidenum">
+              <a:rPr lang="zh-CN" altLang="en-US" smtClean="0"/>
+              <a:t>7</a:t>
+            </a:fld>
+            <a:endParaRPr lang="zh-CN" altLang="en-US"/>
+          </a:p>
+        </p:txBody>
+      </p:sp>
+    </p:spTree>
+    <p:extLst>
+      <p:ext uri="{BB962C8B-B14F-4D97-AF65-F5344CB8AC3E}">
+        <p14:creationId xmlns:p14="http://schemas.microsoft.com/office/powerpoint/2010/main" val="815564391"/>
       </p:ext>
     </p:extLst>
   </p:cSld>
@@ -984,7 +1283,7 @@
           <a:p>
             <a:fld id="{39F8216A-B8E0-4CA8-AF93-07138A596BEB}" type="datetimeFigureOut">
               <a:rPr lang="zh-CN" altLang="en-US" smtClean="0"/>
-              <a:t>2021/8/24</a:t>
+              <a:t>2021/8/31</a:t>
             </a:fld>
             <a:endParaRPr lang="zh-CN" altLang="en-US"/>
           </a:p>
@@ -1182,7 +1481,7 @@
           <a:p>
             <a:fld id="{39F8216A-B8E0-4CA8-AF93-07138A596BEB}" type="datetimeFigureOut">
               <a:rPr lang="zh-CN" altLang="en-US" smtClean="0"/>
-              <a:t>2021/8/24</a:t>
+              <a:t>2021/8/31</a:t>
             </a:fld>
             <a:endParaRPr lang="zh-CN" altLang="en-US"/>
           </a:p>
@@ -1390,7 +1689,7 @@
           <a:p>
             <a:fld id="{39F8216A-B8E0-4CA8-AF93-07138A596BEB}" type="datetimeFigureOut">
               <a:rPr lang="zh-CN" altLang="en-US" smtClean="0"/>
-              <a:t>2021/8/24</a:t>
+              <a:t>2021/8/31</a:t>
             </a:fld>
             <a:endParaRPr lang="zh-CN" altLang="en-US"/>
           </a:p>
@@ -1588,7 +1887,7 @@
           <a:p>
             <a:fld id="{39F8216A-B8E0-4CA8-AF93-07138A596BEB}" type="datetimeFigureOut">
               <a:rPr lang="zh-CN" altLang="en-US" smtClean="0"/>
-              <a:t>2021/8/24</a:t>
+              <a:t>2021/8/31</a:t>
             </a:fld>
             <a:endParaRPr lang="zh-CN" altLang="en-US"/>
           </a:p>
@@ -1863,7 +2162,7 @@
           <a:p>
             <a:fld id="{39F8216A-B8E0-4CA8-AF93-07138A596BEB}" type="datetimeFigureOut">
               <a:rPr lang="zh-CN" altLang="en-US" smtClean="0"/>
-              <a:t>2021/8/24</a:t>
+              <a:t>2021/8/31</a:t>
             </a:fld>
             <a:endParaRPr lang="zh-CN" altLang="en-US"/>
           </a:p>
@@ -2128,7 +2427,7 @@
           <a:p>
             <a:fld id="{39F8216A-B8E0-4CA8-AF93-07138A596BEB}" type="datetimeFigureOut">
               <a:rPr lang="zh-CN" altLang="en-US" smtClean="0"/>
-              <a:t>2021/8/24</a:t>
+              <a:t>2021/8/31</a:t>
             </a:fld>
             <a:endParaRPr lang="zh-CN" altLang="en-US"/>
           </a:p>
@@ -2540,7 +2839,7 @@
           <a:p>
             <a:fld id="{39F8216A-B8E0-4CA8-AF93-07138A596BEB}" type="datetimeFigureOut">
               <a:rPr lang="zh-CN" altLang="en-US" smtClean="0"/>
-              <a:t>2021/8/24</a:t>
+              <a:t>2021/8/31</a:t>
             </a:fld>
             <a:endParaRPr lang="zh-CN" altLang="en-US"/>
           </a:p>
@@ -2681,7 +2980,7 @@
           <a:p>
             <a:fld id="{39F8216A-B8E0-4CA8-AF93-07138A596BEB}" type="datetimeFigureOut">
               <a:rPr lang="zh-CN" altLang="en-US" smtClean="0"/>
-              <a:t>2021/8/24</a:t>
+              <a:t>2021/8/31</a:t>
             </a:fld>
             <a:endParaRPr lang="zh-CN" altLang="en-US"/>
           </a:p>
@@ -2794,7 +3093,7 @@
           <a:p>
             <a:fld id="{39F8216A-B8E0-4CA8-AF93-07138A596BEB}" type="datetimeFigureOut">
               <a:rPr lang="zh-CN" altLang="en-US" smtClean="0"/>
-              <a:t>2021/8/24</a:t>
+              <a:t>2021/8/31</a:t>
             </a:fld>
             <a:endParaRPr lang="zh-CN" altLang="en-US"/>
           </a:p>
@@ -3105,7 +3404,7 @@
           <a:p>
             <a:fld id="{39F8216A-B8E0-4CA8-AF93-07138A596BEB}" type="datetimeFigureOut">
               <a:rPr lang="zh-CN" altLang="en-US" smtClean="0"/>
-              <a:t>2021/8/24</a:t>
+              <a:t>2021/8/31</a:t>
             </a:fld>
             <a:endParaRPr lang="zh-CN" altLang="en-US"/>
           </a:p>
@@ -3393,7 +3692,7 @@
           <a:p>
             <a:fld id="{39F8216A-B8E0-4CA8-AF93-07138A596BEB}" type="datetimeFigureOut">
               <a:rPr lang="zh-CN" altLang="en-US" smtClean="0"/>
-              <a:t>2021/8/24</a:t>
+              <a:t>2021/8/31</a:t>
             </a:fld>
             <a:endParaRPr lang="zh-CN" altLang="en-US"/>
           </a:p>
@@ -3634,7 +3933,7 @@
           <a:p>
             <a:fld id="{39F8216A-B8E0-4CA8-AF93-07138A596BEB}" type="datetimeFigureOut">
               <a:rPr lang="zh-CN" altLang="en-US" smtClean="0"/>
-              <a:t>2021/8/24</a:t>
+              <a:t>2021/8/31</a:t>
             </a:fld>
             <a:endParaRPr lang="zh-CN" altLang="en-US"/>
           </a:p>
@@ -4739,7 +5038,7 @@
           <p:cNvPr id="2" name="标题 1">
             <a:extLst>
               <a:ext uri="{FF2B5EF4-FFF2-40B4-BE49-F238E27FC236}">
-                <a16:creationId xmlns:a16="http://schemas.microsoft.com/office/drawing/2014/main" id="{3EED1A76-4494-4E69-B337-DFB520BDF63F}"/>
+                <a16:creationId xmlns:a16="http://schemas.microsoft.com/office/drawing/2014/main" id="{7C85CCCE-10A2-4E63-BAFC-BB2C0C1DE6DB}"/>
               </a:ext>
             </a:extLst>
           </p:cNvPr>
@@ -4748,85 +5047,230 @@
           </p:cNvSpPr>
           <p:nvPr>
             <p:ph type="title"/>
-          </p:nvPr>
-        </p:nvSpPr>
-        <p:spPr/>
-        <p:txBody>
-          <a:bodyPr/>
-          <a:lstStyle/>
-          <a:p>
-            <a:r>
-              <a:rPr lang="en-US" altLang="zh-CN" dirty="0"/>
-              <a:t>The process about how to build my knowledge structure</a:t>
-            </a:r>
-            <a:endParaRPr lang="zh-CN" altLang="en-US" dirty="0"/>
-          </a:p>
-        </p:txBody>
-      </p:sp>
-      <p:sp>
-        <p:nvSpPr>
-          <p:cNvPr id="3" name="内容占位符 2">
-            <a:extLst>
-              <a:ext uri="{FF2B5EF4-FFF2-40B4-BE49-F238E27FC236}">
-                <a16:creationId xmlns:a16="http://schemas.microsoft.com/office/drawing/2014/main" id="{1D9907FD-1B17-4BAF-B66C-9F228BBD2ED1}"/>
-              </a:ext>
-            </a:extLst>
-          </p:cNvPr>
-          <p:cNvSpPr>
-            <a:spLocks noGrp="1"/>
-          </p:cNvSpPr>
-          <p:nvPr>
-            <p:ph idx="1"/>
           </p:nvPr>
         </p:nvSpPr>
         <p:spPr>
           <a:xfrm>
-            <a:off x="838200" y="2372379"/>
-            <a:ext cx="10515600" cy="2614400"/>
+            <a:off x="844877" y="940160"/>
+            <a:ext cx="10502245" cy="1586224"/>
           </a:xfrm>
         </p:spPr>
         <p:txBody>
-          <a:bodyPr/>
+          <a:bodyPr>
+            <a:normAutofit fontScale="90000"/>
+          </a:bodyPr>
           <a:lstStyle/>
           <a:p>
             <a:r>
               <a:rPr lang="en-US" altLang="zh-CN" dirty="0"/>
-              <a:t>The precondition:</a:t>
-            </a:r>
-          </a:p>
-          <a:p>
-            <a:pPr marL="457200" lvl="1" indent="0">
-              <a:buNone/>
-            </a:pPr>
+              <a:t>Firstly… in my mind is to search in the recruitment website to check the job description, which skill is necessary…</a:t>
+            </a:r>
+            <a:endParaRPr lang="zh-CN" altLang="en-US" dirty="0"/>
+          </a:p>
+        </p:txBody>
+      </p:sp>
+      <p:sp>
+        <p:nvSpPr>
+          <p:cNvPr id="4" name="标题 1">
+            <a:extLst>
+              <a:ext uri="{FF2B5EF4-FFF2-40B4-BE49-F238E27FC236}">
+                <a16:creationId xmlns:a16="http://schemas.microsoft.com/office/drawing/2014/main" id="{71EE82EA-2D39-492D-8E1D-BBEB1CE1F455}"/>
+              </a:ext>
+            </a:extLst>
+          </p:cNvPr>
+          <p:cNvSpPr txBox="1">
+            <a:spLocks/>
+          </p:cNvSpPr>
+          <p:nvPr/>
+        </p:nvSpPr>
+        <p:spPr>
+          <a:xfrm>
+            <a:off x="844877" y="4599265"/>
+            <a:ext cx="10502245" cy="1586224"/>
+          </a:xfrm>
+          <a:prstGeom prst="rect">
+            <a:avLst/>
+          </a:prstGeom>
+        </p:spPr>
+        <p:txBody>
+          <a:bodyPr vert="horz" lIns="91440" tIns="45720" rIns="91440" bIns="45720" rtlCol="0" anchor="ctr">
+            <a:normAutofit fontScale="75000" lnSpcReduction="20000"/>
+          </a:bodyPr>
+          <a:lstStyle>
+            <a:lvl1pPr algn="l" defTabSz="914400" rtl="0" eaLnBrk="1" latinLnBrk="0" hangingPunct="1">
+              <a:lnSpc>
+                <a:spcPct val="90000"/>
+              </a:lnSpc>
+              <a:spcBef>
+                <a:spcPct val="0"/>
+              </a:spcBef>
+              <a:buNone/>
+              <a:defRPr sz="4400" kern="1200">
+                <a:solidFill>
+                  <a:schemeClr val="tx1"/>
+                </a:solidFill>
+                <a:latin typeface="+mj-lt"/>
+                <a:ea typeface="+mj-ea"/>
+                <a:cs typeface="+mj-cs"/>
+              </a:defRPr>
+            </a:lvl1pPr>
+          </a:lstStyle>
+          <a:p>
             <a:r>
               <a:rPr lang="en-US" altLang="zh-CN" dirty="0"/>
-              <a:t>If there is a knowledge needs to deliver to someone else, or one theory wants to go down in history and hand down a good reputation in next hundred future generations.</a:t>
-            </a:r>
-          </a:p>
-          <a:p>
-            <a:pPr marL="457200" lvl="1" indent="0">
-              <a:buNone/>
-            </a:pPr>
+              <a:t>After this process, I get an overview about the industry, including the job background, the main technology skills,</a:t>
+            </a:r>
+          </a:p>
+          <a:p>
             <a:r>
               <a:rPr lang="en-US" altLang="zh-CN" dirty="0"/>
-              <a:t>There must be a curriculum or a teaching material as a knowledge carrier.</a:t>
-            </a:r>
-          </a:p>
-          <a:p>
-            <a:pPr marL="457200" lvl="1" indent="0">
-              <a:buNone/>
-            </a:pPr>
-            <a:r>
-              <a:rPr lang="en-US" altLang="zh-CN" dirty="0"/>
-              <a:t>Those contains all the information about the subject.</a:t>
-            </a:r>
+              <a:t>Soft skills and so on…</a:t>
+            </a:r>
+            <a:endParaRPr lang="zh-CN" altLang="en-US" dirty="0"/>
+          </a:p>
+        </p:txBody>
+      </p:sp>
+      <p:graphicFrame>
+        <p:nvGraphicFramePr>
+          <p:cNvPr id="5" name="对象 4">
+            <a:extLst>
+              <a:ext uri="{FF2B5EF4-FFF2-40B4-BE49-F238E27FC236}">
+                <a16:creationId xmlns:a16="http://schemas.microsoft.com/office/drawing/2014/main" id="{C0790F2B-DAF6-4E0B-99E5-01F668BC6669}"/>
+              </a:ext>
+            </a:extLst>
+          </p:cNvPr>
+          <p:cNvGraphicFramePr>
+            <a:graphicFrameLocks noChangeAspect="1"/>
+          </p:cNvGraphicFramePr>
+          <p:nvPr>
+            <p:extLst>
+              <p:ext uri="{D42A27DB-BD31-4B8C-83A1-F6EECF244321}">
+                <p14:modId xmlns:p14="http://schemas.microsoft.com/office/powerpoint/2010/main" val="2358125511"/>
+              </p:ext>
+            </p:extLst>
+          </p:nvPr>
+        </p:nvGraphicFramePr>
+        <p:xfrm>
+          <a:off x="7347062" y="3153312"/>
+          <a:ext cx="757238" cy="525463"/>
+        </p:xfrm>
+        <a:graphic>
+          <a:graphicData uri="http://schemas.openxmlformats.org/presentationml/2006/ole">
+            <mc:AlternateContent xmlns:mc="http://schemas.openxmlformats.org/markup-compatibility/2006">
+              <mc:Choice xmlns:v="urn:schemas-microsoft-com:vml" Requires="v">
+                <p:oleObj name="Packager Shell Object" showAsIcon="1" r:id="rId3" imgW="757440" imgH="524880" progId="Package">
+                  <p:embed/>
+                </p:oleObj>
+              </mc:Choice>
+              <mc:Fallback>
+                <p:oleObj name="Packager Shell Object" showAsIcon="1" r:id="rId3" imgW="757440" imgH="524880" progId="Package">
+                  <p:embed/>
+                  <p:pic>
+                    <p:nvPicPr>
+                      <p:cNvPr id="4" name="对象 3">
+                        <a:extLst>
+                          <a:ext uri="{FF2B5EF4-FFF2-40B4-BE49-F238E27FC236}">
+                            <a16:creationId xmlns:a16="http://schemas.microsoft.com/office/drawing/2014/main" id="{17266BF5-EF99-4667-B4CB-B6A9AC259A74}"/>
+                          </a:ext>
+                        </a:extLst>
+                      </p:cNvPr>
+                      <p:cNvPicPr/>
+                      <p:nvPr/>
+                    </p:nvPicPr>
+                    <p:blipFill>
+                      <a:blip r:embed="rId4"/>
+                      <a:stretch>
+                        <a:fillRect/>
+                      </a:stretch>
+                    </p:blipFill>
+                    <p:spPr>
+                      <a:xfrm>
+                        <a:off x="7347062" y="3153312"/>
+                        <a:ext cx="757238" cy="525463"/>
+                      </a:xfrm>
+                      <a:prstGeom prst="rect">
+                        <a:avLst/>
+                      </a:prstGeom>
+                    </p:spPr>
+                  </p:pic>
+                </p:oleObj>
+              </mc:Fallback>
+            </mc:AlternateContent>
+          </a:graphicData>
+        </a:graphic>
+      </p:graphicFrame>
+      <p:sp>
+        <p:nvSpPr>
+          <p:cNvPr id="7" name="文本框 6">
+            <a:extLst>
+              <a:ext uri="{FF2B5EF4-FFF2-40B4-BE49-F238E27FC236}">
+                <a16:creationId xmlns:a16="http://schemas.microsoft.com/office/drawing/2014/main" id="{00C1C6A3-C477-4AC3-99BD-AA8D2BD51929}"/>
+              </a:ext>
+            </a:extLst>
+          </p:cNvPr>
+          <p:cNvSpPr txBox="1"/>
+          <p:nvPr/>
+        </p:nvSpPr>
+        <p:spPr>
+          <a:xfrm>
+            <a:off x="963892" y="3032444"/>
+            <a:ext cx="5484043" cy="646331"/>
+          </a:xfrm>
+          <a:prstGeom prst="rect">
+            <a:avLst/>
+          </a:prstGeom>
+          <a:noFill/>
+        </p:spPr>
+        <p:txBody>
+          <a:bodyPr wrap="square">
+            <a:spAutoFit/>
+          </a:bodyPr>
+          <a:lstStyle/>
+          <a:p>
+            <a:r>
+              <a:rPr lang="zh-CN" altLang="en-US" dirty="0">
+                <a:hlinkClick r:id="rId5"/>
+              </a:rPr>
+              <a:t>互联网求职招聘找工作</a:t>
+            </a:r>
+            <a:r>
+              <a:rPr lang="en-US" altLang="zh-CN" dirty="0">
+                <a:hlinkClick r:id="rId5"/>
+              </a:rPr>
+              <a:t>-</a:t>
+            </a:r>
+            <a:r>
+              <a:rPr lang="zh-CN" altLang="en-US" dirty="0">
+                <a:hlinkClick r:id="rId5"/>
+              </a:rPr>
+              <a:t>上拉勾招聘</a:t>
+            </a:r>
+            <a:r>
+              <a:rPr lang="en-US" altLang="zh-CN" dirty="0">
+                <a:hlinkClick r:id="rId5"/>
+              </a:rPr>
+              <a:t>-</a:t>
+            </a:r>
+            <a:r>
+              <a:rPr lang="zh-CN" altLang="en-US" dirty="0">
+                <a:hlinkClick r:id="rId5"/>
+              </a:rPr>
+              <a:t>专业的互联网求职招聘网站 </a:t>
+            </a:r>
+            <a:r>
+              <a:rPr lang="en-US" altLang="zh-CN" dirty="0">
+                <a:hlinkClick r:id="rId5"/>
+              </a:rPr>
+              <a:t>(lagou.com)</a:t>
+            </a:r>
+            <a:endParaRPr lang="zh-CN" altLang="en-US" dirty="0"/>
           </a:p>
         </p:txBody>
       </p:sp>
     </p:spTree>
     <p:extLst>
       <p:ext uri="{BB962C8B-B14F-4D97-AF65-F5344CB8AC3E}">
-        <p14:creationId xmlns:p14="http://schemas.microsoft.com/office/powerpoint/2010/main" val="322371705"/>
+        <p14:creationId xmlns:p14="http://schemas.microsoft.com/office/powerpoint/2010/main" val="2423431472"/>
       </p:ext>
     </p:extLst>
   </p:cSld>
@@ -4858,7 +5302,7 @@
           <p:cNvPr id="2" name="标题 1">
             <a:extLst>
               <a:ext uri="{FF2B5EF4-FFF2-40B4-BE49-F238E27FC236}">
-                <a16:creationId xmlns:a16="http://schemas.microsoft.com/office/drawing/2014/main" id="{7C85CCCE-10A2-4E63-BAFC-BB2C0C1DE6DB}"/>
+                <a16:creationId xmlns:a16="http://schemas.microsoft.com/office/drawing/2014/main" id="{5F747801-5720-4E97-9783-51746D12CC95}"/>
               </a:ext>
             </a:extLst>
           </p:cNvPr>
@@ -4871,9 +5315,22 @@
         </p:nvSpPr>
         <p:spPr/>
         <p:txBody>
-          <a:bodyPr/>
-          <a:lstStyle/>
-          <a:p>
+          <a:bodyPr>
+            <a:normAutofit fontScale="90000"/>
+          </a:bodyPr>
+          <a:lstStyle/>
+          <a:p>
+            <a:r>
+              <a:rPr lang="en-US" altLang="zh-CN" dirty="0"/>
+              <a:t>After calculating the key words, also get the</a:t>
+            </a:r>
+            <a:br>
+              <a:rPr lang="en-US" altLang="zh-CN" dirty="0"/>
+            </a:br>
+            <a:r>
+              <a:rPr lang="en-US" altLang="zh-CN" dirty="0"/>
+              <a:t>knowledge point, not the knowledge structure. </a:t>
+            </a:r>
             <a:endParaRPr lang="zh-CN" altLang="en-US" dirty="0"/>
           </a:p>
         </p:txBody>
@@ -4883,7 +5340,7 @@
           <p:cNvPr id="3" name="内容占位符 2">
             <a:extLst>
               <a:ext uri="{FF2B5EF4-FFF2-40B4-BE49-F238E27FC236}">
-                <a16:creationId xmlns:a16="http://schemas.microsoft.com/office/drawing/2014/main" id="{F71A0145-EA99-471A-BC0B-F3B70E27D6FA}"/>
+                <a16:creationId xmlns:a16="http://schemas.microsoft.com/office/drawing/2014/main" id="{A364F721-5996-4006-8CA7-9EA84160A5A2}"/>
               </a:ext>
             </a:extLst>
           </p:cNvPr>
@@ -4899,6 +5356,22 @@
           <a:bodyPr/>
           <a:lstStyle/>
           <a:p>
+            <a:endParaRPr lang="en-US" altLang="zh-CN" dirty="0"/>
+          </a:p>
+          <a:p>
+            <a:endParaRPr lang="en-US" altLang="zh-CN" dirty="0"/>
+          </a:p>
+          <a:p>
+            <a:endParaRPr lang="en-US" altLang="zh-CN" dirty="0"/>
+          </a:p>
+          <a:p>
+            <a:pPr marL="457200" lvl="1" indent="0">
+              <a:buNone/>
+            </a:pPr>
+            <a:r>
+              <a:rPr lang="en-US" altLang="zh-CN" dirty="0"/>
+              <a:t>So what should I do…</a:t>
+            </a:r>
             <a:endParaRPr lang="zh-CN" altLang="en-US" dirty="0"/>
           </a:p>
         </p:txBody>
@@ -4906,7 +5379,432 @@
     </p:spTree>
     <p:extLst>
       <p:ext uri="{BB962C8B-B14F-4D97-AF65-F5344CB8AC3E}">
-        <p14:creationId xmlns:p14="http://schemas.microsoft.com/office/powerpoint/2010/main" val="2423431472"/>
+        <p14:creationId xmlns:p14="http://schemas.microsoft.com/office/powerpoint/2010/main" val="1699259762"/>
+      </p:ext>
+    </p:extLst>
+  </p:cSld>
+  <p:clrMapOvr>
+    <a:masterClrMapping/>
+  </p:clrMapOvr>
+</p:sld>
+</file>
+
+<file path=ppt/slides/slide5.xml><?xml version="1.0" encoding="utf-8"?>
+<p:sld xmlns:a="http://schemas.openxmlformats.org/drawingml/2006/main" xmlns:r="http://schemas.openxmlformats.org/officeDocument/2006/relationships" xmlns:p="http://schemas.openxmlformats.org/presentationml/2006/main">
+  <p:cSld>
+    <p:spTree>
+      <p:nvGrpSpPr>
+        <p:cNvPr id="1" name=""/>
+        <p:cNvGrpSpPr/>
+        <p:nvPr/>
+      </p:nvGrpSpPr>
+      <p:grpSpPr>
+        <a:xfrm>
+          <a:off x="0" y="0"/>
+          <a:ext cx="0" cy="0"/>
+          <a:chOff x="0" y="0"/>
+          <a:chExt cx="0" cy="0"/>
+        </a:xfrm>
+      </p:grpSpPr>
+      <p:sp>
+        <p:nvSpPr>
+          <p:cNvPr id="2" name="标题 1">
+            <a:extLst>
+              <a:ext uri="{FF2B5EF4-FFF2-40B4-BE49-F238E27FC236}">
+                <a16:creationId xmlns:a16="http://schemas.microsoft.com/office/drawing/2014/main" id="{3EED1A76-4494-4E69-B337-DFB520BDF63F}"/>
+              </a:ext>
+            </a:extLst>
+          </p:cNvPr>
+          <p:cNvSpPr>
+            <a:spLocks noGrp="1"/>
+          </p:cNvSpPr>
+          <p:nvPr>
+            <p:ph type="title"/>
+          </p:nvPr>
+        </p:nvSpPr>
+        <p:spPr/>
+        <p:txBody>
+          <a:bodyPr/>
+          <a:lstStyle/>
+          <a:p>
+            <a:r>
+              <a:rPr lang="en-US" altLang="zh-CN" dirty="0"/>
+              <a:t>The precondition:</a:t>
+            </a:r>
+          </a:p>
+        </p:txBody>
+      </p:sp>
+      <p:sp>
+        <p:nvSpPr>
+          <p:cNvPr id="3" name="内容占位符 2">
+            <a:extLst>
+              <a:ext uri="{FF2B5EF4-FFF2-40B4-BE49-F238E27FC236}">
+                <a16:creationId xmlns:a16="http://schemas.microsoft.com/office/drawing/2014/main" id="{1D9907FD-1B17-4BAF-B66C-9F228BBD2ED1}"/>
+              </a:ext>
+            </a:extLst>
+          </p:cNvPr>
+          <p:cNvSpPr>
+            <a:spLocks noGrp="1"/>
+          </p:cNvSpPr>
+          <p:nvPr>
+            <p:ph idx="1"/>
+          </p:nvPr>
+        </p:nvSpPr>
+        <p:spPr>
+          <a:xfrm>
+            <a:off x="838200" y="2121800"/>
+            <a:ext cx="10515600" cy="2614400"/>
+          </a:xfrm>
+        </p:spPr>
+        <p:txBody>
+          <a:bodyPr/>
+          <a:lstStyle/>
+          <a:p>
+            <a:pPr marL="457200" lvl="1" indent="0">
+              <a:buNone/>
+            </a:pPr>
+            <a:r>
+              <a:rPr lang="en-US" altLang="zh-CN" dirty="0"/>
+              <a:t>If there is a knowledge needs to deliver to someone else, or one theory wants to go down in history and hand down a good reputation in next hundred future generations.</a:t>
+            </a:r>
+          </a:p>
+          <a:p>
+            <a:pPr marL="457200" lvl="1" indent="0">
+              <a:buNone/>
+            </a:pPr>
+            <a:r>
+              <a:rPr lang="en-US" altLang="zh-CN" dirty="0"/>
+              <a:t>There must be a curriculum or a teaching material as a knowledge carrier.</a:t>
+            </a:r>
+          </a:p>
+          <a:p>
+            <a:pPr marL="457200" lvl="1" indent="0">
+              <a:buNone/>
+            </a:pPr>
+            <a:r>
+              <a:rPr lang="en-US" altLang="zh-CN" dirty="0"/>
+              <a:t>Those contains all the information about the subject.</a:t>
+            </a:r>
+          </a:p>
+        </p:txBody>
+      </p:sp>
+    </p:spTree>
+    <p:extLst>
+      <p:ext uri="{BB962C8B-B14F-4D97-AF65-F5344CB8AC3E}">
+        <p14:creationId xmlns:p14="http://schemas.microsoft.com/office/powerpoint/2010/main" val="322371705"/>
+      </p:ext>
+    </p:extLst>
+  </p:cSld>
+  <p:clrMapOvr>
+    <a:masterClrMapping/>
+  </p:clrMapOvr>
+</p:sld>
+</file>
+
+<file path=ppt/slides/slide6.xml><?xml version="1.0" encoding="utf-8"?>
+<p:sld xmlns:a="http://schemas.openxmlformats.org/drawingml/2006/main" xmlns:r="http://schemas.openxmlformats.org/officeDocument/2006/relationships" xmlns:p="http://schemas.openxmlformats.org/presentationml/2006/main">
+  <p:cSld>
+    <p:spTree>
+      <p:nvGrpSpPr>
+        <p:cNvPr id="1" name=""/>
+        <p:cNvGrpSpPr/>
+        <p:nvPr/>
+      </p:nvGrpSpPr>
+      <p:grpSpPr>
+        <a:xfrm>
+          <a:off x="0" y="0"/>
+          <a:ext cx="0" cy="0"/>
+          <a:chOff x="0" y="0"/>
+          <a:chExt cx="0" cy="0"/>
+        </a:xfrm>
+      </p:grpSpPr>
+      <p:sp>
+        <p:nvSpPr>
+          <p:cNvPr id="2" name="标题 1">
+            <a:extLst>
+              <a:ext uri="{FF2B5EF4-FFF2-40B4-BE49-F238E27FC236}">
+                <a16:creationId xmlns:a16="http://schemas.microsoft.com/office/drawing/2014/main" id="{BCDF9681-C394-43FA-973F-484ACD74B54D}"/>
+              </a:ext>
+            </a:extLst>
+          </p:cNvPr>
+          <p:cNvSpPr>
+            <a:spLocks noGrp="1"/>
+          </p:cNvSpPr>
+          <p:nvPr>
+            <p:ph type="title"/>
+          </p:nvPr>
+        </p:nvSpPr>
+        <p:spPr/>
+        <p:txBody>
+          <a:bodyPr/>
+          <a:lstStyle/>
+          <a:p>
+            <a:r>
+              <a:rPr lang="en-US" altLang="zh-CN" dirty="0"/>
+              <a:t>The process about how to build my knowledge structure</a:t>
+            </a:r>
+            <a:endParaRPr lang="zh-CN" altLang="en-US" dirty="0"/>
+          </a:p>
+        </p:txBody>
+      </p:sp>
+      <p:sp>
+        <p:nvSpPr>
+          <p:cNvPr id="3" name="内容占位符 2">
+            <a:extLst>
+              <a:ext uri="{FF2B5EF4-FFF2-40B4-BE49-F238E27FC236}">
+                <a16:creationId xmlns:a16="http://schemas.microsoft.com/office/drawing/2014/main" id="{480C66E2-0C43-45EE-B27A-1BB079136159}"/>
+              </a:ext>
+            </a:extLst>
+          </p:cNvPr>
+          <p:cNvSpPr>
+            <a:spLocks noGrp="1"/>
+          </p:cNvSpPr>
+          <p:nvPr>
+            <p:ph idx="1"/>
+          </p:nvPr>
+        </p:nvSpPr>
+        <p:spPr>
+          <a:xfrm>
+            <a:off x="914007" y="2513782"/>
+            <a:ext cx="10360843" cy="2944338"/>
+          </a:xfrm>
+        </p:spPr>
+        <p:txBody>
+          <a:bodyPr>
+            <a:normAutofit fontScale="92500" lnSpcReduction="20000"/>
+          </a:bodyPr>
+          <a:lstStyle/>
+          <a:p>
+            <a:r>
+              <a:rPr lang="en-US" altLang="zh-CN" dirty="0"/>
+              <a:t>I search all the courses in the internet, and summarize in the Excel and compare and summarize to get the difference and find the high frequency skill.</a:t>
+            </a:r>
+          </a:p>
+          <a:p>
+            <a:r>
+              <a:rPr lang="en-US" altLang="zh-CN" dirty="0"/>
+              <a:t>[the reason why this step, I manually to copy the content in the Excel not by a program… because I need to make sure that I am familiar with the content.]</a:t>
+            </a:r>
+          </a:p>
+          <a:p>
+            <a:endParaRPr lang="en-US" altLang="zh-CN" dirty="0"/>
+          </a:p>
+          <a:p>
+            <a:r>
+              <a:rPr lang="en-US" altLang="zh-CN" dirty="0"/>
+              <a:t>The aim is to finally abstract these component as my topology.</a:t>
+            </a:r>
+            <a:endParaRPr lang="zh-CN" altLang="en-US" dirty="0"/>
+          </a:p>
+        </p:txBody>
+      </p:sp>
+    </p:spTree>
+    <p:extLst>
+      <p:ext uri="{BB962C8B-B14F-4D97-AF65-F5344CB8AC3E}">
+        <p14:creationId xmlns:p14="http://schemas.microsoft.com/office/powerpoint/2010/main" val="91212164"/>
+      </p:ext>
+    </p:extLst>
+  </p:cSld>
+  <p:clrMapOvr>
+    <a:masterClrMapping/>
+  </p:clrMapOvr>
+</p:sld>
+</file>
+
+<file path=ppt/slides/slide7.xml><?xml version="1.0" encoding="utf-8"?>
+<p:sld xmlns:a="http://schemas.openxmlformats.org/drawingml/2006/main" xmlns:r="http://schemas.openxmlformats.org/officeDocument/2006/relationships" xmlns:p="http://schemas.openxmlformats.org/presentationml/2006/main">
+  <p:cSld>
+    <p:spTree>
+      <p:nvGrpSpPr>
+        <p:cNvPr id="1" name=""/>
+        <p:cNvGrpSpPr/>
+        <p:nvPr/>
+      </p:nvGrpSpPr>
+      <p:grpSpPr>
+        <a:xfrm>
+          <a:off x="0" y="0"/>
+          <a:ext cx="0" cy="0"/>
+          <a:chOff x="0" y="0"/>
+          <a:chExt cx="0" cy="0"/>
+        </a:xfrm>
+      </p:grpSpPr>
+      <p:sp>
+        <p:nvSpPr>
+          <p:cNvPr id="2" name="标题 1">
+            <a:extLst>
+              <a:ext uri="{FF2B5EF4-FFF2-40B4-BE49-F238E27FC236}">
+                <a16:creationId xmlns:a16="http://schemas.microsoft.com/office/drawing/2014/main" id="{33C18581-937C-455D-98BA-DB766EF6F162}"/>
+              </a:ext>
+            </a:extLst>
+          </p:cNvPr>
+          <p:cNvSpPr>
+            <a:spLocks noGrp="1"/>
+          </p:cNvSpPr>
+          <p:nvPr>
+            <p:ph type="title"/>
+          </p:nvPr>
+        </p:nvSpPr>
+        <p:spPr/>
+        <p:txBody>
+          <a:bodyPr/>
+          <a:lstStyle/>
+          <a:p>
+            <a:r>
+              <a:rPr lang="en-US" altLang="zh-CN" dirty="0"/>
+              <a:t>Finally</a:t>
+            </a:r>
+            <a:endParaRPr lang="zh-CN" altLang="en-US" dirty="0"/>
+          </a:p>
+        </p:txBody>
+      </p:sp>
+      <p:sp>
+        <p:nvSpPr>
+          <p:cNvPr id="3" name="内容占位符 2">
+            <a:extLst>
+              <a:ext uri="{FF2B5EF4-FFF2-40B4-BE49-F238E27FC236}">
+                <a16:creationId xmlns:a16="http://schemas.microsoft.com/office/drawing/2014/main" id="{641FF198-2FDA-4C04-932A-0ED9E05D4855}"/>
+              </a:ext>
+            </a:extLst>
+          </p:cNvPr>
+          <p:cNvSpPr>
+            <a:spLocks noGrp="1"/>
+          </p:cNvSpPr>
+          <p:nvPr>
+            <p:ph idx="1"/>
+          </p:nvPr>
+        </p:nvSpPr>
+        <p:spPr>
+          <a:xfrm>
+            <a:off x="838200" y="1929320"/>
+            <a:ext cx="10515600" cy="4351338"/>
+          </a:xfrm>
+        </p:spPr>
+        <p:txBody>
+          <a:bodyPr>
+            <a:normAutofit lnSpcReduction="10000"/>
+          </a:bodyPr>
+          <a:lstStyle/>
+          <a:p>
+            <a:r>
+              <a:rPr lang="en-US" altLang="zh-CN" dirty="0"/>
+              <a:t>The knowledge system is not achieved overnight. Like learning knowledge, it needs constantly iterate</a:t>
+            </a:r>
+            <a:r>
+              <a:rPr lang="en-US" altLang="zh-CN" b="0" i="0" dirty="0">
+                <a:solidFill>
+                  <a:srgbClr val="333333"/>
+                </a:solidFill>
+                <a:effectLst/>
+                <a:latin typeface="Arial" panose="020B0604020202020204" pitchFamily="34" charset="0"/>
+              </a:rPr>
+              <a:t> </a:t>
+            </a:r>
+            <a:r>
+              <a:rPr lang="en-US" altLang="zh-CN" dirty="0"/>
+              <a:t>. With the improvement of your knowledge, your knowledge topology is also becoming more and more </a:t>
+            </a:r>
+            <a:r>
+              <a:rPr lang="en-US" altLang="zh-CN"/>
+              <a:t>perfect.</a:t>
+            </a:r>
+            <a:endParaRPr lang="en-US" altLang="zh-CN" dirty="0"/>
+          </a:p>
+          <a:p>
+            <a:r>
+              <a:rPr lang="en-US" altLang="zh-CN" dirty="0"/>
+              <a:t>The benefit to build your topology is to avoid you to lost</a:t>
+            </a:r>
+            <a:r>
+              <a:rPr lang="zh-CN" altLang="en-US" dirty="0"/>
+              <a:t> </a:t>
+            </a:r>
+            <a:r>
+              <a:rPr lang="en-US" altLang="zh-CN" dirty="0"/>
+              <a:t>in</a:t>
+            </a:r>
+            <a:r>
+              <a:rPr lang="zh-CN" altLang="en-US" dirty="0"/>
+              <a:t> </a:t>
+            </a:r>
+            <a:r>
+              <a:rPr lang="en-US" altLang="zh-CN" dirty="0"/>
+              <a:t>the</a:t>
+            </a:r>
+            <a:r>
+              <a:rPr lang="zh-CN" altLang="en-US" dirty="0"/>
+              <a:t> </a:t>
+            </a:r>
+            <a:r>
+              <a:rPr lang="en-US" altLang="zh-CN" dirty="0"/>
+              <a:t>ocean of knowledge and</a:t>
+            </a:r>
+            <a:r>
+              <a:rPr lang="zh-CN" altLang="en-US" dirty="0"/>
+              <a:t> </a:t>
+            </a:r>
+            <a:r>
+              <a:rPr lang="en-US" altLang="zh-CN" dirty="0"/>
+              <a:t>to</a:t>
+            </a:r>
+            <a:r>
+              <a:rPr lang="zh-CN" altLang="en-US" dirty="0"/>
+              <a:t> </a:t>
+            </a:r>
+            <a:r>
+              <a:rPr lang="en-US" altLang="zh-CN" dirty="0"/>
+              <a:t>help</a:t>
+            </a:r>
+            <a:r>
+              <a:rPr lang="zh-CN" altLang="en-US" dirty="0"/>
+              <a:t> </a:t>
+            </a:r>
+            <a:r>
+              <a:rPr lang="en-US" altLang="zh-CN" dirty="0"/>
+              <a:t>you to </a:t>
+            </a:r>
+          </a:p>
+          <a:p>
+            <a:r>
+              <a:rPr lang="en-US" altLang="zh-CN" dirty="0"/>
+              <a:t>Establishing your own knowledge system can completely know what problems your knowledge solves and what is the correlation between the current knowledge point and other contents</a:t>
+            </a:r>
+            <a:r>
+              <a:rPr lang="en-US" altLang="zh-CN" b="0" i="0" dirty="0">
+                <a:solidFill>
+                  <a:srgbClr val="333333"/>
+                </a:solidFill>
+                <a:effectLst/>
+                <a:latin typeface="Arial" panose="020B0604020202020204" pitchFamily="34" charset="0"/>
+              </a:rPr>
+              <a:t>	straddled the divide between thinking and doing[</a:t>
+            </a:r>
+            <a:r>
+              <a:rPr lang="zh-CN" altLang="en-US" dirty="0">
+                <a:solidFill>
+                  <a:srgbClr val="333333"/>
+                </a:solidFill>
+                <a:latin typeface="Arial" panose="020B0604020202020204" pitchFamily="34" charset="0"/>
+              </a:rPr>
+              <a:t>希望大家可以做到知行合一，大家加油共勉</a:t>
+            </a:r>
+            <a:r>
+              <a:rPr lang="en-US" altLang="zh-CN" b="0" i="0" dirty="0">
+                <a:solidFill>
+                  <a:srgbClr val="333333"/>
+                </a:solidFill>
+                <a:effectLst/>
+                <a:latin typeface="Arial" panose="020B0604020202020204" pitchFamily="34" charset="0"/>
+              </a:rPr>
+              <a:t>].</a:t>
+            </a:r>
+            <a:endParaRPr lang="en-US" altLang="zh-CN" dirty="0"/>
+          </a:p>
+        </p:txBody>
+      </p:sp>
+    </p:spTree>
+    <p:extLst>
+      <p:ext uri="{BB962C8B-B14F-4D97-AF65-F5344CB8AC3E}">
+        <p14:creationId xmlns:p14="http://schemas.microsoft.com/office/powerpoint/2010/main" val="3209688045"/>
       </p:ext>
     </p:extLst>
   </p:cSld>

</xml_diff>

<commit_message>
add ppt and excel
</commit_message>
<xml_diff>
--- a/New Microsoft PowerPoint 演示文稿.pptx
+++ b/New Microsoft PowerPoint 演示文稿.pptx
@@ -5,16 +5,21 @@
     <p:sldMasterId id="2147483648" r:id="rId1"/>
   </p:sldMasterIdLst>
   <p:notesMasterIdLst>
-    <p:notesMasterId r:id="rId9"/>
+    <p:notesMasterId r:id="rId14"/>
   </p:notesMasterIdLst>
   <p:sldIdLst>
     <p:sldId id="256" r:id="rId2"/>
-    <p:sldId id="257" r:id="rId3"/>
-    <p:sldId id="259" r:id="rId4"/>
-    <p:sldId id="260" r:id="rId5"/>
-    <p:sldId id="258" r:id="rId6"/>
-    <p:sldId id="261" r:id="rId7"/>
-    <p:sldId id="262" r:id="rId8"/>
+    <p:sldId id="263" r:id="rId3"/>
+    <p:sldId id="257" r:id="rId4"/>
+    <p:sldId id="259" r:id="rId5"/>
+    <p:sldId id="264" r:id="rId6"/>
+    <p:sldId id="260" r:id="rId7"/>
+    <p:sldId id="258" r:id="rId8"/>
+    <p:sldId id="261" r:id="rId9"/>
+    <p:sldId id="265" r:id="rId10"/>
+    <p:sldId id="266" r:id="rId11"/>
+    <p:sldId id="267" r:id="rId12"/>
+    <p:sldId id="262" r:id="rId13"/>
   </p:sldIdLst>
   <p:sldSz cx="12192000" cy="6858000"/>
   <p:notesSz cx="6858000" cy="9144000"/>
@@ -203,7 +208,7 @@
           <a:p>
             <a:fld id="{3967205C-D0A7-4EE7-8088-A62A068C25BE}" type="datetimeFigureOut">
               <a:rPr lang="zh-CN" altLang="en-US" smtClean="0"/>
-              <a:t>2021/8/31</a:t>
+              <a:t>2021/9/1</a:t>
             </a:fld>
             <a:endParaRPr lang="zh-CN" altLang="en-US"/>
           </a:p>
@@ -554,6 +559,321 @@
 </p:notes>
 </file>
 
+<file path=ppt/notesSlides/notesSlide10.xml><?xml version="1.0" encoding="utf-8"?>
+<p:notes xmlns:a="http://schemas.openxmlformats.org/drawingml/2006/main" xmlns:r="http://schemas.openxmlformats.org/officeDocument/2006/relationships" xmlns:p="http://schemas.openxmlformats.org/presentationml/2006/main">
+  <p:cSld>
+    <p:spTree>
+      <p:nvGrpSpPr>
+        <p:cNvPr id="1" name=""/>
+        <p:cNvGrpSpPr/>
+        <p:nvPr/>
+      </p:nvGrpSpPr>
+      <p:grpSpPr>
+        <a:xfrm>
+          <a:off x="0" y="0"/>
+          <a:ext cx="0" cy="0"/>
+          <a:chOff x="0" y="0"/>
+          <a:chExt cx="0" cy="0"/>
+        </a:xfrm>
+      </p:grpSpPr>
+      <p:sp>
+        <p:nvSpPr>
+          <p:cNvPr id="2" name="幻灯片图像占位符 1"/>
+          <p:cNvSpPr>
+            <a:spLocks noGrp="1" noRot="1" noChangeAspect="1"/>
+          </p:cNvSpPr>
+          <p:nvPr>
+            <p:ph type="sldImg"/>
+          </p:nvPr>
+        </p:nvSpPr>
+        <p:spPr/>
+      </p:sp>
+      <p:sp>
+        <p:nvSpPr>
+          <p:cNvPr id="3" name="备注占位符 2"/>
+          <p:cNvSpPr>
+            <a:spLocks noGrp="1"/>
+          </p:cNvSpPr>
+          <p:nvPr>
+            <p:ph type="body" idx="1"/>
+          </p:nvPr>
+        </p:nvSpPr>
+        <p:spPr/>
+        <p:txBody>
+          <a:bodyPr/>
+          <a:lstStyle/>
+          <a:p>
+            <a:endParaRPr lang="zh-CN" altLang="en-US" dirty="0"/>
+          </a:p>
+        </p:txBody>
+      </p:sp>
+      <p:sp>
+        <p:nvSpPr>
+          <p:cNvPr id="4" name="灯片编号占位符 3"/>
+          <p:cNvSpPr>
+            <a:spLocks noGrp="1"/>
+          </p:cNvSpPr>
+          <p:nvPr>
+            <p:ph type="sldNum" sz="quarter" idx="5"/>
+          </p:nvPr>
+        </p:nvSpPr>
+        <p:spPr/>
+        <p:txBody>
+          <a:bodyPr/>
+          <a:lstStyle/>
+          <a:p>
+            <a:fld id="{B57FF0B7-D083-428F-8372-C433786CBC81}" type="slidenum">
+              <a:rPr lang="zh-CN" altLang="en-US" smtClean="0"/>
+              <a:t>10</a:t>
+            </a:fld>
+            <a:endParaRPr lang="zh-CN" altLang="en-US"/>
+          </a:p>
+        </p:txBody>
+      </p:sp>
+    </p:spTree>
+    <p:extLst>
+      <p:ext uri="{BB962C8B-B14F-4D97-AF65-F5344CB8AC3E}">
+        <p14:creationId xmlns:p14="http://schemas.microsoft.com/office/powerpoint/2010/main" val="2325824364"/>
+      </p:ext>
+    </p:extLst>
+  </p:cSld>
+  <p:clrMapOvr>
+    <a:masterClrMapping/>
+  </p:clrMapOvr>
+</p:notes>
+</file>
+
+<file path=ppt/notesSlides/notesSlide11.xml><?xml version="1.0" encoding="utf-8"?>
+<p:notes xmlns:a="http://schemas.openxmlformats.org/drawingml/2006/main" xmlns:r="http://schemas.openxmlformats.org/officeDocument/2006/relationships" xmlns:p="http://schemas.openxmlformats.org/presentationml/2006/main">
+  <p:cSld>
+    <p:spTree>
+      <p:nvGrpSpPr>
+        <p:cNvPr id="1" name=""/>
+        <p:cNvGrpSpPr/>
+        <p:nvPr/>
+      </p:nvGrpSpPr>
+      <p:grpSpPr>
+        <a:xfrm>
+          <a:off x="0" y="0"/>
+          <a:ext cx="0" cy="0"/>
+          <a:chOff x="0" y="0"/>
+          <a:chExt cx="0" cy="0"/>
+        </a:xfrm>
+      </p:grpSpPr>
+      <p:sp>
+        <p:nvSpPr>
+          <p:cNvPr id="2" name="幻灯片图像占位符 1"/>
+          <p:cNvSpPr>
+            <a:spLocks noGrp="1" noRot="1" noChangeAspect="1"/>
+          </p:cNvSpPr>
+          <p:nvPr>
+            <p:ph type="sldImg"/>
+          </p:nvPr>
+        </p:nvSpPr>
+        <p:spPr/>
+      </p:sp>
+      <p:sp>
+        <p:nvSpPr>
+          <p:cNvPr id="3" name="备注占位符 2"/>
+          <p:cNvSpPr>
+            <a:spLocks noGrp="1"/>
+          </p:cNvSpPr>
+          <p:nvPr>
+            <p:ph type="body" idx="1"/>
+          </p:nvPr>
+        </p:nvSpPr>
+        <p:spPr/>
+        <p:txBody>
+          <a:bodyPr/>
+          <a:lstStyle/>
+          <a:p>
+            <a:r>
+              <a:rPr lang="en-US" altLang="zh-CN" dirty="0"/>
+              <a:t>Here you can see the </a:t>
+            </a:r>
+            <a:r>
+              <a:rPr lang="en-US" altLang="zh-CN" dirty="0" err="1"/>
+              <a:t>Mysql</a:t>
+            </a:r>
+            <a:r>
+              <a:rPr lang="en-US" altLang="zh-CN" dirty="0"/>
+              <a:t> DB is in the two </a:t>
+            </a:r>
+          </a:p>
+          <a:p>
+            <a:endParaRPr lang="en-US" altLang="zh-CN" dirty="0"/>
+          </a:p>
+          <a:p>
+            <a:r>
+              <a:rPr lang="zh-CN" altLang="en-US" dirty="0"/>
+              <a:t>后面做架构设计的时候，也可以根据系统的难点和复杂度来分析，根据对比来进行选型</a:t>
+            </a:r>
+            <a:endParaRPr lang="en-US" altLang="zh-CN" dirty="0"/>
+          </a:p>
+          <a:p>
+            <a:endParaRPr lang="zh-CN" altLang="en-US" dirty="0"/>
+          </a:p>
+        </p:txBody>
+      </p:sp>
+      <p:sp>
+        <p:nvSpPr>
+          <p:cNvPr id="4" name="灯片编号占位符 3"/>
+          <p:cNvSpPr>
+            <a:spLocks noGrp="1"/>
+          </p:cNvSpPr>
+          <p:nvPr>
+            <p:ph type="sldNum" sz="quarter" idx="5"/>
+          </p:nvPr>
+        </p:nvSpPr>
+        <p:spPr/>
+        <p:txBody>
+          <a:bodyPr/>
+          <a:lstStyle/>
+          <a:p>
+            <a:fld id="{B57FF0B7-D083-428F-8372-C433786CBC81}" type="slidenum">
+              <a:rPr lang="zh-CN" altLang="en-US" smtClean="0"/>
+              <a:t>11</a:t>
+            </a:fld>
+            <a:endParaRPr lang="zh-CN" altLang="en-US"/>
+          </a:p>
+        </p:txBody>
+      </p:sp>
+    </p:spTree>
+    <p:extLst>
+      <p:ext uri="{BB962C8B-B14F-4D97-AF65-F5344CB8AC3E}">
+        <p14:creationId xmlns:p14="http://schemas.microsoft.com/office/powerpoint/2010/main" val="3782105449"/>
+      </p:ext>
+    </p:extLst>
+  </p:cSld>
+  <p:clrMapOvr>
+    <a:masterClrMapping/>
+  </p:clrMapOvr>
+</p:notes>
+</file>
+
+<file path=ppt/notesSlides/notesSlide12.xml><?xml version="1.0" encoding="utf-8"?>
+<p:notes xmlns:a="http://schemas.openxmlformats.org/drawingml/2006/main" xmlns:r="http://schemas.openxmlformats.org/officeDocument/2006/relationships" xmlns:p="http://schemas.openxmlformats.org/presentationml/2006/main">
+  <p:cSld>
+    <p:spTree>
+      <p:nvGrpSpPr>
+        <p:cNvPr id="1" name=""/>
+        <p:cNvGrpSpPr/>
+        <p:nvPr/>
+      </p:nvGrpSpPr>
+      <p:grpSpPr>
+        <a:xfrm>
+          <a:off x="0" y="0"/>
+          <a:ext cx="0" cy="0"/>
+          <a:chOff x="0" y="0"/>
+          <a:chExt cx="0" cy="0"/>
+        </a:xfrm>
+      </p:grpSpPr>
+      <p:sp>
+        <p:nvSpPr>
+          <p:cNvPr id="2" name="幻灯片图像占位符 1"/>
+          <p:cNvSpPr>
+            <a:spLocks noGrp="1" noRot="1" noChangeAspect="1"/>
+          </p:cNvSpPr>
+          <p:nvPr>
+            <p:ph type="sldImg"/>
+          </p:nvPr>
+        </p:nvSpPr>
+        <p:spPr/>
+      </p:sp>
+      <p:sp>
+        <p:nvSpPr>
+          <p:cNvPr id="3" name="备注占位符 2"/>
+          <p:cNvSpPr>
+            <a:spLocks noGrp="1"/>
+          </p:cNvSpPr>
+          <p:nvPr>
+            <p:ph type="body" idx="1"/>
+          </p:nvPr>
+        </p:nvSpPr>
+        <p:spPr/>
+        <p:txBody>
+          <a:bodyPr/>
+          <a:lstStyle/>
+          <a:p>
+            <a:r>
+              <a:rPr lang="zh-CN" altLang="en-US" dirty="0"/>
+              <a:t>知识体系不是一蹴而就的，和学习知识一样是需要不断迭代，随着你的知识的完善，你的知识的体系也是也越来完善的</a:t>
+            </a:r>
+            <a:endParaRPr lang="en-US" altLang="zh-CN" dirty="0"/>
+          </a:p>
+          <a:p>
+            <a:endParaRPr lang="en-US" altLang="zh-CN" dirty="0"/>
+          </a:p>
+          <a:p>
+            <a:r>
+              <a:rPr lang="zh-CN" altLang="en-US" dirty="0">
+                <a:solidFill>
+                  <a:srgbClr val="FF0000"/>
+                </a:solidFill>
+              </a:rPr>
+              <a:t>建立自己的知识体系可以完整的知道自己的这个知识是解决的什么问题，现在的这个知识点和其他的内容的相关性是什么</a:t>
+            </a:r>
+            <a:endParaRPr lang="en-US" altLang="zh-CN" dirty="0">
+              <a:solidFill>
+                <a:srgbClr val="FF0000"/>
+              </a:solidFill>
+            </a:endParaRPr>
+          </a:p>
+          <a:p>
+            <a:r>
+              <a:rPr lang="zh-CN" altLang="en-US" dirty="0"/>
+              <a:t>世界上平凡的工作太多了，知识点也太多了，很多的时候都是自己学习了都不会用，浪费了大量的时间，没有办法做到知行合一</a:t>
+            </a:r>
+            <a:endParaRPr lang="en-US" altLang="zh-CN" dirty="0"/>
+          </a:p>
+          <a:p>
+            <a:r>
+              <a:rPr lang="zh-CN" altLang="en-US" dirty="0"/>
+              <a:t>大家加油</a:t>
+            </a:r>
+            <a:endParaRPr lang="en-US" altLang="zh-CN" dirty="0"/>
+          </a:p>
+          <a:p>
+            <a:endParaRPr lang="zh-CN" altLang="en-US" dirty="0"/>
+          </a:p>
+        </p:txBody>
+      </p:sp>
+      <p:sp>
+        <p:nvSpPr>
+          <p:cNvPr id="4" name="灯片编号占位符 3"/>
+          <p:cNvSpPr>
+            <a:spLocks noGrp="1"/>
+          </p:cNvSpPr>
+          <p:nvPr>
+            <p:ph type="sldNum" sz="quarter" idx="5"/>
+          </p:nvPr>
+        </p:nvSpPr>
+        <p:spPr/>
+        <p:txBody>
+          <a:bodyPr/>
+          <a:lstStyle/>
+          <a:p>
+            <a:fld id="{B57FF0B7-D083-428F-8372-C433786CBC81}" type="slidenum">
+              <a:rPr lang="zh-CN" altLang="en-US" smtClean="0"/>
+              <a:t>12</a:t>
+            </a:fld>
+            <a:endParaRPr lang="zh-CN" altLang="en-US"/>
+          </a:p>
+        </p:txBody>
+      </p:sp>
+    </p:spTree>
+    <p:extLst>
+      <p:ext uri="{BB962C8B-B14F-4D97-AF65-F5344CB8AC3E}">
+        <p14:creationId xmlns:p14="http://schemas.microsoft.com/office/powerpoint/2010/main" val="815564391"/>
+      </p:ext>
+    </p:extLst>
+  </p:cSld>
+  <p:clrMapOvr>
+    <a:masterClrMapping/>
+  </p:clrMapOvr>
+</p:notes>
+</file>
+
 <file path=ppt/notesSlides/notesSlide2.xml><?xml version="1.0" encoding="utf-8"?>
 <p:notes xmlns:a="http://schemas.openxmlformats.org/drawingml/2006/main" xmlns:r="http://schemas.openxmlformats.org/officeDocument/2006/relationships" xmlns:p="http://schemas.openxmlformats.org/presentationml/2006/main">
   <p:cSld>
@@ -598,28 +918,6 @@
           <a:bodyPr/>
           <a:lstStyle/>
           <a:p>
-            <a:r>
-              <a:rPr lang="en-US" altLang="zh-CN" dirty="0"/>
-              <a:t>The data not only the binary data can be anything</a:t>
-            </a:r>
-          </a:p>
-          <a:p>
-            <a:endParaRPr lang="en-US" altLang="zh-CN" dirty="0"/>
-          </a:p>
-          <a:p>
-            <a:r>
-              <a:rPr lang="en-US" altLang="zh-CN" dirty="0"/>
-              <a:t>For example there is only a data set without any related information . So it is just a data set, it does not make any sense</a:t>
-            </a:r>
-          </a:p>
-          <a:p>
-            <a:endParaRPr lang="en-US" altLang="zh-CN" dirty="0"/>
-          </a:p>
-          <a:p>
-            <a:r>
-              <a:rPr lang="en-US" altLang="zh-CN" dirty="0"/>
-              <a:t>If </a:t>
-            </a:r>
             <a:endParaRPr lang="zh-CN" altLang="en-US" dirty="0"/>
           </a:p>
         </p:txBody>
@@ -650,7 +948,7 @@
     </p:spTree>
     <p:extLst>
       <p:ext uri="{BB962C8B-B14F-4D97-AF65-F5344CB8AC3E}">
-        <p14:creationId xmlns:p14="http://schemas.microsoft.com/office/powerpoint/2010/main" val="16337719"/>
+        <p14:creationId xmlns:p14="http://schemas.microsoft.com/office/powerpoint/2010/main" val="272571569"/>
       </p:ext>
     </p:extLst>
   </p:cSld>
@@ -704,6 +1002,28 @@
           <a:bodyPr/>
           <a:lstStyle/>
           <a:p>
+            <a:r>
+              <a:rPr lang="en-US" altLang="zh-CN" dirty="0"/>
+              <a:t>The data not only the binary data can be anything</a:t>
+            </a:r>
+          </a:p>
+          <a:p>
+            <a:endParaRPr lang="en-US" altLang="zh-CN" dirty="0"/>
+          </a:p>
+          <a:p>
+            <a:r>
+              <a:rPr lang="en-US" altLang="zh-CN" dirty="0"/>
+              <a:t>For example there is only a data set without any related information . So it is just a data set, it does not make any sense</a:t>
+            </a:r>
+          </a:p>
+          <a:p>
+            <a:endParaRPr lang="en-US" altLang="zh-CN" dirty="0"/>
+          </a:p>
+          <a:p>
+            <a:r>
+              <a:rPr lang="en-US" altLang="zh-CN" dirty="0"/>
+              <a:t>If </a:t>
+            </a:r>
             <a:endParaRPr lang="zh-CN" altLang="en-US" dirty="0"/>
           </a:p>
         </p:txBody>
@@ -734,7 +1054,7 @@
     </p:spTree>
     <p:extLst>
       <p:ext uri="{BB962C8B-B14F-4D97-AF65-F5344CB8AC3E}">
-        <p14:creationId xmlns:p14="http://schemas.microsoft.com/office/powerpoint/2010/main" val="802465337"/>
+        <p14:creationId xmlns:p14="http://schemas.microsoft.com/office/powerpoint/2010/main" val="16337719"/>
       </p:ext>
     </p:extLst>
   </p:cSld>
@@ -818,7 +1138,7 @@
     </p:spTree>
     <p:extLst>
       <p:ext uri="{BB962C8B-B14F-4D97-AF65-F5344CB8AC3E}">
-        <p14:creationId xmlns:p14="http://schemas.microsoft.com/office/powerpoint/2010/main" val="4004407906"/>
+        <p14:creationId xmlns:p14="http://schemas.microsoft.com/office/powerpoint/2010/main" val="802465337"/>
       </p:ext>
     </p:extLst>
   </p:cSld>
@@ -872,23 +1192,6 @@
           <a:bodyPr/>
           <a:lstStyle/>
           <a:p>
-            <a:r>
-              <a:rPr lang="en-US" altLang="zh-CN" dirty="0"/>
-              <a:t>Firstly I need to declare a point of view that, </a:t>
-            </a:r>
-          </a:p>
-          <a:p>
-            <a:r>
-              <a:rPr lang="zh-CN" altLang="en-US" dirty="0"/>
-              <a:t>一个知识体系，如果想要发扬光大，源远流长的话，那么就需要有人教，需要有教程 </a:t>
-            </a:r>
-            <a:r>
-              <a:rPr lang="en-US" altLang="zh-CN" dirty="0" err="1"/>
-              <a:t>couse</a:t>
-            </a:r>
-            <a:endParaRPr lang="en-US" altLang="zh-CN" dirty="0"/>
-          </a:p>
-          <a:p>
             <a:endParaRPr lang="zh-CN" altLang="en-US" dirty="0"/>
           </a:p>
         </p:txBody>
@@ -919,7 +1222,7 @@
     </p:spTree>
     <p:extLst>
       <p:ext uri="{BB962C8B-B14F-4D97-AF65-F5344CB8AC3E}">
-        <p14:creationId xmlns:p14="http://schemas.microsoft.com/office/powerpoint/2010/main" val="137449562"/>
+        <p14:creationId xmlns:p14="http://schemas.microsoft.com/office/powerpoint/2010/main" val="2522278016"/>
       </p:ext>
     </p:extLst>
   </p:cSld>
@@ -1003,7 +1306,7 @@
     </p:spTree>
     <p:extLst>
       <p:ext uri="{BB962C8B-B14F-4D97-AF65-F5344CB8AC3E}">
-        <p14:creationId xmlns:p14="http://schemas.microsoft.com/office/powerpoint/2010/main" val="660374730"/>
+        <p14:creationId xmlns:p14="http://schemas.microsoft.com/office/powerpoint/2010/main" val="4004407906"/>
       </p:ext>
     </p:extLst>
   </p:cSld>
@@ -1058,40 +1361,18 @@
           <a:lstStyle/>
           <a:p>
             <a:r>
+              <a:rPr lang="en-US" altLang="zh-CN" dirty="0"/>
+              <a:t>Firstly I need to declare a point of view that, </a:t>
+            </a:r>
+          </a:p>
+          <a:p>
+            <a:r>
               <a:rPr lang="zh-CN" altLang="en-US" dirty="0"/>
-              <a:t>知识体系不是一蹴而就的，和学习知识一样是需要不断迭代，随着你的知识的完善，你的知识的体系也是也越来完善的</a:t>
-            </a:r>
-            <a:endParaRPr lang="en-US" altLang="zh-CN" dirty="0"/>
-          </a:p>
-          <a:p>
-            <a:endParaRPr lang="en-US" altLang="zh-CN" dirty="0"/>
-          </a:p>
-          <a:p>
-            <a:r>
-              <a:rPr lang="zh-CN" altLang="en-US" dirty="0">
-                <a:solidFill>
-                  <a:srgbClr val="FF0000"/>
-                </a:solidFill>
-              </a:rPr>
-              <a:t>建立自己的知识体系可以完整的知道自己的这个知识是解决的什么问题，现在的这个知识点和其他的内容的相关性是什么</a:t>
-            </a:r>
-            <a:endParaRPr lang="en-US" altLang="zh-CN" dirty="0">
-              <a:solidFill>
-                <a:srgbClr val="FF0000"/>
-              </a:solidFill>
-            </a:endParaRPr>
-          </a:p>
-          <a:p>
-            <a:r>
-              <a:rPr lang="zh-CN" altLang="en-US" dirty="0"/>
-              <a:t>世界上平凡的工作太多了，知识点也太多了，很多的时候都是自己学习了都不会用，浪费了大量的时间，没有办法做到知行合一</a:t>
-            </a:r>
-            <a:endParaRPr lang="en-US" altLang="zh-CN" dirty="0"/>
-          </a:p>
-          <a:p>
-            <a:r>
-              <a:rPr lang="zh-CN" altLang="en-US" dirty="0"/>
-              <a:t>大家加油</a:t>
+              <a:t>一个知识体系，如果想要发扬光大，源远流长的话，那么就需要有人教，需要有教程 </a:t>
+            </a:r>
+            <a:r>
+              <a:rPr lang="en-US" altLang="zh-CN" dirty="0" err="1"/>
+              <a:t>couse</a:t>
             </a:r>
             <a:endParaRPr lang="en-US" altLang="zh-CN" dirty="0"/>
           </a:p>
@@ -1126,7 +1407,199 @@
     </p:spTree>
     <p:extLst>
       <p:ext uri="{BB962C8B-B14F-4D97-AF65-F5344CB8AC3E}">
-        <p14:creationId xmlns:p14="http://schemas.microsoft.com/office/powerpoint/2010/main" val="815564391"/>
+        <p14:creationId xmlns:p14="http://schemas.microsoft.com/office/powerpoint/2010/main" val="137449562"/>
+      </p:ext>
+    </p:extLst>
+  </p:cSld>
+  <p:clrMapOvr>
+    <a:masterClrMapping/>
+  </p:clrMapOvr>
+</p:notes>
+</file>
+
+<file path=ppt/notesSlides/notesSlide8.xml><?xml version="1.0" encoding="utf-8"?>
+<p:notes xmlns:a="http://schemas.openxmlformats.org/drawingml/2006/main" xmlns:r="http://schemas.openxmlformats.org/officeDocument/2006/relationships" xmlns:p="http://schemas.openxmlformats.org/presentationml/2006/main">
+  <p:cSld>
+    <p:spTree>
+      <p:nvGrpSpPr>
+        <p:cNvPr id="1" name=""/>
+        <p:cNvGrpSpPr/>
+        <p:nvPr/>
+      </p:nvGrpSpPr>
+      <p:grpSpPr>
+        <a:xfrm>
+          <a:off x="0" y="0"/>
+          <a:ext cx="0" cy="0"/>
+          <a:chOff x="0" y="0"/>
+          <a:chExt cx="0" cy="0"/>
+        </a:xfrm>
+      </p:grpSpPr>
+      <p:sp>
+        <p:nvSpPr>
+          <p:cNvPr id="2" name="幻灯片图像占位符 1"/>
+          <p:cNvSpPr>
+            <a:spLocks noGrp="1" noRot="1" noChangeAspect="1"/>
+          </p:cNvSpPr>
+          <p:nvPr>
+            <p:ph type="sldImg"/>
+          </p:nvPr>
+        </p:nvSpPr>
+        <p:spPr/>
+      </p:sp>
+      <p:sp>
+        <p:nvSpPr>
+          <p:cNvPr id="3" name="备注占位符 2"/>
+          <p:cNvSpPr>
+            <a:spLocks noGrp="1"/>
+          </p:cNvSpPr>
+          <p:nvPr>
+            <p:ph type="body" idx="1"/>
+          </p:nvPr>
+        </p:nvSpPr>
+        <p:spPr/>
+        <p:txBody>
+          <a:bodyPr/>
+          <a:lstStyle/>
+          <a:p>
+            <a:pPr marL="0" marR="0" lvl="0" indent="0" algn="l" defTabSz="914400" rtl="0" eaLnBrk="1" fontAlgn="auto" latinLnBrk="0" hangingPunct="1">
+              <a:lnSpc>
+                <a:spcPct val="100000"/>
+              </a:lnSpc>
+              <a:spcBef>
+                <a:spcPts val="0"/>
+              </a:spcBef>
+              <a:spcAft>
+                <a:spcPts val="0"/>
+              </a:spcAft>
+              <a:buClrTx/>
+              <a:buSzTx/>
+              <a:buFontTx/>
+              <a:buNone/>
+              <a:tabLst/>
+              <a:defRPr/>
+            </a:pPr>
+            <a:r>
+              <a:rPr lang="en-US" altLang="zh-CN" dirty="0"/>
+              <a:t>The aim is to finally abstract these component as my topology.</a:t>
+            </a:r>
+            <a:endParaRPr lang="zh-CN" altLang="en-US" dirty="0"/>
+          </a:p>
+          <a:p>
+            <a:endParaRPr lang="zh-CN" altLang="en-US" dirty="0"/>
+          </a:p>
+        </p:txBody>
+      </p:sp>
+      <p:sp>
+        <p:nvSpPr>
+          <p:cNvPr id="4" name="灯片编号占位符 3"/>
+          <p:cNvSpPr>
+            <a:spLocks noGrp="1"/>
+          </p:cNvSpPr>
+          <p:nvPr>
+            <p:ph type="sldNum" sz="quarter" idx="5"/>
+          </p:nvPr>
+        </p:nvSpPr>
+        <p:spPr/>
+        <p:txBody>
+          <a:bodyPr/>
+          <a:lstStyle/>
+          <a:p>
+            <a:fld id="{B57FF0B7-D083-428F-8372-C433786CBC81}" type="slidenum">
+              <a:rPr lang="zh-CN" altLang="en-US" smtClean="0"/>
+              <a:t>8</a:t>
+            </a:fld>
+            <a:endParaRPr lang="zh-CN" altLang="en-US"/>
+          </a:p>
+        </p:txBody>
+      </p:sp>
+    </p:spTree>
+    <p:extLst>
+      <p:ext uri="{BB962C8B-B14F-4D97-AF65-F5344CB8AC3E}">
+        <p14:creationId xmlns:p14="http://schemas.microsoft.com/office/powerpoint/2010/main" val="660374730"/>
+      </p:ext>
+    </p:extLst>
+  </p:cSld>
+  <p:clrMapOvr>
+    <a:masterClrMapping/>
+  </p:clrMapOvr>
+</p:notes>
+</file>
+
+<file path=ppt/notesSlides/notesSlide9.xml><?xml version="1.0" encoding="utf-8"?>
+<p:notes xmlns:a="http://schemas.openxmlformats.org/drawingml/2006/main" xmlns:r="http://schemas.openxmlformats.org/officeDocument/2006/relationships" xmlns:p="http://schemas.openxmlformats.org/presentationml/2006/main">
+  <p:cSld>
+    <p:spTree>
+      <p:nvGrpSpPr>
+        <p:cNvPr id="1" name=""/>
+        <p:cNvGrpSpPr/>
+        <p:nvPr/>
+      </p:nvGrpSpPr>
+      <p:grpSpPr>
+        <a:xfrm>
+          <a:off x="0" y="0"/>
+          <a:ext cx="0" cy="0"/>
+          <a:chOff x="0" y="0"/>
+          <a:chExt cx="0" cy="0"/>
+        </a:xfrm>
+      </p:grpSpPr>
+      <p:sp>
+        <p:nvSpPr>
+          <p:cNvPr id="2" name="幻灯片图像占位符 1"/>
+          <p:cNvSpPr>
+            <a:spLocks noGrp="1" noRot="1" noChangeAspect="1"/>
+          </p:cNvSpPr>
+          <p:nvPr>
+            <p:ph type="sldImg"/>
+          </p:nvPr>
+        </p:nvSpPr>
+        <p:spPr/>
+      </p:sp>
+      <p:sp>
+        <p:nvSpPr>
+          <p:cNvPr id="3" name="备注占位符 2"/>
+          <p:cNvSpPr>
+            <a:spLocks noGrp="1"/>
+          </p:cNvSpPr>
+          <p:nvPr>
+            <p:ph type="body" idx="1"/>
+          </p:nvPr>
+        </p:nvSpPr>
+        <p:spPr/>
+        <p:txBody>
+          <a:bodyPr/>
+          <a:lstStyle/>
+          <a:p>
+            <a:endParaRPr lang="zh-CN" altLang="en-US" dirty="0"/>
+          </a:p>
+        </p:txBody>
+      </p:sp>
+      <p:sp>
+        <p:nvSpPr>
+          <p:cNvPr id="4" name="灯片编号占位符 3"/>
+          <p:cNvSpPr>
+            <a:spLocks noGrp="1"/>
+          </p:cNvSpPr>
+          <p:nvPr>
+            <p:ph type="sldNum" sz="quarter" idx="5"/>
+          </p:nvPr>
+        </p:nvSpPr>
+        <p:spPr/>
+        <p:txBody>
+          <a:bodyPr/>
+          <a:lstStyle/>
+          <a:p>
+            <a:fld id="{B57FF0B7-D083-428F-8372-C433786CBC81}" type="slidenum">
+              <a:rPr lang="zh-CN" altLang="en-US" smtClean="0"/>
+              <a:t>9</a:t>
+            </a:fld>
+            <a:endParaRPr lang="zh-CN" altLang="en-US"/>
+          </a:p>
+        </p:txBody>
+      </p:sp>
+    </p:spTree>
+    <p:extLst>
+      <p:ext uri="{BB962C8B-B14F-4D97-AF65-F5344CB8AC3E}">
+        <p14:creationId xmlns:p14="http://schemas.microsoft.com/office/powerpoint/2010/main" val="2322958270"/>
       </p:ext>
     </p:extLst>
   </p:cSld>
@@ -1283,7 +1756,7 @@
           <a:p>
             <a:fld id="{39F8216A-B8E0-4CA8-AF93-07138A596BEB}" type="datetimeFigureOut">
               <a:rPr lang="zh-CN" altLang="en-US" smtClean="0"/>
-              <a:t>2021/8/31</a:t>
+              <a:t>2021/9/1</a:t>
             </a:fld>
             <a:endParaRPr lang="zh-CN" altLang="en-US"/>
           </a:p>
@@ -1481,7 +1954,7 @@
           <a:p>
             <a:fld id="{39F8216A-B8E0-4CA8-AF93-07138A596BEB}" type="datetimeFigureOut">
               <a:rPr lang="zh-CN" altLang="en-US" smtClean="0"/>
-              <a:t>2021/8/31</a:t>
+              <a:t>2021/9/1</a:t>
             </a:fld>
             <a:endParaRPr lang="zh-CN" altLang="en-US"/>
           </a:p>
@@ -1689,7 +2162,7 @@
           <a:p>
             <a:fld id="{39F8216A-B8E0-4CA8-AF93-07138A596BEB}" type="datetimeFigureOut">
               <a:rPr lang="zh-CN" altLang="en-US" smtClean="0"/>
-              <a:t>2021/8/31</a:t>
+              <a:t>2021/9/1</a:t>
             </a:fld>
             <a:endParaRPr lang="zh-CN" altLang="en-US"/>
           </a:p>
@@ -1887,7 +2360,7 @@
           <a:p>
             <a:fld id="{39F8216A-B8E0-4CA8-AF93-07138A596BEB}" type="datetimeFigureOut">
               <a:rPr lang="zh-CN" altLang="en-US" smtClean="0"/>
-              <a:t>2021/8/31</a:t>
+              <a:t>2021/9/1</a:t>
             </a:fld>
             <a:endParaRPr lang="zh-CN" altLang="en-US"/>
           </a:p>
@@ -2162,7 +2635,7 @@
           <a:p>
             <a:fld id="{39F8216A-B8E0-4CA8-AF93-07138A596BEB}" type="datetimeFigureOut">
               <a:rPr lang="zh-CN" altLang="en-US" smtClean="0"/>
-              <a:t>2021/8/31</a:t>
+              <a:t>2021/9/1</a:t>
             </a:fld>
             <a:endParaRPr lang="zh-CN" altLang="en-US"/>
           </a:p>
@@ -2427,7 +2900,7 @@
           <a:p>
             <a:fld id="{39F8216A-B8E0-4CA8-AF93-07138A596BEB}" type="datetimeFigureOut">
               <a:rPr lang="zh-CN" altLang="en-US" smtClean="0"/>
-              <a:t>2021/8/31</a:t>
+              <a:t>2021/9/1</a:t>
             </a:fld>
             <a:endParaRPr lang="zh-CN" altLang="en-US"/>
           </a:p>
@@ -2839,7 +3312,7 @@
           <a:p>
             <a:fld id="{39F8216A-B8E0-4CA8-AF93-07138A596BEB}" type="datetimeFigureOut">
               <a:rPr lang="zh-CN" altLang="en-US" smtClean="0"/>
-              <a:t>2021/8/31</a:t>
+              <a:t>2021/9/1</a:t>
             </a:fld>
             <a:endParaRPr lang="zh-CN" altLang="en-US"/>
           </a:p>
@@ -2980,7 +3453,7 @@
           <a:p>
             <a:fld id="{39F8216A-B8E0-4CA8-AF93-07138A596BEB}" type="datetimeFigureOut">
               <a:rPr lang="zh-CN" altLang="en-US" smtClean="0"/>
-              <a:t>2021/8/31</a:t>
+              <a:t>2021/9/1</a:t>
             </a:fld>
             <a:endParaRPr lang="zh-CN" altLang="en-US"/>
           </a:p>
@@ -3093,7 +3566,7 @@
           <a:p>
             <a:fld id="{39F8216A-B8E0-4CA8-AF93-07138A596BEB}" type="datetimeFigureOut">
               <a:rPr lang="zh-CN" altLang="en-US" smtClean="0"/>
-              <a:t>2021/8/31</a:t>
+              <a:t>2021/9/1</a:t>
             </a:fld>
             <a:endParaRPr lang="zh-CN" altLang="en-US"/>
           </a:p>
@@ -3404,7 +3877,7 @@
           <a:p>
             <a:fld id="{39F8216A-B8E0-4CA8-AF93-07138A596BEB}" type="datetimeFigureOut">
               <a:rPr lang="zh-CN" altLang="en-US" smtClean="0"/>
-              <a:t>2021/8/31</a:t>
+              <a:t>2021/9/1</a:t>
             </a:fld>
             <a:endParaRPr lang="zh-CN" altLang="en-US"/>
           </a:p>
@@ -3692,7 +4165,7 @@
           <a:p>
             <a:fld id="{39F8216A-B8E0-4CA8-AF93-07138A596BEB}" type="datetimeFigureOut">
               <a:rPr lang="zh-CN" altLang="en-US" smtClean="0"/>
-              <a:t>2021/8/31</a:t>
+              <a:t>2021/9/1</a:t>
             </a:fld>
             <a:endParaRPr lang="zh-CN" altLang="en-US"/>
           </a:p>
@@ -3933,7 +4406,7 @@
           <a:p>
             <a:fld id="{39F8216A-B8E0-4CA8-AF93-07138A596BEB}" type="datetimeFigureOut">
               <a:rPr lang="zh-CN" altLang="en-US" smtClean="0"/>
-              <a:t>2021/8/31</a:t>
+              <a:t>2021/9/1</a:t>
             </a:fld>
             <a:endParaRPr lang="zh-CN" altLang="en-US"/>
           </a:p>
@@ -4438,7 +4911,533 @@
 </p:sld>
 </file>
 
+<file path=ppt/slides/slide10.xml><?xml version="1.0" encoding="utf-8"?>
+<p:sld xmlns:a="http://schemas.openxmlformats.org/drawingml/2006/main" xmlns:r="http://schemas.openxmlformats.org/officeDocument/2006/relationships" xmlns:p="http://schemas.openxmlformats.org/presentationml/2006/main">
+  <p:cSld>
+    <p:spTree>
+      <p:nvGrpSpPr>
+        <p:cNvPr id="1" name=""/>
+        <p:cNvGrpSpPr/>
+        <p:nvPr/>
+      </p:nvGrpSpPr>
+      <p:grpSpPr>
+        <a:xfrm>
+          <a:off x="0" y="0"/>
+          <a:ext cx="0" cy="0"/>
+          <a:chOff x="0" y="0"/>
+          <a:chExt cx="0" cy="0"/>
+        </a:xfrm>
+      </p:grpSpPr>
+      <p:sp>
+        <p:nvSpPr>
+          <p:cNvPr id="2" name="标题 1">
+            <a:extLst>
+              <a:ext uri="{FF2B5EF4-FFF2-40B4-BE49-F238E27FC236}">
+                <a16:creationId xmlns:a16="http://schemas.microsoft.com/office/drawing/2014/main" id="{48F357AF-F9B1-48B2-A4B0-52C24F4602E3}"/>
+              </a:ext>
+            </a:extLst>
+          </p:cNvPr>
+          <p:cNvSpPr>
+            <a:spLocks noGrp="1"/>
+          </p:cNvSpPr>
+          <p:nvPr>
+            <p:ph type="title"/>
+          </p:nvPr>
+        </p:nvSpPr>
+        <p:spPr/>
+        <p:txBody>
+          <a:bodyPr/>
+          <a:lstStyle/>
+          <a:p>
+            <a:r>
+              <a:rPr lang="en-US" altLang="zh-CN" dirty="0"/>
+              <a:t>So I add the item in Distribute services component</a:t>
+            </a:r>
+            <a:endParaRPr lang="zh-CN" altLang="en-US" dirty="0"/>
+          </a:p>
+        </p:txBody>
+      </p:sp>
+      <p:pic>
+        <p:nvPicPr>
+          <p:cNvPr id="5" name="图片 4">
+            <a:extLst>
+              <a:ext uri="{FF2B5EF4-FFF2-40B4-BE49-F238E27FC236}">
+                <a16:creationId xmlns:a16="http://schemas.microsoft.com/office/drawing/2014/main" id="{ABD8A813-31E5-44D7-9BBC-CC8571FFEB2B}"/>
+              </a:ext>
+            </a:extLst>
+          </p:cNvPr>
+          <p:cNvPicPr>
+            <a:picLocks noChangeAspect="1"/>
+          </p:cNvPicPr>
+          <p:nvPr/>
+        </p:nvPicPr>
+        <p:blipFill>
+          <a:blip r:embed="rId3"/>
+          <a:stretch>
+            <a:fillRect/>
+          </a:stretch>
+        </p:blipFill>
+        <p:spPr>
+          <a:xfrm>
+            <a:off x="1000607" y="2532814"/>
+            <a:ext cx="9964541" cy="2829320"/>
+          </a:xfrm>
+          <a:prstGeom prst="rect">
+            <a:avLst/>
+          </a:prstGeom>
+        </p:spPr>
+      </p:pic>
+    </p:spTree>
+    <p:extLst>
+      <p:ext uri="{BB962C8B-B14F-4D97-AF65-F5344CB8AC3E}">
+        <p14:creationId xmlns:p14="http://schemas.microsoft.com/office/powerpoint/2010/main" val="1542880581"/>
+      </p:ext>
+    </p:extLst>
+  </p:cSld>
+  <p:clrMapOvr>
+    <a:masterClrMapping/>
+  </p:clrMapOvr>
+</p:sld>
+</file>
+
+<file path=ppt/slides/slide11.xml><?xml version="1.0" encoding="utf-8"?>
+<p:sld xmlns:a="http://schemas.openxmlformats.org/drawingml/2006/main" xmlns:r="http://schemas.openxmlformats.org/officeDocument/2006/relationships" xmlns:p="http://schemas.openxmlformats.org/presentationml/2006/main">
+  <p:cSld>
+    <p:spTree>
+      <p:nvGrpSpPr>
+        <p:cNvPr id="1" name=""/>
+        <p:cNvGrpSpPr/>
+        <p:nvPr/>
+      </p:nvGrpSpPr>
+      <p:grpSpPr>
+        <a:xfrm>
+          <a:off x="0" y="0"/>
+          <a:ext cx="0" cy="0"/>
+          <a:chOff x="0" y="0"/>
+          <a:chExt cx="0" cy="0"/>
+        </a:xfrm>
+      </p:grpSpPr>
+      <p:sp>
+        <p:nvSpPr>
+          <p:cNvPr id="2" name="标题 1">
+            <a:extLst>
+              <a:ext uri="{FF2B5EF4-FFF2-40B4-BE49-F238E27FC236}">
+                <a16:creationId xmlns:a16="http://schemas.microsoft.com/office/drawing/2014/main" id="{9F1318D2-D4E2-4B5B-A323-EBADF2BB6C9A}"/>
+              </a:ext>
+            </a:extLst>
+          </p:cNvPr>
+          <p:cNvSpPr>
+            <a:spLocks noGrp="1"/>
+          </p:cNvSpPr>
+          <p:nvPr>
+            <p:ph type="title"/>
+          </p:nvPr>
+        </p:nvSpPr>
+        <p:spPr/>
+        <p:txBody>
+          <a:bodyPr/>
+          <a:lstStyle/>
+          <a:p>
+            <a:r>
+              <a:rPr lang="en-US" altLang="zh-CN" dirty="0"/>
+              <a:t>So follow these step the initial draft</a:t>
+            </a:r>
+            <a:endParaRPr lang="zh-CN" altLang="en-US" dirty="0"/>
+          </a:p>
+        </p:txBody>
+      </p:sp>
+      <p:pic>
+        <p:nvPicPr>
+          <p:cNvPr id="7" name="图片 6">
+            <a:extLst>
+              <a:ext uri="{FF2B5EF4-FFF2-40B4-BE49-F238E27FC236}">
+                <a16:creationId xmlns:a16="http://schemas.microsoft.com/office/drawing/2014/main" id="{0123DCE6-FA7D-4926-8125-DA50A4FA4D29}"/>
+              </a:ext>
+            </a:extLst>
+          </p:cNvPr>
+          <p:cNvPicPr>
+            <a:picLocks noChangeAspect="1"/>
+          </p:cNvPicPr>
+          <p:nvPr/>
+        </p:nvPicPr>
+        <p:blipFill>
+          <a:blip r:embed="rId3"/>
+          <a:stretch>
+            <a:fillRect/>
+          </a:stretch>
+        </p:blipFill>
+        <p:spPr>
+          <a:xfrm>
+            <a:off x="611956" y="1436931"/>
+            <a:ext cx="12192000" cy="4874971"/>
+          </a:xfrm>
+          <a:prstGeom prst="rect">
+            <a:avLst/>
+          </a:prstGeom>
+        </p:spPr>
+      </p:pic>
+    </p:spTree>
+    <p:extLst>
+      <p:ext uri="{BB962C8B-B14F-4D97-AF65-F5344CB8AC3E}">
+        <p14:creationId xmlns:p14="http://schemas.microsoft.com/office/powerpoint/2010/main" val="2633029594"/>
+      </p:ext>
+    </p:extLst>
+  </p:cSld>
+  <p:clrMapOvr>
+    <a:masterClrMapping/>
+  </p:clrMapOvr>
+</p:sld>
+</file>
+
+<file path=ppt/slides/slide12.xml><?xml version="1.0" encoding="utf-8"?>
+<p:sld xmlns:a="http://schemas.openxmlformats.org/drawingml/2006/main" xmlns:r="http://schemas.openxmlformats.org/officeDocument/2006/relationships" xmlns:p="http://schemas.openxmlformats.org/presentationml/2006/main">
+  <p:cSld>
+    <p:spTree>
+      <p:nvGrpSpPr>
+        <p:cNvPr id="1" name=""/>
+        <p:cNvGrpSpPr/>
+        <p:nvPr/>
+      </p:nvGrpSpPr>
+      <p:grpSpPr>
+        <a:xfrm>
+          <a:off x="0" y="0"/>
+          <a:ext cx="0" cy="0"/>
+          <a:chOff x="0" y="0"/>
+          <a:chExt cx="0" cy="0"/>
+        </a:xfrm>
+      </p:grpSpPr>
+      <p:sp>
+        <p:nvSpPr>
+          <p:cNvPr id="2" name="标题 1">
+            <a:extLst>
+              <a:ext uri="{FF2B5EF4-FFF2-40B4-BE49-F238E27FC236}">
+                <a16:creationId xmlns:a16="http://schemas.microsoft.com/office/drawing/2014/main" id="{33C18581-937C-455D-98BA-DB766EF6F162}"/>
+              </a:ext>
+            </a:extLst>
+          </p:cNvPr>
+          <p:cNvSpPr>
+            <a:spLocks noGrp="1"/>
+          </p:cNvSpPr>
+          <p:nvPr>
+            <p:ph type="title"/>
+          </p:nvPr>
+        </p:nvSpPr>
+        <p:spPr/>
+        <p:txBody>
+          <a:bodyPr/>
+          <a:lstStyle/>
+          <a:p>
+            <a:r>
+              <a:rPr lang="en-US" altLang="zh-CN" dirty="0"/>
+              <a:t>Finally</a:t>
+            </a:r>
+            <a:endParaRPr lang="zh-CN" altLang="en-US" dirty="0"/>
+          </a:p>
+        </p:txBody>
+      </p:sp>
+      <p:sp>
+        <p:nvSpPr>
+          <p:cNvPr id="3" name="内容占位符 2">
+            <a:extLst>
+              <a:ext uri="{FF2B5EF4-FFF2-40B4-BE49-F238E27FC236}">
+                <a16:creationId xmlns:a16="http://schemas.microsoft.com/office/drawing/2014/main" id="{641FF198-2FDA-4C04-932A-0ED9E05D4855}"/>
+              </a:ext>
+            </a:extLst>
+          </p:cNvPr>
+          <p:cNvSpPr>
+            <a:spLocks noGrp="1"/>
+          </p:cNvSpPr>
+          <p:nvPr>
+            <p:ph idx="1"/>
+          </p:nvPr>
+        </p:nvSpPr>
+        <p:spPr>
+          <a:xfrm>
+            <a:off x="838200" y="1929320"/>
+            <a:ext cx="10515600" cy="4351338"/>
+          </a:xfrm>
+        </p:spPr>
+        <p:txBody>
+          <a:bodyPr>
+            <a:normAutofit lnSpcReduction="10000"/>
+          </a:bodyPr>
+          <a:lstStyle/>
+          <a:p>
+            <a:r>
+              <a:rPr lang="en-US" altLang="zh-CN" dirty="0"/>
+              <a:t>The knowledge system is not achieved overnight. Like learning knowledge, it needs constantly iterate</a:t>
+            </a:r>
+            <a:r>
+              <a:rPr lang="en-US" altLang="zh-CN" b="0" i="0" dirty="0">
+                <a:solidFill>
+                  <a:srgbClr val="333333"/>
+                </a:solidFill>
+                <a:effectLst/>
+                <a:latin typeface="Arial" panose="020B0604020202020204" pitchFamily="34" charset="0"/>
+              </a:rPr>
+              <a:t> </a:t>
+            </a:r>
+            <a:r>
+              <a:rPr lang="en-US" altLang="zh-CN" dirty="0"/>
+              <a:t>. With the improvement of your knowledge, your knowledge topology is also becoming more and more perfect.</a:t>
+            </a:r>
+          </a:p>
+          <a:p>
+            <a:r>
+              <a:rPr lang="en-US" altLang="zh-CN" dirty="0"/>
+              <a:t>The benefit to build your topology is to avoid you to lost</a:t>
+            </a:r>
+            <a:r>
+              <a:rPr lang="zh-CN" altLang="en-US" dirty="0"/>
+              <a:t> </a:t>
+            </a:r>
+            <a:r>
+              <a:rPr lang="en-US" altLang="zh-CN" dirty="0"/>
+              <a:t>in</a:t>
+            </a:r>
+            <a:r>
+              <a:rPr lang="zh-CN" altLang="en-US" dirty="0"/>
+              <a:t> </a:t>
+            </a:r>
+            <a:r>
+              <a:rPr lang="en-US" altLang="zh-CN" dirty="0"/>
+              <a:t>the</a:t>
+            </a:r>
+            <a:r>
+              <a:rPr lang="zh-CN" altLang="en-US" dirty="0"/>
+              <a:t> </a:t>
+            </a:r>
+            <a:r>
+              <a:rPr lang="en-US" altLang="zh-CN" dirty="0"/>
+              <a:t>ocean of knowledge and</a:t>
+            </a:r>
+            <a:r>
+              <a:rPr lang="zh-CN" altLang="en-US" dirty="0"/>
+              <a:t> </a:t>
+            </a:r>
+            <a:r>
+              <a:rPr lang="en-US" altLang="zh-CN" dirty="0"/>
+              <a:t>to</a:t>
+            </a:r>
+            <a:r>
+              <a:rPr lang="zh-CN" altLang="en-US" dirty="0"/>
+              <a:t> </a:t>
+            </a:r>
+            <a:r>
+              <a:rPr lang="en-US" altLang="zh-CN" dirty="0"/>
+              <a:t>help</a:t>
+            </a:r>
+            <a:r>
+              <a:rPr lang="zh-CN" altLang="en-US" dirty="0"/>
+              <a:t> </a:t>
+            </a:r>
+            <a:r>
+              <a:rPr lang="en-US" altLang="zh-CN" dirty="0"/>
+              <a:t>you to </a:t>
+            </a:r>
+          </a:p>
+          <a:p>
+            <a:r>
+              <a:rPr lang="en-US" altLang="zh-CN" dirty="0"/>
+              <a:t>Establishing your own knowledge system can completely know what problems your knowledge solves and what is the correlation between the current knowledge point and other contents</a:t>
+            </a:r>
+            <a:r>
+              <a:rPr lang="en-US" altLang="zh-CN" b="0" i="0" dirty="0">
+                <a:solidFill>
+                  <a:srgbClr val="333333"/>
+                </a:solidFill>
+                <a:effectLst/>
+                <a:latin typeface="Arial" panose="020B0604020202020204" pitchFamily="34" charset="0"/>
+              </a:rPr>
+              <a:t>	straddled the divide between thinking and doing[</a:t>
+            </a:r>
+            <a:r>
+              <a:rPr lang="zh-CN" altLang="en-US" dirty="0">
+                <a:solidFill>
+                  <a:srgbClr val="333333"/>
+                </a:solidFill>
+                <a:latin typeface="Arial" panose="020B0604020202020204" pitchFamily="34" charset="0"/>
+              </a:rPr>
+              <a:t>希望大家可以做到知行合一，大家加油共勉</a:t>
+            </a:r>
+            <a:r>
+              <a:rPr lang="en-US" altLang="zh-CN" b="0" i="0" dirty="0">
+                <a:solidFill>
+                  <a:srgbClr val="333333"/>
+                </a:solidFill>
+                <a:effectLst/>
+                <a:latin typeface="Arial" panose="020B0604020202020204" pitchFamily="34" charset="0"/>
+              </a:rPr>
+              <a:t>].</a:t>
+            </a:r>
+            <a:endParaRPr lang="en-US" altLang="zh-CN" dirty="0"/>
+          </a:p>
+        </p:txBody>
+      </p:sp>
+    </p:spTree>
+    <p:extLst>
+      <p:ext uri="{BB962C8B-B14F-4D97-AF65-F5344CB8AC3E}">
+        <p14:creationId xmlns:p14="http://schemas.microsoft.com/office/powerpoint/2010/main" val="3209688045"/>
+      </p:ext>
+    </p:extLst>
+  </p:cSld>
+  <p:clrMapOvr>
+    <a:masterClrMapping/>
+  </p:clrMapOvr>
+</p:sld>
+</file>
+
 <file path=ppt/slides/slide2.xml><?xml version="1.0" encoding="utf-8"?>
+<p:sld xmlns:a="http://schemas.openxmlformats.org/drawingml/2006/main" xmlns:r="http://schemas.openxmlformats.org/officeDocument/2006/relationships" xmlns:p="http://schemas.openxmlformats.org/presentationml/2006/main">
+  <p:cSld>
+    <p:spTree>
+      <p:nvGrpSpPr>
+        <p:cNvPr id="1" name=""/>
+        <p:cNvGrpSpPr/>
+        <p:nvPr/>
+      </p:nvGrpSpPr>
+      <p:grpSpPr>
+        <a:xfrm>
+          <a:off x="0" y="0"/>
+          <a:ext cx="0" cy="0"/>
+          <a:chOff x="0" y="0"/>
+          <a:chExt cx="0" cy="0"/>
+        </a:xfrm>
+      </p:grpSpPr>
+      <p:sp>
+        <p:nvSpPr>
+          <p:cNvPr id="2" name="标题 1">
+            <a:extLst>
+              <a:ext uri="{FF2B5EF4-FFF2-40B4-BE49-F238E27FC236}">
+                <a16:creationId xmlns:a16="http://schemas.microsoft.com/office/drawing/2014/main" id="{BA35848A-C478-483D-977E-7E08FF783501}"/>
+              </a:ext>
+            </a:extLst>
+          </p:cNvPr>
+          <p:cNvSpPr>
+            <a:spLocks noGrp="1"/>
+          </p:cNvSpPr>
+          <p:nvPr>
+            <p:ph type="title"/>
+          </p:nvPr>
+        </p:nvSpPr>
+        <p:spPr/>
+        <p:txBody>
+          <a:bodyPr/>
+          <a:lstStyle/>
+          <a:p>
+            <a:r>
+              <a:rPr lang="en-US" altLang="zh-CN" dirty="0"/>
+              <a:t>One question:</a:t>
+            </a:r>
+            <a:endParaRPr lang="zh-CN" altLang="en-US" dirty="0"/>
+          </a:p>
+        </p:txBody>
+      </p:sp>
+      <p:sp>
+        <p:nvSpPr>
+          <p:cNvPr id="3" name="内容占位符 2">
+            <a:extLst>
+              <a:ext uri="{FF2B5EF4-FFF2-40B4-BE49-F238E27FC236}">
+                <a16:creationId xmlns:a16="http://schemas.microsoft.com/office/drawing/2014/main" id="{160ED185-477D-43EC-9AA6-23A22642A0FA}"/>
+              </a:ext>
+            </a:extLst>
+          </p:cNvPr>
+          <p:cNvSpPr>
+            <a:spLocks noGrp="1"/>
+          </p:cNvSpPr>
+          <p:nvPr>
+            <p:ph idx="1"/>
+          </p:nvPr>
+        </p:nvSpPr>
+        <p:spPr/>
+        <p:txBody>
+          <a:bodyPr>
+            <a:normAutofit/>
+          </a:bodyPr>
+          <a:lstStyle/>
+          <a:p>
+            <a:r>
+              <a:rPr lang="en-US" altLang="zh-CN" sz="2400" dirty="0"/>
+              <a:t>How should we learn a new knowledge.</a:t>
+            </a:r>
+          </a:p>
+          <a:p>
+            <a:pPr marL="0" indent="0">
+              <a:buNone/>
+            </a:pPr>
+            <a:r>
+              <a:rPr lang="en-US" altLang="zh-CN" sz="2400" dirty="0"/>
+              <a:t>  </a:t>
+            </a:r>
+          </a:p>
+          <a:p>
+            <a:pPr marL="0" indent="0">
+              <a:buNone/>
+            </a:pPr>
+            <a:r>
+              <a:rPr lang="en-US" altLang="zh-CN" sz="2400" dirty="0"/>
+              <a:t>  For example, now I want to learn JAVA or C++ or others.</a:t>
+            </a:r>
+          </a:p>
+          <a:p>
+            <a:pPr marL="0" indent="0">
+              <a:buNone/>
+            </a:pPr>
+            <a:r>
+              <a:rPr lang="en-US" altLang="zh-CN" sz="2400" dirty="0"/>
+              <a:t>  How should I know which skills is necessary for this programing language, and what can I do after learning this programing language.</a:t>
+            </a:r>
+          </a:p>
+          <a:p>
+            <a:pPr marL="0" indent="0">
+              <a:buNone/>
+            </a:pPr>
+            <a:r>
+              <a:rPr lang="en-US" altLang="zh-CN" sz="2400" dirty="0"/>
+              <a:t>  These things are related to build your knowledge structure.</a:t>
+            </a:r>
+          </a:p>
+          <a:p>
+            <a:pPr marL="0" indent="0">
+              <a:buNone/>
+            </a:pPr>
+            <a:r>
+              <a:rPr lang="en-US" altLang="zh-CN" sz="2400" dirty="0"/>
+              <a:t>  </a:t>
+            </a:r>
+          </a:p>
+          <a:p>
+            <a:pPr marL="0" indent="0">
+              <a:buNone/>
+            </a:pPr>
+            <a:r>
+              <a:rPr lang="en-US" altLang="zh-CN" sz="2400" dirty="0"/>
+              <a:t>next, I will show you the process about how I use the data to build my structure and in the end I will show you the benefit and the reason why we need to build the knowledge structure.</a:t>
+            </a:r>
+            <a:endParaRPr lang="zh-CN" altLang="en-US" sz="2400" dirty="0"/>
+          </a:p>
+          <a:p>
+            <a:pPr marL="0" indent="0">
+              <a:buNone/>
+            </a:pPr>
+            <a:endParaRPr lang="en-US" altLang="zh-CN" sz="2400" dirty="0"/>
+          </a:p>
+        </p:txBody>
+      </p:sp>
+    </p:spTree>
+    <p:extLst>
+      <p:ext uri="{BB962C8B-B14F-4D97-AF65-F5344CB8AC3E}">
+        <p14:creationId xmlns:p14="http://schemas.microsoft.com/office/powerpoint/2010/main" val="1470343123"/>
+      </p:ext>
+    </p:extLst>
+  </p:cSld>
+  <p:clrMapOvr>
+    <a:masterClrMapping/>
+  </p:clrMapOvr>
+</p:sld>
+</file>
+
+<file path=ppt/slides/slide3.xml><?xml version="1.0" encoding="utf-8"?>
 <p:sld xmlns:a="http://schemas.openxmlformats.org/drawingml/2006/main" xmlns:r="http://schemas.openxmlformats.org/officeDocument/2006/relationships" xmlns:p="http://schemas.openxmlformats.org/presentationml/2006/main">
   <p:cSld>
     <p:spTree>
@@ -5016,7 +6015,7 @@
 </p:sld>
 </file>
 
-<file path=ppt/slides/slide3.xml><?xml version="1.0" encoding="utf-8"?>
+<file path=ppt/slides/slide4.xml><?xml version="1.0" encoding="utf-8"?>
 <p:sld xmlns:a="http://schemas.openxmlformats.org/drawingml/2006/main" xmlns:r="http://schemas.openxmlformats.org/officeDocument/2006/relationships" xmlns:p="http://schemas.openxmlformats.org/presentationml/2006/main">
   <p:cSld>
     <p:spTree>
@@ -5124,7 +6123,19 @@
           <a:p>
             <a:r>
               <a:rPr lang="en-US" altLang="zh-CN" dirty="0"/>
-              <a:t>Soft skills and so on…</a:t>
+              <a:t>Soft skills,</a:t>
+            </a:r>
+            <a:r>
+              <a:rPr lang="zh-CN" altLang="en-US" dirty="0"/>
+              <a:t> </a:t>
+            </a:r>
+            <a:r>
+              <a:rPr lang="en-US" altLang="zh-CN" dirty="0" err="1"/>
+              <a:t>etc</a:t>
+            </a:r>
+            <a:r>
+              <a:rPr lang="en-US" altLang="zh-CN" dirty="0"/>
+              <a:t>…</a:t>
             </a:r>
             <a:endParaRPr lang="zh-CN" altLang="en-US" dirty="0"/>
           </a:p>
@@ -5145,25 +6156,25 @@
           <p:nvPr>
             <p:extLst>
               <p:ext uri="{D42A27DB-BD31-4B8C-83A1-F6EECF244321}">
-                <p14:modId xmlns:p14="http://schemas.microsoft.com/office/powerpoint/2010/main" val="2358125511"/>
+                <p14:modId xmlns:p14="http://schemas.microsoft.com/office/powerpoint/2010/main" val="622620034"/>
               </p:ext>
             </p:extLst>
           </p:nvPr>
         </p:nvGraphicFramePr>
         <p:xfrm>
-          <a:off x="7347062" y="3153312"/>
-          <a:ext cx="757238" cy="525463"/>
+          <a:off x="4443413" y="5381625"/>
+          <a:ext cx="1514475" cy="1058863"/>
         </p:xfrm>
         <a:graphic>
           <a:graphicData uri="http://schemas.openxmlformats.org/presentationml/2006/ole">
             <mc:AlternateContent xmlns:mc="http://schemas.openxmlformats.org/markup-compatibility/2006">
               <mc:Choice xmlns:v="urn:schemas-microsoft-com:vml" Requires="v">
-                <p:oleObj name="Packager Shell Object" showAsIcon="1" r:id="rId3" imgW="757440" imgH="524880" progId="Package">
+                <p:oleObj name="Packager Shell Object" showAsIcon="1" r:id="rId3" imgW="1515240" imgH="1059480" progId="Package">
                   <p:embed/>
                 </p:oleObj>
               </mc:Choice>
               <mc:Fallback>
-                <p:oleObj name="Packager Shell Object" showAsIcon="1" r:id="rId3" imgW="757440" imgH="524880" progId="Package">
+                <p:oleObj name="Packager Shell Object" showAsIcon="1" r:id="rId3" imgW="1515240" imgH="1059480" progId="Package">
                   <p:embed/>
                   <p:pic>
                     <p:nvPicPr>
@@ -5185,8 +6196,8 @@
                     </p:blipFill>
                     <p:spPr>
                       <a:xfrm>
-                        <a:off x="7347062" y="3153312"/>
-                        <a:ext cx="757238" cy="525463"/>
+                        <a:off x="4443413" y="5381625"/>
+                        <a:ext cx="1514475" cy="1058863"/>
                       </a:xfrm>
                       <a:prstGeom prst="rect">
                         <a:avLst/>
@@ -5271,115 +6282,6 @@
     <p:extLst>
       <p:ext uri="{BB962C8B-B14F-4D97-AF65-F5344CB8AC3E}">
         <p14:creationId xmlns:p14="http://schemas.microsoft.com/office/powerpoint/2010/main" val="2423431472"/>
-      </p:ext>
-    </p:extLst>
-  </p:cSld>
-  <p:clrMapOvr>
-    <a:masterClrMapping/>
-  </p:clrMapOvr>
-</p:sld>
-</file>
-
-<file path=ppt/slides/slide4.xml><?xml version="1.0" encoding="utf-8"?>
-<p:sld xmlns:a="http://schemas.openxmlformats.org/drawingml/2006/main" xmlns:r="http://schemas.openxmlformats.org/officeDocument/2006/relationships" xmlns:p="http://schemas.openxmlformats.org/presentationml/2006/main">
-  <p:cSld>
-    <p:spTree>
-      <p:nvGrpSpPr>
-        <p:cNvPr id="1" name=""/>
-        <p:cNvGrpSpPr/>
-        <p:nvPr/>
-      </p:nvGrpSpPr>
-      <p:grpSpPr>
-        <a:xfrm>
-          <a:off x="0" y="0"/>
-          <a:ext cx="0" cy="0"/>
-          <a:chOff x="0" y="0"/>
-          <a:chExt cx="0" cy="0"/>
-        </a:xfrm>
-      </p:grpSpPr>
-      <p:sp>
-        <p:nvSpPr>
-          <p:cNvPr id="2" name="标题 1">
-            <a:extLst>
-              <a:ext uri="{FF2B5EF4-FFF2-40B4-BE49-F238E27FC236}">
-                <a16:creationId xmlns:a16="http://schemas.microsoft.com/office/drawing/2014/main" id="{5F747801-5720-4E97-9783-51746D12CC95}"/>
-              </a:ext>
-            </a:extLst>
-          </p:cNvPr>
-          <p:cNvSpPr>
-            <a:spLocks noGrp="1"/>
-          </p:cNvSpPr>
-          <p:nvPr>
-            <p:ph type="title"/>
-          </p:nvPr>
-        </p:nvSpPr>
-        <p:spPr/>
-        <p:txBody>
-          <a:bodyPr>
-            <a:normAutofit fontScale="90000"/>
-          </a:bodyPr>
-          <a:lstStyle/>
-          <a:p>
-            <a:r>
-              <a:rPr lang="en-US" altLang="zh-CN" dirty="0"/>
-              <a:t>After calculating the key words, also get the</a:t>
-            </a:r>
-            <a:br>
-              <a:rPr lang="en-US" altLang="zh-CN" dirty="0"/>
-            </a:br>
-            <a:r>
-              <a:rPr lang="en-US" altLang="zh-CN" dirty="0"/>
-              <a:t>knowledge point, not the knowledge structure. </a:t>
-            </a:r>
-            <a:endParaRPr lang="zh-CN" altLang="en-US" dirty="0"/>
-          </a:p>
-        </p:txBody>
-      </p:sp>
-      <p:sp>
-        <p:nvSpPr>
-          <p:cNvPr id="3" name="内容占位符 2">
-            <a:extLst>
-              <a:ext uri="{FF2B5EF4-FFF2-40B4-BE49-F238E27FC236}">
-                <a16:creationId xmlns:a16="http://schemas.microsoft.com/office/drawing/2014/main" id="{A364F721-5996-4006-8CA7-9EA84160A5A2}"/>
-              </a:ext>
-            </a:extLst>
-          </p:cNvPr>
-          <p:cNvSpPr>
-            <a:spLocks noGrp="1"/>
-          </p:cNvSpPr>
-          <p:nvPr>
-            <p:ph idx="1"/>
-          </p:nvPr>
-        </p:nvSpPr>
-        <p:spPr/>
-        <p:txBody>
-          <a:bodyPr/>
-          <a:lstStyle/>
-          <a:p>
-            <a:endParaRPr lang="en-US" altLang="zh-CN" dirty="0"/>
-          </a:p>
-          <a:p>
-            <a:endParaRPr lang="en-US" altLang="zh-CN" dirty="0"/>
-          </a:p>
-          <a:p>
-            <a:endParaRPr lang="en-US" altLang="zh-CN" dirty="0"/>
-          </a:p>
-          <a:p>
-            <a:pPr marL="457200" lvl="1" indent="0">
-              <a:buNone/>
-            </a:pPr>
-            <a:r>
-              <a:rPr lang="en-US" altLang="zh-CN" dirty="0"/>
-              <a:t>So what should I do…</a:t>
-            </a:r>
-            <a:endParaRPr lang="zh-CN" altLang="en-US" dirty="0"/>
-          </a:p>
-        </p:txBody>
-      </p:sp>
-    </p:spTree>
-    <p:extLst>
-      <p:ext uri="{BB962C8B-B14F-4D97-AF65-F5344CB8AC3E}">
-        <p14:creationId xmlns:p14="http://schemas.microsoft.com/office/powerpoint/2010/main" val="1699259762"/>
       </p:ext>
     </p:extLst>
   </p:cSld>
@@ -5411,7 +6313,7 @@
           <p:cNvPr id="2" name="标题 1">
             <a:extLst>
               <a:ext uri="{FF2B5EF4-FFF2-40B4-BE49-F238E27FC236}">
-                <a16:creationId xmlns:a16="http://schemas.microsoft.com/office/drawing/2014/main" id="{3EED1A76-4494-4E69-B337-DFB520BDF63F}"/>
+                <a16:creationId xmlns:a16="http://schemas.microsoft.com/office/drawing/2014/main" id="{217228B0-7630-4432-9224-022F1A7158B0}"/>
               </a:ext>
             </a:extLst>
           </p:cNvPr>
@@ -5429,8 +6331,9 @@
           <a:p>
             <a:r>
               <a:rPr lang="en-US" altLang="zh-CN" dirty="0"/>
-              <a:t>The precondition:</a:t>
-            </a:r>
+              <a:t>Suggestions For web spider</a:t>
+            </a:r>
+            <a:endParaRPr lang="zh-CN" altLang="en-US" dirty="0"/>
           </a:p>
         </p:txBody>
       </p:sp>
@@ -5439,7 +6342,7 @@
           <p:cNvPr id="3" name="内容占位符 2">
             <a:extLst>
               <a:ext uri="{FF2B5EF4-FFF2-40B4-BE49-F238E27FC236}">
-                <a16:creationId xmlns:a16="http://schemas.microsoft.com/office/drawing/2014/main" id="{1D9907FD-1B17-4BAF-B66C-9F228BBD2ED1}"/>
+                <a16:creationId xmlns:a16="http://schemas.microsoft.com/office/drawing/2014/main" id="{B45598DD-9172-4CD0-AFC5-0B867248BD46}"/>
               </a:ext>
             </a:extLst>
           </p:cNvPr>
@@ -5452,46 +6355,767 @@
         </p:nvSpPr>
         <p:spPr>
           <a:xfrm>
-            <a:off x="838200" y="2121800"/>
-            <a:ext cx="10515600" cy="2614400"/>
+            <a:off x="838200" y="1825625"/>
+            <a:ext cx="10515600" cy="1681146"/>
           </a:xfrm>
         </p:spPr>
         <p:txBody>
           <a:bodyPr/>
           <a:lstStyle/>
           <a:p>
-            <a:pPr marL="457200" lvl="1" indent="0">
-              <a:buNone/>
+            <a:endParaRPr lang="en-US" altLang="zh-CN" dirty="0"/>
+          </a:p>
+          <a:p>
+            <a:r>
+              <a:rPr lang="en-US" altLang="zh-CN" dirty="0"/>
+              <a:t>Observations</a:t>
+            </a:r>
+          </a:p>
+          <a:p>
+            <a:r>
+              <a:rPr lang="en-US" altLang="zh-CN" dirty="0"/>
+              <a:t>Discover the  common point and distinguishing point</a:t>
+            </a:r>
+          </a:p>
+          <a:p>
+            <a:endParaRPr lang="zh-CN" altLang="en-US" dirty="0"/>
+          </a:p>
+        </p:txBody>
+      </p:sp>
+      <p:sp>
+        <p:nvSpPr>
+          <p:cNvPr id="4" name="Rectangle 1">
+            <a:extLst>
+              <a:ext uri="{FF2B5EF4-FFF2-40B4-BE49-F238E27FC236}">
+                <a16:creationId xmlns:a16="http://schemas.microsoft.com/office/drawing/2014/main" id="{CBA88D1A-3652-4B11-A561-B9218A2CC95F}"/>
+              </a:ext>
+            </a:extLst>
+          </p:cNvPr>
+          <p:cNvSpPr>
+            <a:spLocks noChangeArrowheads="1"/>
+          </p:cNvSpPr>
+          <p:nvPr/>
+        </p:nvSpPr>
+        <p:spPr bwMode="auto">
+          <a:xfrm>
+            <a:off x="593103" y="3641708"/>
+            <a:ext cx="10273710" cy="307777"/>
+          </a:xfrm>
+          <a:prstGeom prst="rect">
+            <a:avLst/>
+          </a:prstGeom>
+          <a:solidFill>
+            <a:srgbClr val="FFFFFF"/>
+          </a:solidFill>
+          <a:ln>
+            <a:noFill/>
+          </a:ln>
+          <a:effectLst/>
+          <a:extLst>
+            <a:ext uri="{91240B29-F687-4F45-9708-019B960494DF}">
+              <a14:hiddenLine xmlns:a14="http://schemas.microsoft.com/office/drawing/2010/main" w="9525">
+                <a:solidFill>
+                  <a:schemeClr val="tx1"/>
+                </a:solidFill>
+                <a:miter lim="800000"/>
+                <a:headEnd/>
+                <a:tailEnd/>
+              </a14:hiddenLine>
+            </a:ext>
+            <a:ext uri="{AF507438-7753-43E0-B8FC-AC1667EBCBE1}">
+              <a14:hiddenEffects xmlns:a14="http://schemas.microsoft.com/office/drawing/2010/main">
+                <a:effectLst>
+                  <a:outerShdw dist="35921" dir="2700000" algn="ctr" rotWithShape="0">
+                    <a:schemeClr val="bg2"/>
+                  </a:outerShdw>
+                </a:effectLst>
+              </a14:hiddenEffects>
+            </a:ext>
+          </a:extLst>
+        </p:spPr>
+        <p:txBody>
+          <a:bodyPr vert="horz" wrap="none" lIns="91440" tIns="45720" rIns="91440" bIns="45720" numCol="1" anchor="ctr" anchorCtr="0" compatLnSpc="1">
+            <a:prstTxWarp prst="textNoShape">
+              <a:avLst/>
+            </a:prstTxWarp>
+            <a:spAutoFit/>
+          </a:bodyPr>
+          <a:lstStyle/>
+          <a:p>
+            <a:pPr marL="0" marR="0" lvl="0" indent="0" algn="l" defTabSz="914400" rtl="0" eaLnBrk="0" fontAlgn="base" latinLnBrk="0" hangingPunct="0">
+              <a:lnSpc>
+                <a:spcPct val="100000"/>
+              </a:lnSpc>
+              <a:spcBef>
+                <a:spcPct val="0"/>
+              </a:spcBef>
+              <a:spcAft>
+                <a:spcPct val="0"/>
+              </a:spcAft>
+              <a:buClrTx/>
+              <a:buSzTx/>
+              <a:buFontTx/>
+              <a:buNone/>
+              <a:tabLst/>
             </a:pPr>
             <a:r>
+              <a:rPr kumimoji="0" lang="zh-CN" altLang="zh-CN" sz="1400" b="0" i="0" u="none" strike="noStrike" cap="none" normalizeH="0" baseline="0" dirty="0">
+                <a:ln>
+                  <a:noFill/>
+                </a:ln>
+                <a:solidFill>
+                  <a:srgbClr val="080808"/>
+                </a:solidFill>
+                <a:effectLst/>
+                <a:latin typeface="Arial Unicode MS"/>
+                <a:ea typeface="JetBrains Mono"/>
+              </a:rPr>
+              <a:t>url = </a:t>
+            </a:r>
+            <a:r>
+              <a:rPr kumimoji="0" lang="zh-CN" altLang="zh-CN" sz="1400" b="1" i="0" u="none" strike="noStrike" cap="none" normalizeH="0" baseline="0" dirty="0">
+                <a:ln>
+                  <a:noFill/>
+                </a:ln>
+                <a:solidFill>
+                  <a:srgbClr val="008080"/>
+                </a:solidFill>
+                <a:effectLst/>
+                <a:latin typeface="Arial Unicode MS"/>
+                <a:ea typeface="JetBrains Mono"/>
+              </a:rPr>
+              <a:t>“https://www.lagou.com/wn/jobs?px=new&amp;xl=%E6%9C%AC%E7%A7%91&amp;yx=</a:t>
+            </a:r>
+            <a:r>
+              <a:rPr kumimoji="0" lang="zh-CN" altLang="zh-CN" sz="1400" b="1" i="0" u="none" strike="noStrike" cap="none" normalizeH="0" baseline="0" dirty="0">
+                <a:ln>
+                  <a:noFill/>
+                </a:ln>
+                <a:solidFill>
+                  <a:srgbClr val="FF0000"/>
+                </a:solidFill>
+                <a:effectLst/>
+                <a:latin typeface="Arial Unicode MS"/>
+                <a:ea typeface="JetBrains Mono"/>
+              </a:rPr>
+              <a:t>25k-50k</a:t>
+            </a:r>
+            <a:r>
+              <a:rPr kumimoji="0" lang="zh-CN" altLang="zh-CN" sz="1400" b="1" i="0" u="none" strike="noStrike" cap="none" normalizeH="0" baseline="0" dirty="0">
+                <a:ln>
+                  <a:noFill/>
+                </a:ln>
+                <a:solidFill>
+                  <a:srgbClr val="008080"/>
+                </a:solidFill>
+                <a:effectLst/>
+                <a:latin typeface="Arial Unicode MS"/>
+                <a:ea typeface="JetBrains Mono"/>
+              </a:rPr>
+              <a:t>&amp;kd=</a:t>
+            </a:r>
+            <a:r>
+              <a:rPr kumimoji="0" lang="zh-CN" altLang="zh-CN" sz="1400" b="1" i="0" u="none" strike="noStrike" cap="none" normalizeH="0" baseline="0" dirty="0">
+                <a:ln>
+                  <a:noFill/>
+                </a:ln>
+                <a:solidFill>
+                  <a:srgbClr val="FF0000"/>
+                </a:solidFill>
+                <a:effectLst/>
+                <a:latin typeface="Arial Unicode MS"/>
+                <a:ea typeface="JetBrains Mono"/>
+              </a:rPr>
+              <a:t>Java</a:t>
+            </a:r>
+            <a:r>
+              <a:rPr kumimoji="0" lang="zh-CN" altLang="zh-CN" sz="1400" b="1" i="0" u="none" strike="noStrike" cap="none" normalizeH="0" baseline="0" dirty="0">
+                <a:ln>
+                  <a:noFill/>
+                </a:ln>
+                <a:solidFill>
+                  <a:srgbClr val="008080"/>
+                </a:solidFill>
+                <a:effectLst/>
+                <a:latin typeface="Arial Unicode MS"/>
+                <a:ea typeface="JetBrains Mono"/>
+              </a:rPr>
+              <a:t>&amp;pn=</a:t>
+            </a:r>
+            <a:r>
+              <a:rPr kumimoji="0" lang="en-US" altLang="zh-CN" sz="1400" b="1" i="0" u="none" strike="noStrike" cap="none" normalizeH="0" baseline="0" dirty="0">
+                <a:ln>
+                  <a:noFill/>
+                </a:ln>
+                <a:solidFill>
+                  <a:srgbClr val="FF0000"/>
+                </a:solidFill>
+                <a:effectLst/>
+                <a:latin typeface="Arial Unicode MS"/>
+                <a:ea typeface="JetBrains Mono"/>
+              </a:rPr>
+              <a:t>1</a:t>
+            </a:r>
+            <a:r>
+              <a:rPr kumimoji="0" lang="zh-CN" altLang="zh-CN" sz="1400" b="1" i="0" u="none" strike="noStrike" cap="none" normalizeH="0" baseline="0" dirty="0">
+                <a:ln>
+                  <a:noFill/>
+                </a:ln>
+                <a:solidFill>
+                  <a:srgbClr val="008080"/>
+                </a:solidFill>
+                <a:effectLst/>
+                <a:latin typeface="Arial Unicode MS"/>
+                <a:ea typeface="JetBrains Mono"/>
+              </a:rPr>
+              <a:t>&amp;city=</a:t>
+            </a:r>
+            <a:r>
+              <a:rPr kumimoji="0" lang="zh-CN" altLang="en-US" sz="1400" b="1" i="0" u="none" strike="noStrike" cap="none" normalizeH="0" baseline="0" dirty="0">
+                <a:ln>
+                  <a:noFill/>
+                </a:ln>
+                <a:solidFill>
+                  <a:srgbClr val="FF0000"/>
+                </a:solidFill>
+                <a:effectLst/>
+                <a:latin typeface="Arial Unicode MS"/>
+                <a:ea typeface="JetBrains Mono"/>
+              </a:rPr>
+              <a:t>上海</a:t>
+            </a:r>
+            <a:r>
+              <a:rPr kumimoji="0" lang="zh-CN" altLang="zh-CN" sz="1400" b="1" i="0" u="none" strike="noStrike" cap="none" normalizeH="0" baseline="0" dirty="0">
+                <a:ln>
+                  <a:noFill/>
+                </a:ln>
+                <a:solidFill>
+                  <a:srgbClr val="008080"/>
+                </a:solidFill>
+                <a:effectLst/>
+                <a:latin typeface="Arial Unicode MS"/>
+                <a:ea typeface="JetBrains Mono"/>
+              </a:rPr>
+              <a:t>"</a:t>
+            </a:r>
+            <a:endParaRPr kumimoji="0" lang="zh-CN" altLang="zh-CN" sz="3600" b="0" i="0" u="none" strike="noStrike" cap="none" normalizeH="0" baseline="0" dirty="0">
+              <a:ln>
+                <a:noFill/>
+              </a:ln>
+              <a:solidFill>
+                <a:schemeClr val="tx1"/>
+              </a:solidFill>
+              <a:effectLst/>
+              <a:latin typeface="Arial" panose="020B0604020202020204" pitchFamily="34" charset="0"/>
+            </a:endParaRPr>
+          </a:p>
+        </p:txBody>
+      </p:sp>
+      <p:sp>
+        <p:nvSpPr>
+          <p:cNvPr id="5" name="内容占位符 2">
+            <a:extLst>
+              <a:ext uri="{FF2B5EF4-FFF2-40B4-BE49-F238E27FC236}">
+                <a16:creationId xmlns:a16="http://schemas.microsoft.com/office/drawing/2014/main" id="{B7F47642-4F93-49DB-94BD-F62D743E9C39}"/>
+              </a:ext>
+            </a:extLst>
+          </p:cNvPr>
+          <p:cNvSpPr txBox="1">
+            <a:spLocks/>
+          </p:cNvSpPr>
+          <p:nvPr/>
+        </p:nvSpPr>
+        <p:spPr>
+          <a:xfrm>
+            <a:off x="838200" y="3795596"/>
+            <a:ext cx="10515600" cy="1464562"/>
+          </a:xfrm>
+          <a:prstGeom prst="rect">
+            <a:avLst/>
+          </a:prstGeom>
+        </p:spPr>
+        <p:txBody>
+          <a:bodyPr vert="horz" lIns="91440" tIns="45720" rIns="91440" bIns="45720" rtlCol="0">
+            <a:normAutofit lnSpcReduction="10000"/>
+          </a:bodyPr>
+          <a:lstStyle>
+            <a:lvl1pPr marL="228600" indent="-228600" algn="l" defTabSz="914400" rtl="0" eaLnBrk="1" latinLnBrk="0" hangingPunct="1">
+              <a:lnSpc>
+                <a:spcPct val="90000"/>
+              </a:lnSpc>
+              <a:spcBef>
+                <a:spcPts val="1000"/>
+              </a:spcBef>
+              <a:buFont typeface="Arial" panose="020B0604020202020204" pitchFamily="34" charset="0"/>
+              <a:buChar char="•"/>
+              <a:defRPr sz="2800" kern="1200">
+                <a:solidFill>
+                  <a:schemeClr val="tx1"/>
+                </a:solidFill>
+                <a:latin typeface="+mn-lt"/>
+                <a:ea typeface="+mn-ea"/>
+                <a:cs typeface="+mn-cs"/>
+              </a:defRPr>
+            </a:lvl1pPr>
+            <a:lvl2pPr marL="685800" indent="-228600" algn="l" defTabSz="914400" rtl="0" eaLnBrk="1" latinLnBrk="0" hangingPunct="1">
+              <a:lnSpc>
+                <a:spcPct val="90000"/>
+              </a:lnSpc>
+              <a:spcBef>
+                <a:spcPts val="500"/>
+              </a:spcBef>
+              <a:buFont typeface="Arial" panose="020B0604020202020204" pitchFamily="34" charset="0"/>
+              <a:buChar char="•"/>
+              <a:defRPr sz="2400" kern="1200">
+                <a:solidFill>
+                  <a:schemeClr val="tx1"/>
+                </a:solidFill>
+                <a:latin typeface="+mn-lt"/>
+                <a:ea typeface="+mn-ea"/>
+                <a:cs typeface="+mn-cs"/>
+              </a:defRPr>
+            </a:lvl2pPr>
+            <a:lvl3pPr marL="1143000" indent="-228600" algn="l" defTabSz="914400" rtl="0" eaLnBrk="1" latinLnBrk="0" hangingPunct="1">
+              <a:lnSpc>
+                <a:spcPct val="90000"/>
+              </a:lnSpc>
+              <a:spcBef>
+                <a:spcPts val="500"/>
+              </a:spcBef>
+              <a:buFont typeface="Arial" panose="020B0604020202020204" pitchFamily="34" charset="0"/>
+              <a:buChar char="•"/>
+              <a:defRPr sz="2000" kern="1200">
+                <a:solidFill>
+                  <a:schemeClr val="tx1"/>
+                </a:solidFill>
+                <a:latin typeface="+mn-lt"/>
+                <a:ea typeface="+mn-ea"/>
+                <a:cs typeface="+mn-cs"/>
+              </a:defRPr>
+            </a:lvl3pPr>
+            <a:lvl4pPr marL="1600200" indent="-228600" algn="l" defTabSz="914400" rtl="0" eaLnBrk="1" latinLnBrk="0" hangingPunct="1">
+              <a:lnSpc>
+                <a:spcPct val="90000"/>
+              </a:lnSpc>
+              <a:spcBef>
+                <a:spcPts val="500"/>
+              </a:spcBef>
+              <a:buFont typeface="Arial" panose="020B0604020202020204" pitchFamily="34" charset="0"/>
+              <a:buChar char="•"/>
+              <a:defRPr sz="1800" kern="1200">
+                <a:solidFill>
+                  <a:schemeClr val="tx1"/>
+                </a:solidFill>
+                <a:latin typeface="+mn-lt"/>
+                <a:ea typeface="+mn-ea"/>
+                <a:cs typeface="+mn-cs"/>
+              </a:defRPr>
+            </a:lvl4pPr>
+            <a:lvl5pPr marL="2057400" indent="-228600" algn="l" defTabSz="914400" rtl="0" eaLnBrk="1" latinLnBrk="0" hangingPunct="1">
+              <a:lnSpc>
+                <a:spcPct val="90000"/>
+              </a:lnSpc>
+              <a:spcBef>
+                <a:spcPts val="500"/>
+              </a:spcBef>
+              <a:buFont typeface="Arial" panose="020B0604020202020204" pitchFamily="34" charset="0"/>
+              <a:buChar char="•"/>
+              <a:defRPr sz="1800" kern="1200">
+                <a:solidFill>
+                  <a:schemeClr val="tx1"/>
+                </a:solidFill>
+                <a:latin typeface="+mn-lt"/>
+                <a:ea typeface="+mn-ea"/>
+                <a:cs typeface="+mn-cs"/>
+              </a:defRPr>
+            </a:lvl5pPr>
+            <a:lvl6pPr marL="2514600" indent="-228600" algn="l" defTabSz="914400" rtl="0" eaLnBrk="1" latinLnBrk="0" hangingPunct="1">
+              <a:lnSpc>
+                <a:spcPct val="90000"/>
+              </a:lnSpc>
+              <a:spcBef>
+                <a:spcPts val="500"/>
+              </a:spcBef>
+              <a:buFont typeface="Arial" panose="020B0604020202020204" pitchFamily="34" charset="0"/>
+              <a:buChar char="•"/>
+              <a:defRPr sz="1800" kern="1200">
+                <a:solidFill>
+                  <a:schemeClr val="tx1"/>
+                </a:solidFill>
+                <a:latin typeface="+mn-lt"/>
+                <a:ea typeface="+mn-ea"/>
+                <a:cs typeface="+mn-cs"/>
+              </a:defRPr>
+            </a:lvl6pPr>
+            <a:lvl7pPr marL="2971800" indent="-228600" algn="l" defTabSz="914400" rtl="0" eaLnBrk="1" latinLnBrk="0" hangingPunct="1">
+              <a:lnSpc>
+                <a:spcPct val="90000"/>
+              </a:lnSpc>
+              <a:spcBef>
+                <a:spcPts val="500"/>
+              </a:spcBef>
+              <a:buFont typeface="Arial" panose="020B0604020202020204" pitchFamily="34" charset="0"/>
+              <a:buChar char="•"/>
+              <a:defRPr sz="1800" kern="1200">
+                <a:solidFill>
+                  <a:schemeClr val="tx1"/>
+                </a:solidFill>
+                <a:latin typeface="+mn-lt"/>
+                <a:ea typeface="+mn-ea"/>
+                <a:cs typeface="+mn-cs"/>
+              </a:defRPr>
+            </a:lvl7pPr>
+            <a:lvl8pPr marL="3429000" indent="-228600" algn="l" defTabSz="914400" rtl="0" eaLnBrk="1" latinLnBrk="0" hangingPunct="1">
+              <a:lnSpc>
+                <a:spcPct val="90000"/>
+              </a:lnSpc>
+              <a:spcBef>
+                <a:spcPts val="500"/>
+              </a:spcBef>
+              <a:buFont typeface="Arial" panose="020B0604020202020204" pitchFamily="34" charset="0"/>
+              <a:buChar char="•"/>
+              <a:defRPr sz="1800" kern="1200">
+                <a:solidFill>
+                  <a:schemeClr val="tx1"/>
+                </a:solidFill>
+                <a:latin typeface="+mn-lt"/>
+                <a:ea typeface="+mn-ea"/>
+                <a:cs typeface="+mn-cs"/>
+              </a:defRPr>
+            </a:lvl8pPr>
+            <a:lvl9pPr marL="3886200" indent="-228600" algn="l" defTabSz="914400" rtl="0" eaLnBrk="1" latinLnBrk="0" hangingPunct="1">
+              <a:lnSpc>
+                <a:spcPct val="90000"/>
+              </a:lnSpc>
+              <a:spcBef>
+                <a:spcPts val="500"/>
+              </a:spcBef>
+              <a:buFont typeface="Arial" panose="020B0604020202020204" pitchFamily="34" charset="0"/>
+              <a:buChar char="•"/>
+              <a:defRPr sz="1800" kern="1200">
+                <a:solidFill>
+                  <a:schemeClr val="tx1"/>
+                </a:solidFill>
+                <a:latin typeface="+mn-lt"/>
+                <a:ea typeface="+mn-ea"/>
+                <a:cs typeface="+mn-cs"/>
+              </a:defRPr>
+            </a:lvl9pPr>
+          </a:lstStyle>
+          <a:p>
+            <a:endParaRPr lang="en-US" altLang="zh-CN" dirty="0"/>
+          </a:p>
+          <a:p>
+            <a:r>
               <a:rPr lang="en-US" altLang="zh-CN" dirty="0"/>
-              <a:t>If there is a knowledge needs to deliver to someone else, or one theory wants to go down in history and hand down a good reputation in next hundred future generations.</a:t>
-            </a:r>
-          </a:p>
-          <a:p>
-            <a:pPr marL="457200" lvl="1" indent="0">
+              <a:t>The result always in</a:t>
+            </a:r>
+            <a:r>
+              <a:rPr lang="zh-CN" altLang="en-US" dirty="0"/>
+              <a:t> </a:t>
+            </a:r>
+            <a:r>
+              <a:rPr lang="en-US" altLang="zh-CN" dirty="0"/>
+              <a:t>the</a:t>
+            </a:r>
+            <a:r>
+              <a:rPr lang="zh-CN" altLang="en-US" dirty="0"/>
+              <a:t> </a:t>
+            </a:r>
+            <a:r>
+              <a:rPr lang="en-US" altLang="zh-CN" dirty="0"/>
+              <a:t>same</a:t>
+            </a:r>
+            <a:r>
+              <a:rPr lang="zh-CN" altLang="en-US" dirty="0"/>
+              <a:t> </a:t>
+            </a:r>
+            <a:r>
+              <a:rPr lang="en-US" altLang="zh-CN" dirty="0"/>
+              <a:t>payload structure in HTML or JSON</a:t>
+            </a:r>
+          </a:p>
+          <a:p>
+            <a:pPr marL="0" indent="0">
               <a:buNone/>
             </a:pPr>
             <a:r>
               <a:rPr lang="en-US" altLang="zh-CN" dirty="0"/>
-              <a:t>There must be a curriculum or a teaching material as a knowledge carrier.</a:t>
-            </a:r>
-          </a:p>
-          <a:p>
-            <a:pPr marL="457200" lvl="1" indent="0">
+              <a:t>Can</a:t>
+            </a:r>
+            <a:r>
+              <a:rPr lang="zh-CN" altLang="en-US" dirty="0"/>
+              <a:t> </a:t>
+            </a:r>
+            <a:r>
+              <a:rPr lang="en-US" altLang="zh-CN" dirty="0"/>
+              <a:t>be parsed</a:t>
+            </a:r>
+            <a:r>
+              <a:rPr lang="zh-CN" altLang="en-US" dirty="0"/>
+              <a:t> </a:t>
+            </a:r>
+            <a:r>
+              <a:rPr lang="en-US" altLang="zh-CN" dirty="0"/>
+              <a:t>by regular expression</a:t>
+            </a:r>
+          </a:p>
+          <a:p>
+            <a:pPr marL="0" indent="0">
               <a:buNone/>
             </a:pPr>
+            <a:endParaRPr lang="en-US" altLang="zh-CN" dirty="0"/>
+          </a:p>
+          <a:p>
+            <a:pPr marL="0" indent="0">
+              <a:buNone/>
+            </a:pPr>
+            <a:endParaRPr lang="en-US" altLang="zh-CN" dirty="0"/>
+          </a:p>
+          <a:p>
+            <a:pPr marL="0" indent="0">
+              <a:buNone/>
+            </a:pPr>
+            <a:endParaRPr lang="en-US" altLang="zh-CN" dirty="0"/>
+          </a:p>
+          <a:p>
+            <a:pPr marL="0" indent="0">
+              <a:buNone/>
+            </a:pPr>
+            <a:endParaRPr lang="zh-CN" altLang="en-US" dirty="0"/>
+          </a:p>
+        </p:txBody>
+      </p:sp>
+      <p:sp>
+        <p:nvSpPr>
+          <p:cNvPr id="6" name="内容占位符 2">
+            <a:extLst>
+              <a:ext uri="{FF2B5EF4-FFF2-40B4-BE49-F238E27FC236}">
+                <a16:creationId xmlns:a16="http://schemas.microsoft.com/office/drawing/2014/main" id="{6EDDC362-3D62-448E-A5E5-FEE0C75C082B}"/>
+              </a:ext>
+            </a:extLst>
+          </p:cNvPr>
+          <p:cNvSpPr txBox="1">
+            <a:spLocks/>
+          </p:cNvSpPr>
+          <p:nvPr/>
+        </p:nvSpPr>
+        <p:spPr>
+          <a:xfrm>
+            <a:off x="838200" y="5028313"/>
+            <a:ext cx="10515600" cy="1464562"/>
+          </a:xfrm>
+          <a:prstGeom prst="rect">
+            <a:avLst/>
+          </a:prstGeom>
+        </p:spPr>
+        <p:txBody>
+          <a:bodyPr vert="horz" lIns="91440" tIns="45720" rIns="91440" bIns="45720" rtlCol="0">
+            <a:normAutofit/>
+          </a:bodyPr>
+          <a:lstStyle>
+            <a:lvl1pPr marL="228600" indent="-228600" algn="l" defTabSz="914400" rtl="0" eaLnBrk="1" latinLnBrk="0" hangingPunct="1">
+              <a:lnSpc>
+                <a:spcPct val="90000"/>
+              </a:lnSpc>
+              <a:spcBef>
+                <a:spcPts val="1000"/>
+              </a:spcBef>
+              <a:buFont typeface="Arial" panose="020B0604020202020204" pitchFamily="34" charset="0"/>
+              <a:buChar char="•"/>
+              <a:defRPr sz="2800" kern="1200">
+                <a:solidFill>
+                  <a:schemeClr val="tx1"/>
+                </a:solidFill>
+                <a:latin typeface="+mn-lt"/>
+                <a:ea typeface="+mn-ea"/>
+                <a:cs typeface="+mn-cs"/>
+              </a:defRPr>
+            </a:lvl1pPr>
+            <a:lvl2pPr marL="685800" indent="-228600" algn="l" defTabSz="914400" rtl="0" eaLnBrk="1" latinLnBrk="0" hangingPunct="1">
+              <a:lnSpc>
+                <a:spcPct val="90000"/>
+              </a:lnSpc>
+              <a:spcBef>
+                <a:spcPts val="500"/>
+              </a:spcBef>
+              <a:buFont typeface="Arial" panose="020B0604020202020204" pitchFamily="34" charset="0"/>
+              <a:buChar char="•"/>
+              <a:defRPr sz="2400" kern="1200">
+                <a:solidFill>
+                  <a:schemeClr val="tx1"/>
+                </a:solidFill>
+                <a:latin typeface="+mn-lt"/>
+                <a:ea typeface="+mn-ea"/>
+                <a:cs typeface="+mn-cs"/>
+              </a:defRPr>
+            </a:lvl2pPr>
+            <a:lvl3pPr marL="1143000" indent="-228600" algn="l" defTabSz="914400" rtl="0" eaLnBrk="1" latinLnBrk="0" hangingPunct="1">
+              <a:lnSpc>
+                <a:spcPct val="90000"/>
+              </a:lnSpc>
+              <a:spcBef>
+                <a:spcPts val="500"/>
+              </a:spcBef>
+              <a:buFont typeface="Arial" panose="020B0604020202020204" pitchFamily="34" charset="0"/>
+              <a:buChar char="•"/>
+              <a:defRPr sz="2000" kern="1200">
+                <a:solidFill>
+                  <a:schemeClr val="tx1"/>
+                </a:solidFill>
+                <a:latin typeface="+mn-lt"/>
+                <a:ea typeface="+mn-ea"/>
+                <a:cs typeface="+mn-cs"/>
+              </a:defRPr>
+            </a:lvl3pPr>
+            <a:lvl4pPr marL="1600200" indent="-228600" algn="l" defTabSz="914400" rtl="0" eaLnBrk="1" latinLnBrk="0" hangingPunct="1">
+              <a:lnSpc>
+                <a:spcPct val="90000"/>
+              </a:lnSpc>
+              <a:spcBef>
+                <a:spcPts val="500"/>
+              </a:spcBef>
+              <a:buFont typeface="Arial" panose="020B0604020202020204" pitchFamily="34" charset="0"/>
+              <a:buChar char="•"/>
+              <a:defRPr sz="1800" kern="1200">
+                <a:solidFill>
+                  <a:schemeClr val="tx1"/>
+                </a:solidFill>
+                <a:latin typeface="+mn-lt"/>
+                <a:ea typeface="+mn-ea"/>
+                <a:cs typeface="+mn-cs"/>
+              </a:defRPr>
+            </a:lvl4pPr>
+            <a:lvl5pPr marL="2057400" indent="-228600" algn="l" defTabSz="914400" rtl="0" eaLnBrk="1" latinLnBrk="0" hangingPunct="1">
+              <a:lnSpc>
+                <a:spcPct val="90000"/>
+              </a:lnSpc>
+              <a:spcBef>
+                <a:spcPts val="500"/>
+              </a:spcBef>
+              <a:buFont typeface="Arial" panose="020B0604020202020204" pitchFamily="34" charset="0"/>
+              <a:buChar char="•"/>
+              <a:defRPr sz="1800" kern="1200">
+                <a:solidFill>
+                  <a:schemeClr val="tx1"/>
+                </a:solidFill>
+                <a:latin typeface="+mn-lt"/>
+                <a:ea typeface="+mn-ea"/>
+                <a:cs typeface="+mn-cs"/>
+              </a:defRPr>
+            </a:lvl5pPr>
+            <a:lvl6pPr marL="2514600" indent="-228600" algn="l" defTabSz="914400" rtl="0" eaLnBrk="1" latinLnBrk="0" hangingPunct="1">
+              <a:lnSpc>
+                <a:spcPct val="90000"/>
+              </a:lnSpc>
+              <a:spcBef>
+                <a:spcPts val="500"/>
+              </a:spcBef>
+              <a:buFont typeface="Arial" panose="020B0604020202020204" pitchFamily="34" charset="0"/>
+              <a:buChar char="•"/>
+              <a:defRPr sz="1800" kern="1200">
+                <a:solidFill>
+                  <a:schemeClr val="tx1"/>
+                </a:solidFill>
+                <a:latin typeface="+mn-lt"/>
+                <a:ea typeface="+mn-ea"/>
+                <a:cs typeface="+mn-cs"/>
+              </a:defRPr>
+            </a:lvl6pPr>
+            <a:lvl7pPr marL="2971800" indent="-228600" algn="l" defTabSz="914400" rtl="0" eaLnBrk="1" latinLnBrk="0" hangingPunct="1">
+              <a:lnSpc>
+                <a:spcPct val="90000"/>
+              </a:lnSpc>
+              <a:spcBef>
+                <a:spcPts val="500"/>
+              </a:spcBef>
+              <a:buFont typeface="Arial" panose="020B0604020202020204" pitchFamily="34" charset="0"/>
+              <a:buChar char="•"/>
+              <a:defRPr sz="1800" kern="1200">
+                <a:solidFill>
+                  <a:schemeClr val="tx1"/>
+                </a:solidFill>
+                <a:latin typeface="+mn-lt"/>
+                <a:ea typeface="+mn-ea"/>
+                <a:cs typeface="+mn-cs"/>
+              </a:defRPr>
+            </a:lvl7pPr>
+            <a:lvl8pPr marL="3429000" indent="-228600" algn="l" defTabSz="914400" rtl="0" eaLnBrk="1" latinLnBrk="0" hangingPunct="1">
+              <a:lnSpc>
+                <a:spcPct val="90000"/>
+              </a:lnSpc>
+              <a:spcBef>
+                <a:spcPts val="500"/>
+              </a:spcBef>
+              <a:buFont typeface="Arial" panose="020B0604020202020204" pitchFamily="34" charset="0"/>
+              <a:buChar char="•"/>
+              <a:defRPr sz="1800" kern="1200">
+                <a:solidFill>
+                  <a:schemeClr val="tx1"/>
+                </a:solidFill>
+                <a:latin typeface="+mn-lt"/>
+                <a:ea typeface="+mn-ea"/>
+                <a:cs typeface="+mn-cs"/>
+              </a:defRPr>
+            </a:lvl8pPr>
+            <a:lvl9pPr marL="3886200" indent="-228600" algn="l" defTabSz="914400" rtl="0" eaLnBrk="1" latinLnBrk="0" hangingPunct="1">
+              <a:lnSpc>
+                <a:spcPct val="90000"/>
+              </a:lnSpc>
+              <a:spcBef>
+                <a:spcPts val="500"/>
+              </a:spcBef>
+              <a:buFont typeface="Arial" panose="020B0604020202020204" pitchFamily="34" charset="0"/>
+              <a:buChar char="•"/>
+              <a:defRPr sz="1800" kern="1200">
+                <a:solidFill>
+                  <a:schemeClr val="tx1"/>
+                </a:solidFill>
+                <a:latin typeface="+mn-lt"/>
+                <a:ea typeface="+mn-ea"/>
+                <a:cs typeface="+mn-cs"/>
+              </a:defRPr>
+            </a:lvl9pPr>
+          </a:lstStyle>
+          <a:p>
+            <a:endParaRPr lang="en-US" altLang="zh-CN" dirty="0"/>
+          </a:p>
+          <a:p>
             <a:r>
               <a:rPr lang="en-US" altLang="zh-CN" dirty="0"/>
-              <a:t>Those contains all the information about the subject.</a:t>
-            </a:r>
+              <a:t>Use cookie to avoid the robot validation. </a:t>
+            </a:r>
+          </a:p>
+          <a:p>
+            <a:pPr marL="0" indent="0">
+              <a:buNone/>
+            </a:pPr>
+            <a:endParaRPr lang="en-US" altLang="zh-CN" dirty="0"/>
+          </a:p>
+          <a:p>
+            <a:pPr marL="0" indent="0">
+              <a:buNone/>
+            </a:pPr>
+            <a:endParaRPr lang="en-US" altLang="zh-CN" dirty="0"/>
+          </a:p>
+          <a:p>
+            <a:pPr marL="0" indent="0">
+              <a:buNone/>
+            </a:pPr>
+            <a:endParaRPr lang="en-US" altLang="zh-CN" dirty="0"/>
+          </a:p>
+          <a:p>
+            <a:pPr marL="0" indent="0">
+              <a:buNone/>
+            </a:pPr>
+            <a:endParaRPr lang="zh-CN" altLang="en-US" dirty="0"/>
           </a:p>
         </p:txBody>
       </p:sp>
     </p:spTree>
     <p:extLst>
       <p:ext uri="{BB962C8B-B14F-4D97-AF65-F5344CB8AC3E}">
-        <p14:creationId xmlns:p14="http://schemas.microsoft.com/office/powerpoint/2010/main" val="322371705"/>
+        <p14:creationId xmlns:p14="http://schemas.microsoft.com/office/powerpoint/2010/main" val="979261940"/>
       </p:ext>
     </p:extLst>
   </p:cSld>
@@ -5523,7 +7147,7 @@
           <p:cNvPr id="2" name="标题 1">
             <a:extLst>
               <a:ext uri="{FF2B5EF4-FFF2-40B4-BE49-F238E27FC236}">
-                <a16:creationId xmlns:a16="http://schemas.microsoft.com/office/drawing/2014/main" id="{BCDF9681-C394-43FA-973F-484ACD74B54D}"/>
+                <a16:creationId xmlns:a16="http://schemas.microsoft.com/office/drawing/2014/main" id="{5F747801-5720-4E97-9783-51746D12CC95}"/>
               </a:ext>
             </a:extLst>
           </p:cNvPr>
@@ -5536,63 +7160,77 @@
         </p:nvSpPr>
         <p:spPr/>
         <p:txBody>
+          <a:bodyPr>
+            <a:normAutofit fontScale="90000"/>
+          </a:bodyPr>
+          <a:lstStyle/>
+          <a:p>
+            <a:r>
+              <a:rPr lang="en-US" altLang="zh-CN" dirty="0"/>
+              <a:t>After calculating the key words, also get the</a:t>
+            </a:r>
+            <a:br>
+              <a:rPr lang="en-US" altLang="zh-CN" dirty="0"/>
+            </a:br>
+            <a:r>
+              <a:rPr lang="en-US" altLang="zh-CN" dirty="0"/>
+              <a:t>knowledge point, not the knowledge structure. </a:t>
+            </a:r>
+            <a:endParaRPr lang="zh-CN" altLang="en-US" dirty="0"/>
+          </a:p>
+        </p:txBody>
+      </p:sp>
+      <p:sp>
+        <p:nvSpPr>
+          <p:cNvPr id="3" name="内容占位符 2">
+            <a:extLst>
+              <a:ext uri="{FF2B5EF4-FFF2-40B4-BE49-F238E27FC236}">
+                <a16:creationId xmlns:a16="http://schemas.microsoft.com/office/drawing/2014/main" id="{A364F721-5996-4006-8CA7-9EA84160A5A2}"/>
+              </a:ext>
+            </a:extLst>
+          </p:cNvPr>
+          <p:cNvSpPr>
+            <a:spLocks noGrp="1"/>
+          </p:cNvSpPr>
+          <p:nvPr>
+            <p:ph idx="1"/>
+          </p:nvPr>
+        </p:nvSpPr>
+        <p:spPr/>
+        <p:txBody>
           <a:bodyPr/>
           <a:lstStyle/>
           <a:p>
+            <a:endParaRPr lang="en-US" altLang="zh-CN" dirty="0"/>
+          </a:p>
+          <a:p>
+            <a:endParaRPr lang="en-US" altLang="zh-CN" dirty="0"/>
+          </a:p>
+          <a:p>
+            <a:endParaRPr lang="en-US" altLang="zh-CN" dirty="0"/>
+          </a:p>
+          <a:p>
+            <a:pPr marL="457200" lvl="1" indent="0">
+              <a:buNone/>
+            </a:pPr>
             <a:r>
               <a:rPr lang="en-US" altLang="zh-CN" dirty="0"/>
-              <a:t>The process about how to build my knowledge structure</a:t>
-            </a:r>
-            <a:endParaRPr lang="zh-CN" altLang="en-US" dirty="0"/>
-          </a:p>
-        </p:txBody>
-      </p:sp>
-      <p:sp>
-        <p:nvSpPr>
-          <p:cNvPr id="3" name="内容占位符 2">
-            <a:extLst>
-              <a:ext uri="{FF2B5EF4-FFF2-40B4-BE49-F238E27FC236}">
-                <a16:creationId xmlns:a16="http://schemas.microsoft.com/office/drawing/2014/main" id="{480C66E2-0C43-45EE-B27A-1BB079136159}"/>
-              </a:ext>
-            </a:extLst>
-          </p:cNvPr>
-          <p:cNvSpPr>
-            <a:spLocks noGrp="1"/>
-          </p:cNvSpPr>
-          <p:nvPr>
-            <p:ph idx="1"/>
-          </p:nvPr>
-        </p:nvSpPr>
-        <p:spPr>
-          <a:xfrm>
-            <a:off x="914007" y="2513782"/>
-            <a:ext cx="10360843" cy="2944338"/>
-          </a:xfrm>
-        </p:spPr>
-        <p:txBody>
-          <a:bodyPr>
-            <a:normAutofit fontScale="92500" lnSpcReduction="20000"/>
-          </a:bodyPr>
-          <a:lstStyle/>
-          <a:p>
+              <a:t>So what should I do…</a:t>
+            </a:r>
+          </a:p>
+          <a:p>
+            <a:pPr marL="457200" lvl="1" indent="0">
+              <a:buNone/>
+            </a:pPr>
+            <a:endParaRPr lang="en-US" altLang="zh-CN" dirty="0"/>
+          </a:p>
+          <a:p>
+            <a:pPr marL="457200" lvl="1" indent="0">
+              <a:buNone/>
+            </a:pPr>
             <a:r>
               <a:rPr lang="en-US" altLang="zh-CN" dirty="0"/>
-              <a:t>I search all the courses in the internet, and summarize in the Excel and compare and summarize to get the difference and find the high frequency skill.</a:t>
-            </a:r>
-          </a:p>
-          <a:p>
-            <a:r>
-              <a:rPr lang="en-US" altLang="zh-CN" dirty="0"/>
-              <a:t>[the reason why this step, I manually to copy the content in the Excel not by a program… because I need to make sure that I am familiar with the content.]</a:t>
-            </a:r>
-          </a:p>
-          <a:p>
-            <a:endParaRPr lang="en-US" altLang="zh-CN" dirty="0"/>
-          </a:p>
-          <a:p>
-            <a:r>
-              <a:rPr lang="en-US" altLang="zh-CN" dirty="0"/>
-              <a:t>The aim is to finally abstract these component as my topology.</a:t>
+              <a:t>There is a viewpoint in my opinion that…</a:t>
             </a:r>
             <a:endParaRPr lang="zh-CN" altLang="en-US" dirty="0"/>
           </a:p>
@@ -5601,7 +7239,7 @@
     </p:spTree>
     <p:extLst>
       <p:ext uri="{BB962C8B-B14F-4D97-AF65-F5344CB8AC3E}">
-        <p14:creationId xmlns:p14="http://schemas.microsoft.com/office/powerpoint/2010/main" val="91212164"/>
+        <p14:creationId xmlns:p14="http://schemas.microsoft.com/office/powerpoint/2010/main" val="1699259762"/>
       </p:ext>
     </p:extLst>
   </p:cSld>
@@ -5633,7 +7271,7 @@
           <p:cNvPr id="2" name="标题 1">
             <a:extLst>
               <a:ext uri="{FF2B5EF4-FFF2-40B4-BE49-F238E27FC236}">
-                <a16:creationId xmlns:a16="http://schemas.microsoft.com/office/drawing/2014/main" id="{33C18581-937C-455D-98BA-DB766EF6F162}"/>
+                <a16:creationId xmlns:a16="http://schemas.microsoft.com/office/drawing/2014/main" id="{3EED1A76-4494-4E69-B337-DFB520BDF63F}"/>
               </a:ext>
             </a:extLst>
           </p:cNvPr>
@@ -5651,9 +7289,8 @@
           <a:p>
             <a:r>
               <a:rPr lang="en-US" altLang="zh-CN" dirty="0"/>
-              <a:t>Finally</a:t>
-            </a:r>
-            <a:endParaRPr lang="zh-CN" altLang="en-US" dirty="0"/>
+              <a:t>The precondition:</a:t>
+            </a:r>
           </a:p>
         </p:txBody>
       </p:sp>
@@ -5662,7 +7299,7 @@
           <p:cNvPr id="3" name="内容占位符 2">
             <a:extLst>
               <a:ext uri="{FF2B5EF4-FFF2-40B4-BE49-F238E27FC236}">
-                <a16:creationId xmlns:a16="http://schemas.microsoft.com/office/drawing/2014/main" id="{641FF198-2FDA-4C04-932A-0ED9E05D4855}"/>
+                <a16:creationId xmlns:a16="http://schemas.microsoft.com/office/drawing/2014/main" id="{1D9907FD-1B17-4BAF-B66C-9F228BBD2ED1}"/>
               </a:ext>
             </a:extLst>
           </p:cNvPr>
@@ -5675,142 +7312,964 @@
         </p:nvSpPr>
         <p:spPr>
           <a:xfrm>
-            <a:off x="838200" y="1929320"/>
-            <a:ext cx="10515600" cy="4351338"/>
+            <a:off x="630811" y="2121800"/>
+            <a:ext cx="10515600" cy="2614400"/>
           </a:xfrm>
         </p:spPr>
         <p:txBody>
-          <a:bodyPr>
-            <a:normAutofit lnSpcReduction="10000"/>
-          </a:bodyPr>
-          <a:lstStyle/>
-          <a:p>
+          <a:bodyPr/>
+          <a:lstStyle/>
+          <a:p>
+            <a:pPr marL="457200" lvl="1" indent="0">
+              <a:buNone/>
+            </a:pPr>
             <a:r>
               <a:rPr lang="en-US" altLang="zh-CN" dirty="0"/>
-              <a:t>The knowledge system is not achieved overnight. Like learning knowledge, it needs constantly iterate</a:t>
-            </a:r>
-            <a:r>
-              <a:rPr lang="en-US" altLang="zh-CN" b="0" i="0" dirty="0">
-                <a:solidFill>
-                  <a:srgbClr val="333333"/>
-                </a:solidFill>
-                <a:effectLst/>
-                <a:latin typeface="Arial" panose="020B0604020202020204" pitchFamily="34" charset="0"/>
-              </a:rPr>
-              <a:t> </a:t>
-            </a:r>
+              <a:t>If there is a knowledge needs to deliver to someone else, or one theory wants to go down in history and hand down a good reputation in next hundred future generations.</a:t>
+            </a:r>
+          </a:p>
+          <a:p>
+            <a:pPr marL="457200" lvl="1" indent="0">
+              <a:buNone/>
+            </a:pPr>
+            <a:endParaRPr lang="en-US" altLang="zh-CN" dirty="0"/>
+          </a:p>
+          <a:p>
+            <a:pPr marL="457200" lvl="1" indent="0">
+              <a:buNone/>
+            </a:pPr>
             <a:r>
               <a:rPr lang="en-US" altLang="zh-CN" dirty="0"/>
-              <a:t>. With the improvement of your knowledge, your knowledge topology is also becoming more and more </a:t>
-            </a:r>
-            <a:r>
-              <a:rPr lang="en-US" altLang="zh-CN"/>
-              <a:t>perfect.</a:t>
-            </a:r>
-            <a:endParaRPr lang="en-US" altLang="zh-CN" dirty="0"/>
-          </a:p>
-          <a:p>
+              <a:t>There must be a curriculum or a teaching material as a knowledge carrier.</a:t>
+            </a:r>
+          </a:p>
+          <a:p>
+            <a:pPr marL="457200" lvl="1" indent="0">
+              <a:buNone/>
+            </a:pPr>
             <a:r>
               <a:rPr lang="en-US" altLang="zh-CN" dirty="0"/>
-              <a:t>The benefit to build your topology is to avoid you to lost</a:t>
-            </a:r>
-            <a:r>
-              <a:rPr lang="zh-CN" altLang="en-US" dirty="0"/>
-              <a:t> </a:t>
-            </a:r>
-            <a:r>
-              <a:rPr lang="en-US" altLang="zh-CN" dirty="0"/>
-              <a:t>in</a:t>
-            </a:r>
-            <a:r>
-              <a:rPr lang="zh-CN" altLang="en-US" dirty="0"/>
-              <a:t> </a:t>
-            </a:r>
-            <a:r>
-              <a:rPr lang="en-US" altLang="zh-CN" dirty="0"/>
-              <a:t>the</a:t>
-            </a:r>
-            <a:r>
-              <a:rPr lang="zh-CN" altLang="en-US" dirty="0"/>
-              <a:t> </a:t>
-            </a:r>
-            <a:r>
-              <a:rPr lang="en-US" altLang="zh-CN" dirty="0"/>
-              <a:t>ocean of knowledge and</a:t>
-            </a:r>
-            <a:r>
-              <a:rPr lang="zh-CN" altLang="en-US" dirty="0"/>
-              <a:t> </a:t>
-            </a:r>
-            <a:r>
-              <a:rPr lang="en-US" altLang="zh-CN" dirty="0"/>
-              <a:t>to</a:t>
-            </a:r>
-            <a:r>
-              <a:rPr lang="zh-CN" altLang="en-US" dirty="0"/>
-              <a:t> </a:t>
-            </a:r>
-            <a:r>
-              <a:rPr lang="en-US" altLang="zh-CN" dirty="0"/>
-              <a:t>help</a:t>
-            </a:r>
-            <a:r>
-              <a:rPr lang="zh-CN" altLang="en-US" dirty="0"/>
-              <a:t> </a:t>
-            </a:r>
-            <a:r>
-              <a:rPr lang="en-US" altLang="zh-CN" dirty="0"/>
-              <a:t>you to </a:t>
-            </a:r>
-          </a:p>
-          <a:p>
-            <a:r>
-              <a:rPr lang="en-US" altLang="zh-CN" dirty="0"/>
-              <a:t>Establishing your own knowledge system can completely know what problems your knowledge solves and what is the correlation between the current knowledge point and other contents</a:t>
-            </a:r>
-            <a:r>
-              <a:rPr lang="en-US" altLang="zh-CN" b="0" i="0" dirty="0">
-                <a:solidFill>
-                  <a:srgbClr val="333333"/>
-                </a:solidFill>
-                <a:effectLst/>
-                <a:latin typeface="Arial" panose="020B0604020202020204" pitchFamily="34" charset="0"/>
-              </a:rPr>
-              <a:t>	straddled the divide between thinking and doing[</a:t>
-            </a:r>
-            <a:r>
-              <a:rPr lang="zh-CN" altLang="en-US" dirty="0">
-                <a:solidFill>
-                  <a:srgbClr val="333333"/>
-                </a:solidFill>
-                <a:latin typeface="Arial" panose="020B0604020202020204" pitchFamily="34" charset="0"/>
-              </a:rPr>
-              <a:t>希望大家可以做到知行合一，大家加油共勉</a:t>
-            </a:r>
-            <a:r>
-              <a:rPr lang="en-US" altLang="zh-CN" b="0" i="0" dirty="0">
-                <a:solidFill>
-                  <a:srgbClr val="333333"/>
-                </a:solidFill>
-                <a:effectLst/>
-                <a:latin typeface="Arial" panose="020B0604020202020204" pitchFamily="34" charset="0"/>
-              </a:rPr>
-              <a:t>].</a:t>
-            </a:r>
-            <a:endParaRPr lang="en-US" altLang="zh-CN" dirty="0"/>
+              <a:t>Those contains all the information about the subject.</a:t>
+            </a:r>
           </a:p>
         </p:txBody>
       </p:sp>
     </p:spTree>
     <p:extLst>
       <p:ext uri="{BB962C8B-B14F-4D97-AF65-F5344CB8AC3E}">
-        <p14:creationId xmlns:p14="http://schemas.microsoft.com/office/powerpoint/2010/main" val="3209688045"/>
+        <p14:creationId xmlns:p14="http://schemas.microsoft.com/office/powerpoint/2010/main" val="322371705"/>
       </p:ext>
     </p:extLst>
   </p:cSld>
   <p:clrMapOvr>
     <a:masterClrMapping/>
   </p:clrMapOvr>
+</p:sld>
+</file>
+
+<file path=ppt/slides/slide8.xml><?xml version="1.0" encoding="utf-8"?>
+<p:sld xmlns:a="http://schemas.openxmlformats.org/drawingml/2006/main" xmlns:r="http://schemas.openxmlformats.org/officeDocument/2006/relationships" xmlns:p="http://schemas.openxmlformats.org/presentationml/2006/main">
+  <p:cSld>
+    <p:spTree>
+      <p:nvGrpSpPr>
+        <p:cNvPr id="1" name=""/>
+        <p:cNvGrpSpPr/>
+        <p:nvPr/>
+      </p:nvGrpSpPr>
+      <p:grpSpPr>
+        <a:xfrm>
+          <a:off x="0" y="0"/>
+          <a:ext cx="0" cy="0"/>
+          <a:chOff x="0" y="0"/>
+          <a:chExt cx="0" cy="0"/>
+        </a:xfrm>
+      </p:grpSpPr>
+      <p:sp>
+        <p:nvSpPr>
+          <p:cNvPr id="2" name="标题 1">
+            <a:extLst>
+              <a:ext uri="{FF2B5EF4-FFF2-40B4-BE49-F238E27FC236}">
+                <a16:creationId xmlns:a16="http://schemas.microsoft.com/office/drawing/2014/main" id="{BCDF9681-C394-43FA-973F-484ACD74B54D}"/>
+              </a:ext>
+            </a:extLst>
+          </p:cNvPr>
+          <p:cNvSpPr>
+            <a:spLocks noGrp="1"/>
+          </p:cNvSpPr>
+          <p:nvPr>
+            <p:ph type="title"/>
+          </p:nvPr>
+        </p:nvSpPr>
+        <p:spPr/>
+        <p:txBody>
+          <a:bodyPr/>
+          <a:lstStyle/>
+          <a:p>
+            <a:r>
+              <a:rPr lang="en-US" altLang="zh-CN" dirty="0"/>
+              <a:t>The process about how to build my knowledge structure</a:t>
+            </a:r>
+            <a:endParaRPr lang="zh-CN" altLang="en-US" dirty="0"/>
+          </a:p>
+        </p:txBody>
+      </p:sp>
+      <p:sp>
+        <p:nvSpPr>
+          <p:cNvPr id="3" name="内容占位符 2">
+            <a:extLst>
+              <a:ext uri="{FF2B5EF4-FFF2-40B4-BE49-F238E27FC236}">
+                <a16:creationId xmlns:a16="http://schemas.microsoft.com/office/drawing/2014/main" id="{480C66E2-0C43-45EE-B27A-1BB079136159}"/>
+              </a:ext>
+            </a:extLst>
+          </p:cNvPr>
+          <p:cNvSpPr>
+            <a:spLocks noGrp="1"/>
+          </p:cNvSpPr>
+          <p:nvPr>
+            <p:ph idx="1"/>
+          </p:nvPr>
+        </p:nvSpPr>
+        <p:spPr>
+          <a:xfrm>
+            <a:off x="914007" y="2513782"/>
+            <a:ext cx="10360843" cy="2944338"/>
+          </a:xfrm>
+        </p:spPr>
+        <p:txBody>
+          <a:bodyPr>
+            <a:normAutofit lnSpcReduction="10000"/>
+          </a:bodyPr>
+          <a:lstStyle/>
+          <a:p>
+            <a:r>
+              <a:rPr lang="en-US" altLang="zh-CN" dirty="0"/>
+              <a:t>By crossing checking, I search all the courses in the internet, and summarize in the Excel, compare and summarize to get the difference and find the high frequency skill.</a:t>
+            </a:r>
+          </a:p>
+          <a:p>
+            <a:r>
+              <a:rPr lang="en-US" altLang="zh-CN" dirty="0"/>
+              <a:t>the reason why in this step, I manually to copy the content in the Excel not by a program… because I need to make sure that I am familiar with the content.</a:t>
+            </a:r>
+          </a:p>
+          <a:p>
+            <a:r>
+              <a:rPr lang="en-US" altLang="zh-CN" dirty="0"/>
+              <a:t>Finally I get the category about the JAVA.</a:t>
+            </a:r>
+          </a:p>
+        </p:txBody>
+      </p:sp>
+    </p:spTree>
+    <p:extLst>
+      <p:ext uri="{BB962C8B-B14F-4D97-AF65-F5344CB8AC3E}">
+        <p14:creationId xmlns:p14="http://schemas.microsoft.com/office/powerpoint/2010/main" val="91212164"/>
+      </p:ext>
+    </p:extLst>
+  </p:cSld>
+  <p:clrMapOvr>
+    <a:masterClrMapping/>
+  </p:clrMapOvr>
+</p:sld>
+</file>
+
+<file path=ppt/slides/slide9.xml><?xml version="1.0" encoding="utf-8"?>
+<p:sld xmlns:a="http://schemas.openxmlformats.org/drawingml/2006/main" xmlns:r="http://schemas.openxmlformats.org/officeDocument/2006/relationships" xmlns:p="http://schemas.openxmlformats.org/presentationml/2006/main">
+  <p:cSld>
+    <p:spTree>
+      <p:nvGrpSpPr>
+        <p:cNvPr id="1" name=""/>
+        <p:cNvGrpSpPr/>
+        <p:nvPr/>
+      </p:nvGrpSpPr>
+      <p:grpSpPr>
+        <a:xfrm>
+          <a:off x="0" y="0"/>
+          <a:ext cx="0" cy="0"/>
+          <a:chOff x="0" y="0"/>
+          <a:chExt cx="0" cy="0"/>
+        </a:xfrm>
+      </p:grpSpPr>
+      <p:pic>
+        <p:nvPicPr>
+          <p:cNvPr id="13" name="图片 12">
+            <a:extLst>
+              <a:ext uri="{FF2B5EF4-FFF2-40B4-BE49-F238E27FC236}">
+                <a16:creationId xmlns:a16="http://schemas.microsoft.com/office/drawing/2014/main" id="{3CFE4928-30A1-45A6-A162-2A5CF6E8C7E2}"/>
+              </a:ext>
+            </a:extLst>
+          </p:cNvPr>
+          <p:cNvPicPr>
+            <a:picLocks noChangeAspect="1"/>
+          </p:cNvPicPr>
+          <p:nvPr/>
+        </p:nvPicPr>
+        <p:blipFill>
+          <a:blip r:embed="rId3"/>
+          <a:stretch>
+            <a:fillRect/>
+          </a:stretch>
+        </p:blipFill>
+        <p:spPr>
+          <a:xfrm>
+            <a:off x="2471059" y="1832066"/>
+            <a:ext cx="6661296" cy="3806455"/>
+          </a:xfrm>
+          <a:prstGeom prst="rect">
+            <a:avLst/>
+          </a:prstGeom>
+        </p:spPr>
+      </p:pic>
+      <p:sp>
+        <p:nvSpPr>
+          <p:cNvPr id="2" name="标题 1">
+            <a:extLst>
+              <a:ext uri="{FF2B5EF4-FFF2-40B4-BE49-F238E27FC236}">
+                <a16:creationId xmlns:a16="http://schemas.microsoft.com/office/drawing/2014/main" id="{A2A42F10-3C49-4F64-AAC0-471F926A1D49}"/>
+              </a:ext>
+            </a:extLst>
+          </p:cNvPr>
+          <p:cNvSpPr>
+            <a:spLocks noGrp="1"/>
+          </p:cNvSpPr>
+          <p:nvPr>
+            <p:ph type="title"/>
+          </p:nvPr>
+        </p:nvSpPr>
+        <p:spPr>
+          <a:xfrm>
+            <a:off x="357433" y="302158"/>
+            <a:ext cx="10294856" cy="920210"/>
+          </a:xfrm>
+        </p:spPr>
+        <p:txBody>
+          <a:bodyPr>
+            <a:noAutofit/>
+          </a:bodyPr>
+          <a:lstStyle/>
+          <a:p>
+            <a:r>
+              <a:rPr lang="en-US" altLang="zh-CN" sz="3200" dirty="0"/>
+              <a:t>In the job list I see the distributed services are import so after I use the condition format in excel</a:t>
+            </a:r>
+            <a:endParaRPr lang="zh-CN" altLang="en-US" sz="3200" dirty="0"/>
+          </a:p>
+        </p:txBody>
+      </p:sp>
+      <p:pic>
+        <p:nvPicPr>
+          <p:cNvPr id="5" name="内容占位符 4">
+            <a:extLst>
+              <a:ext uri="{FF2B5EF4-FFF2-40B4-BE49-F238E27FC236}">
+                <a16:creationId xmlns:a16="http://schemas.microsoft.com/office/drawing/2014/main" id="{065DFC6B-511C-4F9E-9550-FCA06F0696CB}"/>
+              </a:ext>
+            </a:extLst>
+          </p:cNvPr>
+          <p:cNvPicPr>
+            <a:picLocks noGrp="1" noChangeAspect="1"/>
+          </p:cNvPicPr>
+          <p:nvPr>
+            <p:ph idx="1"/>
+          </p:nvPr>
+        </p:nvPicPr>
+        <p:blipFill>
+          <a:blip r:embed="rId4"/>
+          <a:stretch>
+            <a:fillRect/>
+          </a:stretch>
+        </p:blipFill>
+        <p:spPr>
+          <a:xfrm>
+            <a:off x="1352076" y="1699387"/>
+            <a:ext cx="3326646" cy="4071814"/>
+          </a:xfrm>
+        </p:spPr>
+      </p:pic>
+      <p:pic>
+        <p:nvPicPr>
+          <p:cNvPr id="7" name="图片 6">
+            <a:extLst>
+              <a:ext uri="{FF2B5EF4-FFF2-40B4-BE49-F238E27FC236}">
+                <a16:creationId xmlns:a16="http://schemas.microsoft.com/office/drawing/2014/main" id="{A6AF561A-00BD-4BD4-A908-3FC014B2614F}"/>
+              </a:ext>
+            </a:extLst>
+          </p:cNvPr>
+          <p:cNvPicPr>
+            <a:picLocks noChangeAspect="1"/>
+          </p:cNvPicPr>
+          <p:nvPr/>
+        </p:nvPicPr>
+        <p:blipFill>
+          <a:blip r:embed="rId5"/>
+          <a:stretch>
+            <a:fillRect/>
+          </a:stretch>
+        </p:blipFill>
+        <p:spPr>
+          <a:xfrm>
+            <a:off x="7011913" y="1636579"/>
+            <a:ext cx="2753020" cy="4197431"/>
+          </a:xfrm>
+          <a:prstGeom prst="rect">
+            <a:avLst/>
+          </a:prstGeom>
+        </p:spPr>
+      </p:pic>
+      <p:sp>
+        <p:nvSpPr>
+          <p:cNvPr id="8" name="内容占位符 2">
+            <a:extLst>
+              <a:ext uri="{FF2B5EF4-FFF2-40B4-BE49-F238E27FC236}">
+                <a16:creationId xmlns:a16="http://schemas.microsoft.com/office/drawing/2014/main" id="{768072D1-F159-4CEA-8CEC-ECFF59E88234}"/>
+              </a:ext>
+            </a:extLst>
+          </p:cNvPr>
+          <p:cNvSpPr txBox="1">
+            <a:spLocks/>
+          </p:cNvSpPr>
+          <p:nvPr/>
+        </p:nvSpPr>
+        <p:spPr>
+          <a:xfrm>
+            <a:off x="1450352" y="6134868"/>
+            <a:ext cx="2753020" cy="523072"/>
+          </a:xfrm>
+          <a:prstGeom prst="rect">
+            <a:avLst/>
+          </a:prstGeom>
+        </p:spPr>
+        <p:txBody>
+          <a:bodyPr vert="horz" lIns="91440" tIns="45720" rIns="91440" bIns="45720" rtlCol="0">
+            <a:normAutofit/>
+          </a:bodyPr>
+          <a:lstStyle>
+            <a:lvl1pPr marL="228600" indent="-228600" algn="l" defTabSz="914400" rtl="0" eaLnBrk="1" latinLnBrk="0" hangingPunct="1">
+              <a:lnSpc>
+                <a:spcPct val="90000"/>
+              </a:lnSpc>
+              <a:spcBef>
+                <a:spcPts val="1000"/>
+              </a:spcBef>
+              <a:buFont typeface="Arial" panose="020B0604020202020204" pitchFamily="34" charset="0"/>
+              <a:buChar char="•"/>
+              <a:defRPr sz="2800" kern="1200">
+                <a:solidFill>
+                  <a:schemeClr val="tx1"/>
+                </a:solidFill>
+                <a:latin typeface="+mn-lt"/>
+                <a:ea typeface="+mn-ea"/>
+                <a:cs typeface="+mn-cs"/>
+              </a:defRPr>
+            </a:lvl1pPr>
+            <a:lvl2pPr marL="685800" indent="-228600" algn="l" defTabSz="914400" rtl="0" eaLnBrk="1" latinLnBrk="0" hangingPunct="1">
+              <a:lnSpc>
+                <a:spcPct val="90000"/>
+              </a:lnSpc>
+              <a:spcBef>
+                <a:spcPts val="500"/>
+              </a:spcBef>
+              <a:buFont typeface="Arial" panose="020B0604020202020204" pitchFamily="34" charset="0"/>
+              <a:buChar char="•"/>
+              <a:defRPr sz="2400" kern="1200">
+                <a:solidFill>
+                  <a:schemeClr val="tx1"/>
+                </a:solidFill>
+                <a:latin typeface="+mn-lt"/>
+                <a:ea typeface="+mn-ea"/>
+                <a:cs typeface="+mn-cs"/>
+              </a:defRPr>
+            </a:lvl2pPr>
+            <a:lvl3pPr marL="1143000" indent="-228600" algn="l" defTabSz="914400" rtl="0" eaLnBrk="1" latinLnBrk="0" hangingPunct="1">
+              <a:lnSpc>
+                <a:spcPct val="90000"/>
+              </a:lnSpc>
+              <a:spcBef>
+                <a:spcPts val="500"/>
+              </a:spcBef>
+              <a:buFont typeface="Arial" panose="020B0604020202020204" pitchFamily="34" charset="0"/>
+              <a:buChar char="•"/>
+              <a:defRPr sz="2000" kern="1200">
+                <a:solidFill>
+                  <a:schemeClr val="tx1"/>
+                </a:solidFill>
+                <a:latin typeface="+mn-lt"/>
+                <a:ea typeface="+mn-ea"/>
+                <a:cs typeface="+mn-cs"/>
+              </a:defRPr>
+            </a:lvl3pPr>
+            <a:lvl4pPr marL="1600200" indent="-228600" algn="l" defTabSz="914400" rtl="0" eaLnBrk="1" latinLnBrk="0" hangingPunct="1">
+              <a:lnSpc>
+                <a:spcPct val="90000"/>
+              </a:lnSpc>
+              <a:spcBef>
+                <a:spcPts val="500"/>
+              </a:spcBef>
+              <a:buFont typeface="Arial" panose="020B0604020202020204" pitchFamily="34" charset="0"/>
+              <a:buChar char="•"/>
+              <a:defRPr sz="1800" kern="1200">
+                <a:solidFill>
+                  <a:schemeClr val="tx1"/>
+                </a:solidFill>
+                <a:latin typeface="+mn-lt"/>
+                <a:ea typeface="+mn-ea"/>
+                <a:cs typeface="+mn-cs"/>
+              </a:defRPr>
+            </a:lvl4pPr>
+            <a:lvl5pPr marL="2057400" indent="-228600" algn="l" defTabSz="914400" rtl="0" eaLnBrk="1" latinLnBrk="0" hangingPunct="1">
+              <a:lnSpc>
+                <a:spcPct val="90000"/>
+              </a:lnSpc>
+              <a:spcBef>
+                <a:spcPts val="500"/>
+              </a:spcBef>
+              <a:buFont typeface="Arial" panose="020B0604020202020204" pitchFamily="34" charset="0"/>
+              <a:buChar char="•"/>
+              <a:defRPr sz="1800" kern="1200">
+                <a:solidFill>
+                  <a:schemeClr val="tx1"/>
+                </a:solidFill>
+                <a:latin typeface="+mn-lt"/>
+                <a:ea typeface="+mn-ea"/>
+                <a:cs typeface="+mn-cs"/>
+              </a:defRPr>
+            </a:lvl5pPr>
+            <a:lvl6pPr marL="2514600" indent="-228600" algn="l" defTabSz="914400" rtl="0" eaLnBrk="1" latinLnBrk="0" hangingPunct="1">
+              <a:lnSpc>
+                <a:spcPct val="90000"/>
+              </a:lnSpc>
+              <a:spcBef>
+                <a:spcPts val="500"/>
+              </a:spcBef>
+              <a:buFont typeface="Arial" panose="020B0604020202020204" pitchFamily="34" charset="0"/>
+              <a:buChar char="•"/>
+              <a:defRPr sz="1800" kern="1200">
+                <a:solidFill>
+                  <a:schemeClr val="tx1"/>
+                </a:solidFill>
+                <a:latin typeface="+mn-lt"/>
+                <a:ea typeface="+mn-ea"/>
+                <a:cs typeface="+mn-cs"/>
+              </a:defRPr>
+            </a:lvl6pPr>
+            <a:lvl7pPr marL="2971800" indent="-228600" algn="l" defTabSz="914400" rtl="0" eaLnBrk="1" latinLnBrk="0" hangingPunct="1">
+              <a:lnSpc>
+                <a:spcPct val="90000"/>
+              </a:lnSpc>
+              <a:spcBef>
+                <a:spcPts val="500"/>
+              </a:spcBef>
+              <a:buFont typeface="Arial" panose="020B0604020202020204" pitchFamily="34" charset="0"/>
+              <a:buChar char="•"/>
+              <a:defRPr sz="1800" kern="1200">
+                <a:solidFill>
+                  <a:schemeClr val="tx1"/>
+                </a:solidFill>
+                <a:latin typeface="+mn-lt"/>
+                <a:ea typeface="+mn-ea"/>
+                <a:cs typeface="+mn-cs"/>
+              </a:defRPr>
+            </a:lvl7pPr>
+            <a:lvl8pPr marL="3429000" indent="-228600" algn="l" defTabSz="914400" rtl="0" eaLnBrk="1" latinLnBrk="0" hangingPunct="1">
+              <a:lnSpc>
+                <a:spcPct val="90000"/>
+              </a:lnSpc>
+              <a:spcBef>
+                <a:spcPts val="500"/>
+              </a:spcBef>
+              <a:buFont typeface="Arial" panose="020B0604020202020204" pitchFamily="34" charset="0"/>
+              <a:buChar char="•"/>
+              <a:defRPr sz="1800" kern="1200">
+                <a:solidFill>
+                  <a:schemeClr val="tx1"/>
+                </a:solidFill>
+                <a:latin typeface="+mn-lt"/>
+                <a:ea typeface="+mn-ea"/>
+                <a:cs typeface="+mn-cs"/>
+              </a:defRPr>
+            </a:lvl8pPr>
+            <a:lvl9pPr marL="3886200" indent="-228600" algn="l" defTabSz="914400" rtl="0" eaLnBrk="1" latinLnBrk="0" hangingPunct="1">
+              <a:lnSpc>
+                <a:spcPct val="90000"/>
+              </a:lnSpc>
+              <a:spcBef>
+                <a:spcPts val="500"/>
+              </a:spcBef>
+              <a:buFont typeface="Arial" panose="020B0604020202020204" pitchFamily="34" charset="0"/>
+              <a:buChar char="•"/>
+              <a:defRPr sz="1800" kern="1200">
+                <a:solidFill>
+                  <a:schemeClr val="tx1"/>
+                </a:solidFill>
+                <a:latin typeface="+mn-lt"/>
+                <a:ea typeface="+mn-ea"/>
+                <a:cs typeface="+mn-cs"/>
+              </a:defRPr>
+            </a:lvl9pPr>
+          </a:lstStyle>
+          <a:p>
+            <a:r>
+              <a:rPr lang="zh-CN" altLang="en-US" dirty="0"/>
+              <a:t>网易云课堂</a:t>
+            </a:r>
+            <a:endParaRPr lang="en-US" altLang="zh-CN" dirty="0"/>
+          </a:p>
+        </p:txBody>
+      </p:sp>
+      <p:sp>
+        <p:nvSpPr>
+          <p:cNvPr id="9" name="内容占位符 2">
+            <a:extLst>
+              <a:ext uri="{FF2B5EF4-FFF2-40B4-BE49-F238E27FC236}">
+                <a16:creationId xmlns:a16="http://schemas.microsoft.com/office/drawing/2014/main" id="{B7308CA0-8F8D-47FA-8D4F-2AC0F68B1A75}"/>
+              </a:ext>
+            </a:extLst>
+          </p:cNvPr>
+          <p:cNvSpPr txBox="1">
+            <a:spLocks/>
+          </p:cNvSpPr>
+          <p:nvPr/>
+        </p:nvSpPr>
+        <p:spPr>
+          <a:xfrm>
+            <a:off x="7257009" y="6134868"/>
+            <a:ext cx="2753020" cy="523072"/>
+          </a:xfrm>
+          <a:prstGeom prst="rect">
+            <a:avLst/>
+          </a:prstGeom>
+        </p:spPr>
+        <p:txBody>
+          <a:bodyPr vert="horz" lIns="91440" tIns="45720" rIns="91440" bIns="45720" rtlCol="0">
+            <a:normAutofit/>
+          </a:bodyPr>
+          <a:lstStyle>
+            <a:lvl1pPr marL="228600" indent="-228600" algn="l" defTabSz="914400" rtl="0" eaLnBrk="1" latinLnBrk="0" hangingPunct="1">
+              <a:lnSpc>
+                <a:spcPct val="90000"/>
+              </a:lnSpc>
+              <a:spcBef>
+                <a:spcPts val="1000"/>
+              </a:spcBef>
+              <a:buFont typeface="Arial" panose="020B0604020202020204" pitchFamily="34" charset="0"/>
+              <a:buChar char="•"/>
+              <a:defRPr sz="2800" kern="1200">
+                <a:solidFill>
+                  <a:schemeClr val="tx1"/>
+                </a:solidFill>
+                <a:latin typeface="+mn-lt"/>
+                <a:ea typeface="+mn-ea"/>
+                <a:cs typeface="+mn-cs"/>
+              </a:defRPr>
+            </a:lvl1pPr>
+            <a:lvl2pPr marL="685800" indent="-228600" algn="l" defTabSz="914400" rtl="0" eaLnBrk="1" latinLnBrk="0" hangingPunct="1">
+              <a:lnSpc>
+                <a:spcPct val="90000"/>
+              </a:lnSpc>
+              <a:spcBef>
+                <a:spcPts val="500"/>
+              </a:spcBef>
+              <a:buFont typeface="Arial" panose="020B0604020202020204" pitchFamily="34" charset="0"/>
+              <a:buChar char="•"/>
+              <a:defRPr sz="2400" kern="1200">
+                <a:solidFill>
+                  <a:schemeClr val="tx1"/>
+                </a:solidFill>
+                <a:latin typeface="+mn-lt"/>
+                <a:ea typeface="+mn-ea"/>
+                <a:cs typeface="+mn-cs"/>
+              </a:defRPr>
+            </a:lvl2pPr>
+            <a:lvl3pPr marL="1143000" indent="-228600" algn="l" defTabSz="914400" rtl="0" eaLnBrk="1" latinLnBrk="0" hangingPunct="1">
+              <a:lnSpc>
+                <a:spcPct val="90000"/>
+              </a:lnSpc>
+              <a:spcBef>
+                <a:spcPts val="500"/>
+              </a:spcBef>
+              <a:buFont typeface="Arial" panose="020B0604020202020204" pitchFamily="34" charset="0"/>
+              <a:buChar char="•"/>
+              <a:defRPr sz="2000" kern="1200">
+                <a:solidFill>
+                  <a:schemeClr val="tx1"/>
+                </a:solidFill>
+                <a:latin typeface="+mn-lt"/>
+                <a:ea typeface="+mn-ea"/>
+                <a:cs typeface="+mn-cs"/>
+              </a:defRPr>
+            </a:lvl3pPr>
+            <a:lvl4pPr marL="1600200" indent="-228600" algn="l" defTabSz="914400" rtl="0" eaLnBrk="1" latinLnBrk="0" hangingPunct="1">
+              <a:lnSpc>
+                <a:spcPct val="90000"/>
+              </a:lnSpc>
+              <a:spcBef>
+                <a:spcPts val="500"/>
+              </a:spcBef>
+              <a:buFont typeface="Arial" panose="020B0604020202020204" pitchFamily="34" charset="0"/>
+              <a:buChar char="•"/>
+              <a:defRPr sz="1800" kern="1200">
+                <a:solidFill>
+                  <a:schemeClr val="tx1"/>
+                </a:solidFill>
+                <a:latin typeface="+mn-lt"/>
+                <a:ea typeface="+mn-ea"/>
+                <a:cs typeface="+mn-cs"/>
+              </a:defRPr>
+            </a:lvl4pPr>
+            <a:lvl5pPr marL="2057400" indent="-228600" algn="l" defTabSz="914400" rtl="0" eaLnBrk="1" latinLnBrk="0" hangingPunct="1">
+              <a:lnSpc>
+                <a:spcPct val="90000"/>
+              </a:lnSpc>
+              <a:spcBef>
+                <a:spcPts val="500"/>
+              </a:spcBef>
+              <a:buFont typeface="Arial" panose="020B0604020202020204" pitchFamily="34" charset="0"/>
+              <a:buChar char="•"/>
+              <a:defRPr sz="1800" kern="1200">
+                <a:solidFill>
+                  <a:schemeClr val="tx1"/>
+                </a:solidFill>
+                <a:latin typeface="+mn-lt"/>
+                <a:ea typeface="+mn-ea"/>
+                <a:cs typeface="+mn-cs"/>
+              </a:defRPr>
+            </a:lvl5pPr>
+            <a:lvl6pPr marL="2514600" indent="-228600" algn="l" defTabSz="914400" rtl="0" eaLnBrk="1" latinLnBrk="0" hangingPunct="1">
+              <a:lnSpc>
+                <a:spcPct val="90000"/>
+              </a:lnSpc>
+              <a:spcBef>
+                <a:spcPts val="500"/>
+              </a:spcBef>
+              <a:buFont typeface="Arial" panose="020B0604020202020204" pitchFamily="34" charset="0"/>
+              <a:buChar char="•"/>
+              <a:defRPr sz="1800" kern="1200">
+                <a:solidFill>
+                  <a:schemeClr val="tx1"/>
+                </a:solidFill>
+                <a:latin typeface="+mn-lt"/>
+                <a:ea typeface="+mn-ea"/>
+                <a:cs typeface="+mn-cs"/>
+              </a:defRPr>
+            </a:lvl6pPr>
+            <a:lvl7pPr marL="2971800" indent="-228600" algn="l" defTabSz="914400" rtl="0" eaLnBrk="1" latinLnBrk="0" hangingPunct="1">
+              <a:lnSpc>
+                <a:spcPct val="90000"/>
+              </a:lnSpc>
+              <a:spcBef>
+                <a:spcPts val="500"/>
+              </a:spcBef>
+              <a:buFont typeface="Arial" panose="020B0604020202020204" pitchFamily="34" charset="0"/>
+              <a:buChar char="•"/>
+              <a:defRPr sz="1800" kern="1200">
+                <a:solidFill>
+                  <a:schemeClr val="tx1"/>
+                </a:solidFill>
+                <a:latin typeface="+mn-lt"/>
+                <a:ea typeface="+mn-ea"/>
+                <a:cs typeface="+mn-cs"/>
+              </a:defRPr>
+            </a:lvl7pPr>
+            <a:lvl8pPr marL="3429000" indent="-228600" algn="l" defTabSz="914400" rtl="0" eaLnBrk="1" latinLnBrk="0" hangingPunct="1">
+              <a:lnSpc>
+                <a:spcPct val="90000"/>
+              </a:lnSpc>
+              <a:spcBef>
+                <a:spcPts val="500"/>
+              </a:spcBef>
+              <a:buFont typeface="Arial" panose="020B0604020202020204" pitchFamily="34" charset="0"/>
+              <a:buChar char="•"/>
+              <a:defRPr sz="1800" kern="1200">
+                <a:solidFill>
+                  <a:schemeClr val="tx1"/>
+                </a:solidFill>
+                <a:latin typeface="+mn-lt"/>
+                <a:ea typeface="+mn-ea"/>
+                <a:cs typeface="+mn-cs"/>
+              </a:defRPr>
+            </a:lvl8pPr>
+            <a:lvl9pPr marL="3886200" indent="-228600" algn="l" defTabSz="914400" rtl="0" eaLnBrk="1" latinLnBrk="0" hangingPunct="1">
+              <a:lnSpc>
+                <a:spcPct val="90000"/>
+              </a:lnSpc>
+              <a:spcBef>
+                <a:spcPts val="500"/>
+              </a:spcBef>
+              <a:buFont typeface="Arial" panose="020B0604020202020204" pitchFamily="34" charset="0"/>
+              <a:buChar char="•"/>
+              <a:defRPr sz="1800" kern="1200">
+                <a:solidFill>
+                  <a:schemeClr val="tx1"/>
+                </a:solidFill>
+                <a:latin typeface="+mn-lt"/>
+                <a:ea typeface="+mn-ea"/>
+                <a:cs typeface="+mn-cs"/>
+              </a:defRPr>
+            </a:lvl9pPr>
+          </a:lstStyle>
+          <a:p>
+            <a:r>
+              <a:rPr lang="zh-CN" altLang="en-US" dirty="0"/>
+              <a:t>奈学教育</a:t>
+            </a:r>
+            <a:endParaRPr lang="en-US" altLang="zh-CN" dirty="0"/>
+          </a:p>
+        </p:txBody>
+      </p:sp>
+    </p:spTree>
+    <p:extLst>
+      <p:ext uri="{BB962C8B-B14F-4D97-AF65-F5344CB8AC3E}">
+        <p14:creationId xmlns:p14="http://schemas.microsoft.com/office/powerpoint/2010/main" val="2701715059"/>
+      </p:ext>
+    </p:extLst>
+  </p:cSld>
+  <p:clrMapOvr>
+    <a:masterClrMapping/>
+  </p:clrMapOvr>
+  <p:timing>
+    <p:tnLst>
+      <p:par>
+        <p:cTn id="1" dur="indefinite" restart="never" nodeType="tmRoot">
+          <p:childTnLst>
+            <p:seq concurrent="1" nextAc="seek">
+              <p:cTn id="2" dur="indefinite" nodeType="mainSeq">
+                <p:childTnLst>
+                  <p:par>
+                    <p:cTn id="3" fill="hold">
+                      <p:stCondLst>
+                        <p:cond delay="indefinite"/>
+                      </p:stCondLst>
+                      <p:childTnLst>
+                        <p:par>
+                          <p:cTn id="4" fill="hold">
+                            <p:stCondLst>
+                              <p:cond delay="0"/>
+                            </p:stCondLst>
+                            <p:childTnLst>
+                              <p:par>
+                                <p:cTn id="5" presetID="10" presetClass="entr" presetSubtype="0" fill="hold" nodeType="clickEffect">
+                                  <p:stCondLst>
+                                    <p:cond delay="0"/>
+                                  </p:stCondLst>
+                                  <p:childTnLst>
+                                    <p:set>
+                                      <p:cBhvr>
+                                        <p:cTn id="6" dur="1" fill="hold">
+                                          <p:stCondLst>
+                                            <p:cond delay="0"/>
+                                          </p:stCondLst>
+                                        </p:cTn>
+                                        <p:tgtEl>
+                                          <p:spTgt spid="13"/>
+                                        </p:tgtEl>
+                                        <p:attrNameLst>
+                                          <p:attrName>style.visibility</p:attrName>
+                                        </p:attrNameLst>
+                                      </p:cBhvr>
+                                      <p:to>
+                                        <p:strVal val="visible"/>
+                                      </p:to>
+                                    </p:set>
+                                    <p:animEffect transition="in" filter="fade">
+                                      <p:cBhvr>
+                                        <p:cTn id="7" dur="500"/>
+                                        <p:tgtEl>
+                                          <p:spTgt spid="13"/>
+                                        </p:tgtEl>
+                                      </p:cBhvr>
+                                    </p:animEffect>
+                                  </p:childTnLst>
+                                </p:cTn>
+                              </p:par>
+                            </p:childTnLst>
+                          </p:cTn>
+                        </p:par>
+                      </p:childTnLst>
+                    </p:cTn>
+                  </p:par>
+                  <p:par>
+                    <p:cTn id="8" fill="hold">
+                      <p:stCondLst>
+                        <p:cond delay="indefinite"/>
+                      </p:stCondLst>
+                      <p:childTnLst>
+                        <p:par>
+                          <p:cTn id="9" fill="hold">
+                            <p:stCondLst>
+                              <p:cond delay="0"/>
+                            </p:stCondLst>
+                            <p:childTnLst>
+                              <p:par>
+                                <p:cTn id="10" presetID="10" presetClass="entr" presetSubtype="0" fill="hold" nodeType="clickEffect">
+                                  <p:stCondLst>
+                                    <p:cond delay="0"/>
+                                  </p:stCondLst>
+                                  <p:childTnLst>
+                                    <p:set>
+                                      <p:cBhvr>
+                                        <p:cTn id="11" dur="1" fill="hold">
+                                          <p:stCondLst>
+                                            <p:cond delay="0"/>
+                                          </p:stCondLst>
+                                        </p:cTn>
+                                        <p:tgtEl>
+                                          <p:spTgt spid="5"/>
+                                        </p:tgtEl>
+                                        <p:attrNameLst>
+                                          <p:attrName>style.visibility</p:attrName>
+                                        </p:attrNameLst>
+                                      </p:cBhvr>
+                                      <p:to>
+                                        <p:strVal val="visible"/>
+                                      </p:to>
+                                    </p:set>
+                                    <p:animEffect transition="in" filter="fade">
+                                      <p:cBhvr>
+                                        <p:cTn id="12" dur="500"/>
+                                        <p:tgtEl>
+                                          <p:spTgt spid="5"/>
+                                        </p:tgtEl>
+                                      </p:cBhvr>
+                                    </p:animEffect>
+                                  </p:childTnLst>
+                                </p:cTn>
+                              </p:par>
+                              <p:par>
+                                <p:cTn id="13" presetID="10" presetClass="entr" presetSubtype="0" fill="hold" grpId="0" nodeType="withEffect">
+                                  <p:stCondLst>
+                                    <p:cond delay="0"/>
+                                  </p:stCondLst>
+                                  <p:childTnLst>
+                                    <p:set>
+                                      <p:cBhvr>
+                                        <p:cTn id="14" dur="1" fill="hold">
+                                          <p:stCondLst>
+                                            <p:cond delay="0"/>
+                                          </p:stCondLst>
+                                        </p:cTn>
+                                        <p:tgtEl>
+                                          <p:spTgt spid="8"/>
+                                        </p:tgtEl>
+                                        <p:attrNameLst>
+                                          <p:attrName>style.visibility</p:attrName>
+                                        </p:attrNameLst>
+                                      </p:cBhvr>
+                                      <p:to>
+                                        <p:strVal val="visible"/>
+                                      </p:to>
+                                    </p:set>
+                                    <p:animEffect transition="in" filter="fade">
+                                      <p:cBhvr>
+                                        <p:cTn id="15" dur="500"/>
+                                        <p:tgtEl>
+                                          <p:spTgt spid="8"/>
+                                        </p:tgtEl>
+                                      </p:cBhvr>
+                                    </p:animEffect>
+                                  </p:childTnLst>
+                                </p:cTn>
+                              </p:par>
+                              <p:par>
+                                <p:cTn id="16" presetID="10" presetClass="entr" presetSubtype="0" fill="hold" nodeType="withEffect">
+                                  <p:stCondLst>
+                                    <p:cond delay="0"/>
+                                  </p:stCondLst>
+                                  <p:childTnLst>
+                                    <p:set>
+                                      <p:cBhvr>
+                                        <p:cTn id="17" dur="1" fill="hold">
+                                          <p:stCondLst>
+                                            <p:cond delay="0"/>
+                                          </p:stCondLst>
+                                        </p:cTn>
+                                        <p:tgtEl>
+                                          <p:spTgt spid="7"/>
+                                        </p:tgtEl>
+                                        <p:attrNameLst>
+                                          <p:attrName>style.visibility</p:attrName>
+                                        </p:attrNameLst>
+                                      </p:cBhvr>
+                                      <p:to>
+                                        <p:strVal val="visible"/>
+                                      </p:to>
+                                    </p:set>
+                                    <p:animEffect transition="in" filter="fade">
+                                      <p:cBhvr>
+                                        <p:cTn id="18" dur="500"/>
+                                        <p:tgtEl>
+                                          <p:spTgt spid="7"/>
+                                        </p:tgtEl>
+                                      </p:cBhvr>
+                                    </p:animEffect>
+                                  </p:childTnLst>
+                                </p:cTn>
+                              </p:par>
+                              <p:par>
+                                <p:cTn id="19" presetID="10" presetClass="entr" presetSubtype="0" fill="hold" grpId="0" nodeType="withEffect">
+                                  <p:stCondLst>
+                                    <p:cond delay="0"/>
+                                  </p:stCondLst>
+                                  <p:childTnLst>
+                                    <p:set>
+                                      <p:cBhvr>
+                                        <p:cTn id="20" dur="1" fill="hold">
+                                          <p:stCondLst>
+                                            <p:cond delay="0"/>
+                                          </p:stCondLst>
+                                        </p:cTn>
+                                        <p:tgtEl>
+                                          <p:spTgt spid="9"/>
+                                        </p:tgtEl>
+                                        <p:attrNameLst>
+                                          <p:attrName>style.visibility</p:attrName>
+                                        </p:attrNameLst>
+                                      </p:cBhvr>
+                                      <p:to>
+                                        <p:strVal val="visible"/>
+                                      </p:to>
+                                    </p:set>
+                                    <p:animEffect transition="in" filter="fade">
+                                      <p:cBhvr>
+                                        <p:cTn id="21" dur="500"/>
+                                        <p:tgtEl>
+                                          <p:spTgt spid="9"/>
+                                        </p:tgtEl>
+                                      </p:cBhvr>
+                                    </p:animEffect>
+                                  </p:childTnLst>
+                                </p:cTn>
+                              </p:par>
+                            </p:childTnLst>
+                          </p:cTn>
+                        </p:par>
+                      </p:childTnLst>
+                    </p:cTn>
+                  </p:par>
+                </p:childTnLst>
+              </p:cTn>
+              <p:prevCondLst>
+                <p:cond evt="onPrev" delay="0">
+                  <p:tgtEl>
+                    <p:sldTgt/>
+                  </p:tgtEl>
+                </p:cond>
+              </p:prevCondLst>
+              <p:nextCondLst>
+                <p:cond evt="onNext" delay="0">
+                  <p:tgtEl>
+                    <p:sldTgt/>
+                  </p:tgtEl>
+                </p:cond>
+              </p:nextCondLst>
+            </p:seq>
+          </p:childTnLst>
+        </p:cTn>
+      </p:par>
+    </p:tnLst>
+    <p:bldLst>
+      <p:bldP spid="8" grpId="0"/>
+      <p:bldP spid="9" grpId="0"/>
+    </p:bldLst>
+  </p:timing>
 </p:sld>
 </file>
 

</xml_diff>

<commit_message>
add a Philosophical conclusion
</commit_message>
<xml_diff>
--- a/New Microsoft PowerPoint 演示文稿.pptx
+++ b/New Microsoft PowerPoint 演示文稿.pptx
@@ -6461,7 +6461,7 @@
         </p:spPr>
         <p:txBody>
           <a:bodyPr>
-            <a:normAutofit lnSpcReduction="10000"/>
+            <a:normAutofit fontScale="92500" lnSpcReduction="10000"/>
           </a:bodyPr>
           <a:lstStyle/>
           <a:p>
@@ -6543,6 +6543,14 @@
               <a:rPr lang="en-US" altLang="zh-CN" dirty="0"/>
               <a:t>Establishing your own knowledge system can completely know what problems your knowledge solves and what is the correlation between the current knowledge point and other contents</a:t>
             </a:r>
+            <a:endParaRPr lang="en-US" altLang="zh-CN" dirty="0">
+              <a:solidFill>
+                <a:srgbClr val="333333"/>
+              </a:solidFill>
+              <a:latin typeface="Arial" panose="020B0604020202020204" pitchFamily="34" charset="0"/>
+            </a:endParaRPr>
+          </a:p>
+          <a:p>
             <a:r>
               <a:rPr lang="en-US" altLang="zh-CN" b="0" i="0" dirty="0">
                 <a:solidFill>
@@ -6551,7 +6559,7 @@
                 <a:effectLst/>
                 <a:latin typeface="Arial" panose="020B0604020202020204" pitchFamily="34" charset="0"/>
               </a:rPr>
-              <a:t>	straddled the divide between thinking and doing[</a:t>
+              <a:t>straddled the divide between thinking and doing[</a:t>
             </a:r>
             <a:r>
               <a:rPr lang="zh-CN" altLang="en-US" b="0" i="0" dirty="0">
@@ -6561,7 +6569,7 @@
                 <a:effectLst/>
                 <a:latin typeface="Arial" panose="020B0604020202020204" pitchFamily="34" charset="0"/>
               </a:rPr>
-              <a:t>时间是有限的</a:t>
+              <a:t>随着时间的推移经历了的，做了的，最终留下来的都会是财富</a:t>
             </a:r>
             <a:r>
               <a:rPr lang="zh-CN" altLang="en-US" dirty="0">

</xml_diff>